<commit_message>
modif pour la diapo github
</commit_message>
<xml_diff>
--- a/cycle développement.pptx
+++ b/cycle développement.pptx
@@ -104,6 +104,11 @@
       </a:defRPr>
     </a:lvl9pPr>
   </p:defaultTextStyle>
+  <p:extLst>
+    <p:ext uri="{EFAFB233-063F-42B5-8137-9DF3F51BA10A}">
+      <p15:sldGuideLst xmlns:p15="http://schemas.microsoft.com/office/powerpoint/2012/main"/>
+    </p:ext>
+  </p:extLst>
 </p:presentation>
 </file>
 
@@ -2966,14 +2971,4019 @@
       </p:grpSpPr>
       <p:sp>
         <p:nvSpPr>
+          <p:cNvPr id="38" name="Forme libre 37"/>
+          <p:cNvSpPr/>
+          <p:nvPr/>
+        </p:nvSpPr>
+        <p:spPr>
+          <a:xfrm>
+            <a:off x="3925809" y="48405"/>
+            <a:ext cx="7999803" cy="1763361"/>
+          </a:xfrm>
+          <a:custGeom>
+            <a:avLst/>
+            <a:gdLst>
+              <a:gd name="connsiteX0" fmla="*/ 36945 w 8072582"/>
+              <a:gd name="connsiteY0" fmla="*/ 1136073 h 1745673"/>
+              <a:gd name="connsiteX1" fmla="*/ 609600 w 8072582"/>
+              <a:gd name="connsiteY1" fmla="*/ 1745673 h 1745673"/>
+              <a:gd name="connsiteX2" fmla="*/ 2706254 w 8072582"/>
+              <a:gd name="connsiteY2" fmla="*/ 1662545 h 1745673"/>
+              <a:gd name="connsiteX3" fmla="*/ 4701309 w 8072582"/>
+              <a:gd name="connsiteY3" fmla="*/ 1542473 h 1745673"/>
+              <a:gd name="connsiteX4" fmla="*/ 6659418 w 8072582"/>
+              <a:gd name="connsiteY4" fmla="*/ 1366982 h 1745673"/>
+              <a:gd name="connsiteX5" fmla="*/ 8072582 w 8072582"/>
+              <a:gd name="connsiteY5" fmla="*/ 1357745 h 1745673"/>
+              <a:gd name="connsiteX6" fmla="*/ 7813964 w 8072582"/>
+              <a:gd name="connsiteY6" fmla="*/ 286327 h 1745673"/>
+              <a:gd name="connsiteX7" fmla="*/ 4368800 w 8072582"/>
+              <a:gd name="connsiteY7" fmla="*/ 304800 h 1745673"/>
+              <a:gd name="connsiteX8" fmla="*/ 2207491 w 8072582"/>
+              <a:gd name="connsiteY8" fmla="*/ 73891 h 1745673"/>
+              <a:gd name="connsiteX9" fmla="*/ 461818 w 8072582"/>
+              <a:gd name="connsiteY9" fmla="*/ 0 h 1745673"/>
+              <a:gd name="connsiteX10" fmla="*/ 0 w 8072582"/>
+              <a:gd name="connsiteY10" fmla="*/ 498764 h 1745673"/>
+              <a:gd name="connsiteX11" fmla="*/ 36945 w 8072582"/>
+              <a:gd name="connsiteY11" fmla="*/ 1136073 h 1745673"/>
+              <a:gd name="connsiteX0" fmla="*/ 84141 w 8119778"/>
+              <a:gd name="connsiteY0" fmla="*/ 1136073 h 1745673"/>
+              <a:gd name="connsiteX1" fmla="*/ 656796 w 8119778"/>
+              <a:gd name="connsiteY1" fmla="*/ 1745673 h 1745673"/>
+              <a:gd name="connsiteX2" fmla="*/ 2753450 w 8119778"/>
+              <a:gd name="connsiteY2" fmla="*/ 1662545 h 1745673"/>
+              <a:gd name="connsiteX3" fmla="*/ 4748505 w 8119778"/>
+              <a:gd name="connsiteY3" fmla="*/ 1542473 h 1745673"/>
+              <a:gd name="connsiteX4" fmla="*/ 6706614 w 8119778"/>
+              <a:gd name="connsiteY4" fmla="*/ 1366982 h 1745673"/>
+              <a:gd name="connsiteX5" fmla="*/ 8119778 w 8119778"/>
+              <a:gd name="connsiteY5" fmla="*/ 1357745 h 1745673"/>
+              <a:gd name="connsiteX6" fmla="*/ 7861160 w 8119778"/>
+              <a:gd name="connsiteY6" fmla="*/ 286327 h 1745673"/>
+              <a:gd name="connsiteX7" fmla="*/ 4415996 w 8119778"/>
+              <a:gd name="connsiteY7" fmla="*/ 304800 h 1745673"/>
+              <a:gd name="connsiteX8" fmla="*/ 2254687 w 8119778"/>
+              <a:gd name="connsiteY8" fmla="*/ 73891 h 1745673"/>
+              <a:gd name="connsiteX9" fmla="*/ 509014 w 8119778"/>
+              <a:gd name="connsiteY9" fmla="*/ 0 h 1745673"/>
+              <a:gd name="connsiteX10" fmla="*/ 47196 w 8119778"/>
+              <a:gd name="connsiteY10" fmla="*/ 498764 h 1745673"/>
+              <a:gd name="connsiteX11" fmla="*/ 84141 w 8119778"/>
+              <a:gd name="connsiteY11" fmla="*/ 1136073 h 1745673"/>
+              <a:gd name="connsiteX0" fmla="*/ 84141 w 8119778"/>
+              <a:gd name="connsiteY0" fmla="*/ 1136073 h 1745673"/>
+              <a:gd name="connsiteX1" fmla="*/ 656796 w 8119778"/>
+              <a:gd name="connsiteY1" fmla="*/ 1745673 h 1745673"/>
+              <a:gd name="connsiteX2" fmla="*/ 2753450 w 8119778"/>
+              <a:gd name="connsiteY2" fmla="*/ 1662545 h 1745673"/>
+              <a:gd name="connsiteX3" fmla="*/ 4748505 w 8119778"/>
+              <a:gd name="connsiteY3" fmla="*/ 1542473 h 1745673"/>
+              <a:gd name="connsiteX4" fmla="*/ 6706614 w 8119778"/>
+              <a:gd name="connsiteY4" fmla="*/ 1366982 h 1745673"/>
+              <a:gd name="connsiteX5" fmla="*/ 8119778 w 8119778"/>
+              <a:gd name="connsiteY5" fmla="*/ 1357745 h 1745673"/>
+              <a:gd name="connsiteX6" fmla="*/ 7861160 w 8119778"/>
+              <a:gd name="connsiteY6" fmla="*/ 286327 h 1745673"/>
+              <a:gd name="connsiteX7" fmla="*/ 4415996 w 8119778"/>
+              <a:gd name="connsiteY7" fmla="*/ 304800 h 1745673"/>
+              <a:gd name="connsiteX8" fmla="*/ 2254687 w 8119778"/>
+              <a:gd name="connsiteY8" fmla="*/ 73891 h 1745673"/>
+              <a:gd name="connsiteX9" fmla="*/ 509014 w 8119778"/>
+              <a:gd name="connsiteY9" fmla="*/ 0 h 1745673"/>
+              <a:gd name="connsiteX10" fmla="*/ 47196 w 8119778"/>
+              <a:gd name="connsiteY10" fmla="*/ 498764 h 1745673"/>
+              <a:gd name="connsiteX11" fmla="*/ 84141 w 8119778"/>
+              <a:gd name="connsiteY11" fmla="*/ 1136073 h 1745673"/>
+              <a:gd name="connsiteX0" fmla="*/ 84141 w 8119778"/>
+              <a:gd name="connsiteY0" fmla="*/ 1136073 h 1746952"/>
+              <a:gd name="connsiteX1" fmla="*/ 656796 w 8119778"/>
+              <a:gd name="connsiteY1" fmla="*/ 1745673 h 1746952"/>
+              <a:gd name="connsiteX2" fmla="*/ 2753450 w 8119778"/>
+              <a:gd name="connsiteY2" fmla="*/ 1662545 h 1746952"/>
+              <a:gd name="connsiteX3" fmla="*/ 4748505 w 8119778"/>
+              <a:gd name="connsiteY3" fmla="*/ 1542473 h 1746952"/>
+              <a:gd name="connsiteX4" fmla="*/ 6706614 w 8119778"/>
+              <a:gd name="connsiteY4" fmla="*/ 1366982 h 1746952"/>
+              <a:gd name="connsiteX5" fmla="*/ 8119778 w 8119778"/>
+              <a:gd name="connsiteY5" fmla="*/ 1357745 h 1746952"/>
+              <a:gd name="connsiteX6" fmla="*/ 7861160 w 8119778"/>
+              <a:gd name="connsiteY6" fmla="*/ 286327 h 1746952"/>
+              <a:gd name="connsiteX7" fmla="*/ 4415996 w 8119778"/>
+              <a:gd name="connsiteY7" fmla="*/ 304800 h 1746952"/>
+              <a:gd name="connsiteX8" fmla="*/ 2254687 w 8119778"/>
+              <a:gd name="connsiteY8" fmla="*/ 73891 h 1746952"/>
+              <a:gd name="connsiteX9" fmla="*/ 509014 w 8119778"/>
+              <a:gd name="connsiteY9" fmla="*/ 0 h 1746952"/>
+              <a:gd name="connsiteX10" fmla="*/ 47196 w 8119778"/>
+              <a:gd name="connsiteY10" fmla="*/ 498764 h 1746952"/>
+              <a:gd name="connsiteX11" fmla="*/ 84141 w 8119778"/>
+              <a:gd name="connsiteY11" fmla="*/ 1136073 h 1746952"/>
+              <a:gd name="connsiteX0" fmla="*/ 84141 w 8119778"/>
+              <a:gd name="connsiteY0" fmla="*/ 1136073 h 1791144"/>
+              <a:gd name="connsiteX1" fmla="*/ 656796 w 8119778"/>
+              <a:gd name="connsiteY1" fmla="*/ 1745673 h 1791144"/>
+              <a:gd name="connsiteX2" fmla="*/ 2753450 w 8119778"/>
+              <a:gd name="connsiteY2" fmla="*/ 1662545 h 1791144"/>
+              <a:gd name="connsiteX3" fmla="*/ 4748505 w 8119778"/>
+              <a:gd name="connsiteY3" fmla="*/ 1542473 h 1791144"/>
+              <a:gd name="connsiteX4" fmla="*/ 6706614 w 8119778"/>
+              <a:gd name="connsiteY4" fmla="*/ 1366982 h 1791144"/>
+              <a:gd name="connsiteX5" fmla="*/ 8119778 w 8119778"/>
+              <a:gd name="connsiteY5" fmla="*/ 1357745 h 1791144"/>
+              <a:gd name="connsiteX6" fmla="*/ 7861160 w 8119778"/>
+              <a:gd name="connsiteY6" fmla="*/ 286327 h 1791144"/>
+              <a:gd name="connsiteX7" fmla="*/ 4415996 w 8119778"/>
+              <a:gd name="connsiteY7" fmla="*/ 304800 h 1791144"/>
+              <a:gd name="connsiteX8" fmla="*/ 2254687 w 8119778"/>
+              <a:gd name="connsiteY8" fmla="*/ 73891 h 1791144"/>
+              <a:gd name="connsiteX9" fmla="*/ 509014 w 8119778"/>
+              <a:gd name="connsiteY9" fmla="*/ 0 h 1791144"/>
+              <a:gd name="connsiteX10" fmla="*/ 47196 w 8119778"/>
+              <a:gd name="connsiteY10" fmla="*/ 498764 h 1791144"/>
+              <a:gd name="connsiteX11" fmla="*/ 84141 w 8119778"/>
+              <a:gd name="connsiteY11" fmla="*/ 1136073 h 1791144"/>
+              <a:gd name="connsiteX0" fmla="*/ 84141 w 8119778"/>
+              <a:gd name="connsiteY0" fmla="*/ 1136073 h 1753808"/>
+              <a:gd name="connsiteX1" fmla="*/ 656796 w 8119778"/>
+              <a:gd name="connsiteY1" fmla="*/ 1699491 h 1753808"/>
+              <a:gd name="connsiteX2" fmla="*/ 2753450 w 8119778"/>
+              <a:gd name="connsiteY2" fmla="*/ 1662545 h 1753808"/>
+              <a:gd name="connsiteX3" fmla="*/ 4748505 w 8119778"/>
+              <a:gd name="connsiteY3" fmla="*/ 1542473 h 1753808"/>
+              <a:gd name="connsiteX4" fmla="*/ 6706614 w 8119778"/>
+              <a:gd name="connsiteY4" fmla="*/ 1366982 h 1753808"/>
+              <a:gd name="connsiteX5" fmla="*/ 8119778 w 8119778"/>
+              <a:gd name="connsiteY5" fmla="*/ 1357745 h 1753808"/>
+              <a:gd name="connsiteX6" fmla="*/ 7861160 w 8119778"/>
+              <a:gd name="connsiteY6" fmla="*/ 286327 h 1753808"/>
+              <a:gd name="connsiteX7" fmla="*/ 4415996 w 8119778"/>
+              <a:gd name="connsiteY7" fmla="*/ 304800 h 1753808"/>
+              <a:gd name="connsiteX8" fmla="*/ 2254687 w 8119778"/>
+              <a:gd name="connsiteY8" fmla="*/ 73891 h 1753808"/>
+              <a:gd name="connsiteX9" fmla="*/ 509014 w 8119778"/>
+              <a:gd name="connsiteY9" fmla="*/ 0 h 1753808"/>
+              <a:gd name="connsiteX10" fmla="*/ 47196 w 8119778"/>
+              <a:gd name="connsiteY10" fmla="*/ 498764 h 1753808"/>
+              <a:gd name="connsiteX11" fmla="*/ 84141 w 8119778"/>
+              <a:gd name="connsiteY11" fmla="*/ 1136073 h 1753808"/>
+              <a:gd name="connsiteX0" fmla="*/ 84141 w 8119778"/>
+              <a:gd name="connsiteY0" fmla="*/ 1136073 h 1756327"/>
+              <a:gd name="connsiteX1" fmla="*/ 656796 w 8119778"/>
+              <a:gd name="connsiteY1" fmla="*/ 1699491 h 1756327"/>
+              <a:gd name="connsiteX2" fmla="*/ 2753450 w 8119778"/>
+              <a:gd name="connsiteY2" fmla="*/ 1662545 h 1756327"/>
+              <a:gd name="connsiteX3" fmla="*/ 4748505 w 8119778"/>
+              <a:gd name="connsiteY3" fmla="*/ 1542473 h 1756327"/>
+              <a:gd name="connsiteX4" fmla="*/ 6706614 w 8119778"/>
+              <a:gd name="connsiteY4" fmla="*/ 1366982 h 1756327"/>
+              <a:gd name="connsiteX5" fmla="*/ 8119778 w 8119778"/>
+              <a:gd name="connsiteY5" fmla="*/ 1357745 h 1756327"/>
+              <a:gd name="connsiteX6" fmla="*/ 7861160 w 8119778"/>
+              <a:gd name="connsiteY6" fmla="*/ 286327 h 1756327"/>
+              <a:gd name="connsiteX7" fmla="*/ 4415996 w 8119778"/>
+              <a:gd name="connsiteY7" fmla="*/ 304800 h 1756327"/>
+              <a:gd name="connsiteX8" fmla="*/ 2254687 w 8119778"/>
+              <a:gd name="connsiteY8" fmla="*/ 73891 h 1756327"/>
+              <a:gd name="connsiteX9" fmla="*/ 509014 w 8119778"/>
+              <a:gd name="connsiteY9" fmla="*/ 0 h 1756327"/>
+              <a:gd name="connsiteX10" fmla="*/ 47196 w 8119778"/>
+              <a:gd name="connsiteY10" fmla="*/ 498764 h 1756327"/>
+              <a:gd name="connsiteX11" fmla="*/ 84141 w 8119778"/>
+              <a:gd name="connsiteY11" fmla="*/ 1136073 h 1756327"/>
+              <a:gd name="connsiteX0" fmla="*/ 84141 w 8119778"/>
+              <a:gd name="connsiteY0" fmla="*/ 1136073 h 1756327"/>
+              <a:gd name="connsiteX1" fmla="*/ 656796 w 8119778"/>
+              <a:gd name="connsiteY1" fmla="*/ 1699491 h 1756327"/>
+              <a:gd name="connsiteX2" fmla="*/ 2753450 w 8119778"/>
+              <a:gd name="connsiteY2" fmla="*/ 1662545 h 1756327"/>
+              <a:gd name="connsiteX3" fmla="*/ 4748505 w 8119778"/>
+              <a:gd name="connsiteY3" fmla="*/ 1542473 h 1756327"/>
+              <a:gd name="connsiteX4" fmla="*/ 6706614 w 8119778"/>
+              <a:gd name="connsiteY4" fmla="*/ 1366982 h 1756327"/>
+              <a:gd name="connsiteX5" fmla="*/ 8119778 w 8119778"/>
+              <a:gd name="connsiteY5" fmla="*/ 1357745 h 1756327"/>
+              <a:gd name="connsiteX6" fmla="*/ 7861160 w 8119778"/>
+              <a:gd name="connsiteY6" fmla="*/ 286327 h 1756327"/>
+              <a:gd name="connsiteX7" fmla="*/ 4415996 w 8119778"/>
+              <a:gd name="connsiteY7" fmla="*/ 304800 h 1756327"/>
+              <a:gd name="connsiteX8" fmla="*/ 2254687 w 8119778"/>
+              <a:gd name="connsiteY8" fmla="*/ 73891 h 1756327"/>
+              <a:gd name="connsiteX9" fmla="*/ 509014 w 8119778"/>
+              <a:gd name="connsiteY9" fmla="*/ 0 h 1756327"/>
+              <a:gd name="connsiteX10" fmla="*/ 47196 w 8119778"/>
+              <a:gd name="connsiteY10" fmla="*/ 498764 h 1756327"/>
+              <a:gd name="connsiteX11" fmla="*/ 84141 w 8119778"/>
+              <a:gd name="connsiteY11" fmla="*/ 1136073 h 1756327"/>
+              <a:gd name="connsiteX0" fmla="*/ 84141 w 8119778"/>
+              <a:gd name="connsiteY0" fmla="*/ 1136073 h 1756327"/>
+              <a:gd name="connsiteX1" fmla="*/ 656796 w 8119778"/>
+              <a:gd name="connsiteY1" fmla="*/ 1699491 h 1756327"/>
+              <a:gd name="connsiteX2" fmla="*/ 2753450 w 8119778"/>
+              <a:gd name="connsiteY2" fmla="*/ 1662545 h 1756327"/>
+              <a:gd name="connsiteX3" fmla="*/ 4748505 w 8119778"/>
+              <a:gd name="connsiteY3" fmla="*/ 1542473 h 1756327"/>
+              <a:gd name="connsiteX4" fmla="*/ 6706614 w 8119778"/>
+              <a:gd name="connsiteY4" fmla="*/ 1366982 h 1756327"/>
+              <a:gd name="connsiteX5" fmla="*/ 8119778 w 8119778"/>
+              <a:gd name="connsiteY5" fmla="*/ 1357745 h 1756327"/>
+              <a:gd name="connsiteX6" fmla="*/ 7861160 w 8119778"/>
+              <a:gd name="connsiteY6" fmla="*/ 286327 h 1756327"/>
+              <a:gd name="connsiteX7" fmla="*/ 4415996 w 8119778"/>
+              <a:gd name="connsiteY7" fmla="*/ 304800 h 1756327"/>
+              <a:gd name="connsiteX8" fmla="*/ 2254687 w 8119778"/>
+              <a:gd name="connsiteY8" fmla="*/ 73891 h 1756327"/>
+              <a:gd name="connsiteX9" fmla="*/ 509014 w 8119778"/>
+              <a:gd name="connsiteY9" fmla="*/ 0 h 1756327"/>
+              <a:gd name="connsiteX10" fmla="*/ 47196 w 8119778"/>
+              <a:gd name="connsiteY10" fmla="*/ 498764 h 1756327"/>
+              <a:gd name="connsiteX11" fmla="*/ 84141 w 8119778"/>
+              <a:gd name="connsiteY11" fmla="*/ 1136073 h 1756327"/>
+              <a:gd name="connsiteX0" fmla="*/ 84141 w 8410408"/>
+              <a:gd name="connsiteY0" fmla="*/ 1136073 h 1756327"/>
+              <a:gd name="connsiteX1" fmla="*/ 656796 w 8410408"/>
+              <a:gd name="connsiteY1" fmla="*/ 1699491 h 1756327"/>
+              <a:gd name="connsiteX2" fmla="*/ 2753450 w 8410408"/>
+              <a:gd name="connsiteY2" fmla="*/ 1662545 h 1756327"/>
+              <a:gd name="connsiteX3" fmla="*/ 4748505 w 8410408"/>
+              <a:gd name="connsiteY3" fmla="*/ 1542473 h 1756327"/>
+              <a:gd name="connsiteX4" fmla="*/ 6706614 w 8410408"/>
+              <a:gd name="connsiteY4" fmla="*/ 1366982 h 1756327"/>
+              <a:gd name="connsiteX5" fmla="*/ 8119778 w 8410408"/>
+              <a:gd name="connsiteY5" fmla="*/ 1357745 h 1756327"/>
+              <a:gd name="connsiteX6" fmla="*/ 7861160 w 8410408"/>
+              <a:gd name="connsiteY6" fmla="*/ 286327 h 1756327"/>
+              <a:gd name="connsiteX7" fmla="*/ 4415996 w 8410408"/>
+              <a:gd name="connsiteY7" fmla="*/ 304800 h 1756327"/>
+              <a:gd name="connsiteX8" fmla="*/ 2254687 w 8410408"/>
+              <a:gd name="connsiteY8" fmla="*/ 73891 h 1756327"/>
+              <a:gd name="connsiteX9" fmla="*/ 509014 w 8410408"/>
+              <a:gd name="connsiteY9" fmla="*/ 0 h 1756327"/>
+              <a:gd name="connsiteX10" fmla="*/ 47196 w 8410408"/>
+              <a:gd name="connsiteY10" fmla="*/ 498764 h 1756327"/>
+              <a:gd name="connsiteX11" fmla="*/ 84141 w 8410408"/>
+              <a:gd name="connsiteY11" fmla="*/ 1136073 h 1756327"/>
+              <a:gd name="connsiteX0" fmla="*/ 84141 w 8175057"/>
+              <a:gd name="connsiteY0" fmla="*/ 1136073 h 1756327"/>
+              <a:gd name="connsiteX1" fmla="*/ 656796 w 8175057"/>
+              <a:gd name="connsiteY1" fmla="*/ 1699491 h 1756327"/>
+              <a:gd name="connsiteX2" fmla="*/ 2753450 w 8175057"/>
+              <a:gd name="connsiteY2" fmla="*/ 1662545 h 1756327"/>
+              <a:gd name="connsiteX3" fmla="*/ 4748505 w 8175057"/>
+              <a:gd name="connsiteY3" fmla="*/ 1542473 h 1756327"/>
+              <a:gd name="connsiteX4" fmla="*/ 6706614 w 8175057"/>
+              <a:gd name="connsiteY4" fmla="*/ 1366982 h 1756327"/>
+              <a:gd name="connsiteX5" fmla="*/ 7602542 w 8175057"/>
+              <a:gd name="connsiteY5" fmla="*/ 1385454 h 1756327"/>
+              <a:gd name="connsiteX6" fmla="*/ 7861160 w 8175057"/>
+              <a:gd name="connsiteY6" fmla="*/ 286327 h 1756327"/>
+              <a:gd name="connsiteX7" fmla="*/ 4415996 w 8175057"/>
+              <a:gd name="connsiteY7" fmla="*/ 304800 h 1756327"/>
+              <a:gd name="connsiteX8" fmla="*/ 2254687 w 8175057"/>
+              <a:gd name="connsiteY8" fmla="*/ 73891 h 1756327"/>
+              <a:gd name="connsiteX9" fmla="*/ 509014 w 8175057"/>
+              <a:gd name="connsiteY9" fmla="*/ 0 h 1756327"/>
+              <a:gd name="connsiteX10" fmla="*/ 47196 w 8175057"/>
+              <a:gd name="connsiteY10" fmla="*/ 498764 h 1756327"/>
+              <a:gd name="connsiteX11" fmla="*/ 84141 w 8175057"/>
+              <a:gd name="connsiteY11" fmla="*/ 1136073 h 1756327"/>
+              <a:gd name="connsiteX0" fmla="*/ 84141 w 8410272"/>
+              <a:gd name="connsiteY0" fmla="*/ 1136073 h 1756327"/>
+              <a:gd name="connsiteX1" fmla="*/ 656796 w 8410272"/>
+              <a:gd name="connsiteY1" fmla="*/ 1699491 h 1756327"/>
+              <a:gd name="connsiteX2" fmla="*/ 2753450 w 8410272"/>
+              <a:gd name="connsiteY2" fmla="*/ 1662545 h 1756327"/>
+              <a:gd name="connsiteX3" fmla="*/ 4748505 w 8410272"/>
+              <a:gd name="connsiteY3" fmla="*/ 1542473 h 1756327"/>
+              <a:gd name="connsiteX4" fmla="*/ 6706614 w 8410272"/>
+              <a:gd name="connsiteY4" fmla="*/ 1366982 h 1756327"/>
+              <a:gd name="connsiteX5" fmla="*/ 7602542 w 8410272"/>
+              <a:gd name="connsiteY5" fmla="*/ 1385454 h 1756327"/>
+              <a:gd name="connsiteX6" fmla="*/ 7861160 w 8410272"/>
+              <a:gd name="connsiteY6" fmla="*/ 286327 h 1756327"/>
+              <a:gd name="connsiteX7" fmla="*/ 4415996 w 8410272"/>
+              <a:gd name="connsiteY7" fmla="*/ 304800 h 1756327"/>
+              <a:gd name="connsiteX8" fmla="*/ 2254687 w 8410272"/>
+              <a:gd name="connsiteY8" fmla="*/ 73891 h 1756327"/>
+              <a:gd name="connsiteX9" fmla="*/ 509014 w 8410272"/>
+              <a:gd name="connsiteY9" fmla="*/ 0 h 1756327"/>
+              <a:gd name="connsiteX10" fmla="*/ 47196 w 8410272"/>
+              <a:gd name="connsiteY10" fmla="*/ 498764 h 1756327"/>
+              <a:gd name="connsiteX11" fmla="*/ 84141 w 8410272"/>
+              <a:gd name="connsiteY11" fmla="*/ 1136073 h 1756327"/>
+              <a:gd name="connsiteX0" fmla="*/ 84141 w 7859441"/>
+              <a:gd name="connsiteY0" fmla="*/ 1136073 h 1756327"/>
+              <a:gd name="connsiteX1" fmla="*/ 656796 w 7859441"/>
+              <a:gd name="connsiteY1" fmla="*/ 1699491 h 1756327"/>
+              <a:gd name="connsiteX2" fmla="*/ 2753450 w 7859441"/>
+              <a:gd name="connsiteY2" fmla="*/ 1662545 h 1756327"/>
+              <a:gd name="connsiteX3" fmla="*/ 4748505 w 7859441"/>
+              <a:gd name="connsiteY3" fmla="*/ 1542473 h 1756327"/>
+              <a:gd name="connsiteX4" fmla="*/ 6706614 w 7859441"/>
+              <a:gd name="connsiteY4" fmla="*/ 1366982 h 1756327"/>
+              <a:gd name="connsiteX5" fmla="*/ 7602542 w 7859441"/>
+              <a:gd name="connsiteY5" fmla="*/ 1385454 h 1756327"/>
+              <a:gd name="connsiteX6" fmla="*/ 7186906 w 7859441"/>
+              <a:gd name="connsiteY6" fmla="*/ 258618 h 1756327"/>
+              <a:gd name="connsiteX7" fmla="*/ 4415996 w 7859441"/>
+              <a:gd name="connsiteY7" fmla="*/ 304800 h 1756327"/>
+              <a:gd name="connsiteX8" fmla="*/ 2254687 w 7859441"/>
+              <a:gd name="connsiteY8" fmla="*/ 73891 h 1756327"/>
+              <a:gd name="connsiteX9" fmla="*/ 509014 w 7859441"/>
+              <a:gd name="connsiteY9" fmla="*/ 0 h 1756327"/>
+              <a:gd name="connsiteX10" fmla="*/ 47196 w 7859441"/>
+              <a:gd name="connsiteY10" fmla="*/ 498764 h 1756327"/>
+              <a:gd name="connsiteX11" fmla="*/ 84141 w 7859441"/>
+              <a:gd name="connsiteY11" fmla="*/ 1136073 h 1756327"/>
+              <a:gd name="connsiteX0" fmla="*/ 84141 w 7941042"/>
+              <a:gd name="connsiteY0" fmla="*/ 1136073 h 1756327"/>
+              <a:gd name="connsiteX1" fmla="*/ 656796 w 7941042"/>
+              <a:gd name="connsiteY1" fmla="*/ 1699491 h 1756327"/>
+              <a:gd name="connsiteX2" fmla="*/ 2753450 w 7941042"/>
+              <a:gd name="connsiteY2" fmla="*/ 1662545 h 1756327"/>
+              <a:gd name="connsiteX3" fmla="*/ 4748505 w 7941042"/>
+              <a:gd name="connsiteY3" fmla="*/ 1542473 h 1756327"/>
+              <a:gd name="connsiteX4" fmla="*/ 6706614 w 7941042"/>
+              <a:gd name="connsiteY4" fmla="*/ 1366982 h 1756327"/>
+              <a:gd name="connsiteX5" fmla="*/ 7925815 w 7941042"/>
+              <a:gd name="connsiteY5" fmla="*/ 1200727 h 1756327"/>
+              <a:gd name="connsiteX6" fmla="*/ 7186906 w 7941042"/>
+              <a:gd name="connsiteY6" fmla="*/ 258618 h 1756327"/>
+              <a:gd name="connsiteX7" fmla="*/ 4415996 w 7941042"/>
+              <a:gd name="connsiteY7" fmla="*/ 304800 h 1756327"/>
+              <a:gd name="connsiteX8" fmla="*/ 2254687 w 7941042"/>
+              <a:gd name="connsiteY8" fmla="*/ 73891 h 1756327"/>
+              <a:gd name="connsiteX9" fmla="*/ 509014 w 7941042"/>
+              <a:gd name="connsiteY9" fmla="*/ 0 h 1756327"/>
+              <a:gd name="connsiteX10" fmla="*/ 47196 w 7941042"/>
+              <a:gd name="connsiteY10" fmla="*/ 498764 h 1756327"/>
+              <a:gd name="connsiteX11" fmla="*/ 84141 w 7941042"/>
+              <a:gd name="connsiteY11" fmla="*/ 1136073 h 1756327"/>
+              <a:gd name="connsiteX0" fmla="*/ 84141 w 7941042"/>
+              <a:gd name="connsiteY0" fmla="*/ 1136073 h 1756327"/>
+              <a:gd name="connsiteX1" fmla="*/ 656796 w 7941042"/>
+              <a:gd name="connsiteY1" fmla="*/ 1699491 h 1756327"/>
+              <a:gd name="connsiteX2" fmla="*/ 2753450 w 7941042"/>
+              <a:gd name="connsiteY2" fmla="*/ 1662545 h 1756327"/>
+              <a:gd name="connsiteX3" fmla="*/ 4748505 w 7941042"/>
+              <a:gd name="connsiteY3" fmla="*/ 1542473 h 1756327"/>
+              <a:gd name="connsiteX4" fmla="*/ 6706614 w 7941042"/>
+              <a:gd name="connsiteY4" fmla="*/ 1366982 h 1756327"/>
+              <a:gd name="connsiteX5" fmla="*/ 7925815 w 7941042"/>
+              <a:gd name="connsiteY5" fmla="*/ 1200727 h 1756327"/>
+              <a:gd name="connsiteX6" fmla="*/ 7186906 w 7941042"/>
+              <a:gd name="connsiteY6" fmla="*/ 258618 h 1756327"/>
+              <a:gd name="connsiteX7" fmla="*/ 4415996 w 7941042"/>
+              <a:gd name="connsiteY7" fmla="*/ 304800 h 1756327"/>
+              <a:gd name="connsiteX8" fmla="*/ 2254687 w 7941042"/>
+              <a:gd name="connsiteY8" fmla="*/ 73891 h 1756327"/>
+              <a:gd name="connsiteX9" fmla="*/ 509014 w 7941042"/>
+              <a:gd name="connsiteY9" fmla="*/ 0 h 1756327"/>
+              <a:gd name="connsiteX10" fmla="*/ 47196 w 7941042"/>
+              <a:gd name="connsiteY10" fmla="*/ 498764 h 1756327"/>
+              <a:gd name="connsiteX11" fmla="*/ 84141 w 7941042"/>
+              <a:gd name="connsiteY11" fmla="*/ 1136073 h 1756327"/>
+              <a:gd name="connsiteX0" fmla="*/ 84141 w 7941042"/>
+              <a:gd name="connsiteY0" fmla="*/ 1165891 h 1786145"/>
+              <a:gd name="connsiteX1" fmla="*/ 656796 w 7941042"/>
+              <a:gd name="connsiteY1" fmla="*/ 1729309 h 1786145"/>
+              <a:gd name="connsiteX2" fmla="*/ 2753450 w 7941042"/>
+              <a:gd name="connsiteY2" fmla="*/ 1692363 h 1786145"/>
+              <a:gd name="connsiteX3" fmla="*/ 4748505 w 7941042"/>
+              <a:gd name="connsiteY3" fmla="*/ 1572291 h 1786145"/>
+              <a:gd name="connsiteX4" fmla="*/ 6706614 w 7941042"/>
+              <a:gd name="connsiteY4" fmla="*/ 1396800 h 1786145"/>
+              <a:gd name="connsiteX5" fmla="*/ 7925815 w 7941042"/>
+              <a:gd name="connsiteY5" fmla="*/ 1230545 h 1786145"/>
+              <a:gd name="connsiteX6" fmla="*/ 7186906 w 7941042"/>
+              <a:gd name="connsiteY6" fmla="*/ 288436 h 1786145"/>
+              <a:gd name="connsiteX7" fmla="*/ 4415996 w 7941042"/>
+              <a:gd name="connsiteY7" fmla="*/ 334618 h 1786145"/>
+              <a:gd name="connsiteX8" fmla="*/ 2254687 w 7941042"/>
+              <a:gd name="connsiteY8" fmla="*/ 103709 h 1786145"/>
+              <a:gd name="connsiteX9" fmla="*/ 509014 w 7941042"/>
+              <a:gd name="connsiteY9" fmla="*/ 29818 h 1786145"/>
+              <a:gd name="connsiteX10" fmla="*/ 47196 w 7941042"/>
+              <a:gd name="connsiteY10" fmla="*/ 528582 h 1786145"/>
+              <a:gd name="connsiteX11" fmla="*/ 84141 w 7941042"/>
+              <a:gd name="connsiteY11" fmla="*/ 1165891 h 1786145"/>
+              <a:gd name="connsiteX0" fmla="*/ 84141 w 7941042"/>
+              <a:gd name="connsiteY0" fmla="*/ 1161560 h 1781814"/>
+              <a:gd name="connsiteX1" fmla="*/ 656796 w 7941042"/>
+              <a:gd name="connsiteY1" fmla="*/ 1724978 h 1781814"/>
+              <a:gd name="connsiteX2" fmla="*/ 2753450 w 7941042"/>
+              <a:gd name="connsiteY2" fmla="*/ 1688032 h 1781814"/>
+              <a:gd name="connsiteX3" fmla="*/ 4748505 w 7941042"/>
+              <a:gd name="connsiteY3" fmla="*/ 1567960 h 1781814"/>
+              <a:gd name="connsiteX4" fmla="*/ 6706614 w 7941042"/>
+              <a:gd name="connsiteY4" fmla="*/ 1392469 h 1781814"/>
+              <a:gd name="connsiteX5" fmla="*/ 7925815 w 7941042"/>
+              <a:gd name="connsiteY5" fmla="*/ 1226214 h 1781814"/>
+              <a:gd name="connsiteX6" fmla="*/ 7186906 w 7941042"/>
+              <a:gd name="connsiteY6" fmla="*/ 284105 h 1781814"/>
+              <a:gd name="connsiteX7" fmla="*/ 4415996 w 7941042"/>
+              <a:gd name="connsiteY7" fmla="*/ 330287 h 1781814"/>
+              <a:gd name="connsiteX8" fmla="*/ 2254687 w 7941042"/>
+              <a:gd name="connsiteY8" fmla="*/ 99378 h 1781814"/>
+              <a:gd name="connsiteX9" fmla="*/ 509014 w 7941042"/>
+              <a:gd name="connsiteY9" fmla="*/ 25487 h 1781814"/>
+              <a:gd name="connsiteX10" fmla="*/ 47196 w 7941042"/>
+              <a:gd name="connsiteY10" fmla="*/ 524251 h 1781814"/>
+              <a:gd name="connsiteX11" fmla="*/ 84141 w 7941042"/>
+              <a:gd name="connsiteY11" fmla="*/ 1161560 h 1781814"/>
+              <a:gd name="connsiteX0" fmla="*/ 42319 w 8028529"/>
+              <a:gd name="connsiteY0" fmla="*/ 1161560 h 1763361"/>
+              <a:gd name="connsiteX1" fmla="*/ 744283 w 8028529"/>
+              <a:gd name="connsiteY1" fmla="*/ 1724978 h 1763361"/>
+              <a:gd name="connsiteX2" fmla="*/ 2840937 w 8028529"/>
+              <a:gd name="connsiteY2" fmla="*/ 1688032 h 1763361"/>
+              <a:gd name="connsiteX3" fmla="*/ 4835992 w 8028529"/>
+              <a:gd name="connsiteY3" fmla="*/ 1567960 h 1763361"/>
+              <a:gd name="connsiteX4" fmla="*/ 6794101 w 8028529"/>
+              <a:gd name="connsiteY4" fmla="*/ 1392469 h 1763361"/>
+              <a:gd name="connsiteX5" fmla="*/ 8013302 w 8028529"/>
+              <a:gd name="connsiteY5" fmla="*/ 1226214 h 1763361"/>
+              <a:gd name="connsiteX6" fmla="*/ 7274393 w 8028529"/>
+              <a:gd name="connsiteY6" fmla="*/ 284105 h 1763361"/>
+              <a:gd name="connsiteX7" fmla="*/ 4503483 w 8028529"/>
+              <a:gd name="connsiteY7" fmla="*/ 330287 h 1763361"/>
+              <a:gd name="connsiteX8" fmla="*/ 2342174 w 8028529"/>
+              <a:gd name="connsiteY8" fmla="*/ 99378 h 1763361"/>
+              <a:gd name="connsiteX9" fmla="*/ 596501 w 8028529"/>
+              <a:gd name="connsiteY9" fmla="*/ 25487 h 1763361"/>
+              <a:gd name="connsiteX10" fmla="*/ 134683 w 8028529"/>
+              <a:gd name="connsiteY10" fmla="*/ 524251 h 1763361"/>
+              <a:gd name="connsiteX11" fmla="*/ 42319 w 8028529"/>
+              <a:gd name="connsiteY11" fmla="*/ 1161560 h 1763361"/>
+              <a:gd name="connsiteX0" fmla="*/ 18118 w 8004328"/>
+              <a:gd name="connsiteY0" fmla="*/ 1161560 h 1763361"/>
+              <a:gd name="connsiteX1" fmla="*/ 720082 w 8004328"/>
+              <a:gd name="connsiteY1" fmla="*/ 1724978 h 1763361"/>
+              <a:gd name="connsiteX2" fmla="*/ 2816736 w 8004328"/>
+              <a:gd name="connsiteY2" fmla="*/ 1688032 h 1763361"/>
+              <a:gd name="connsiteX3" fmla="*/ 4811791 w 8004328"/>
+              <a:gd name="connsiteY3" fmla="*/ 1567960 h 1763361"/>
+              <a:gd name="connsiteX4" fmla="*/ 6769900 w 8004328"/>
+              <a:gd name="connsiteY4" fmla="*/ 1392469 h 1763361"/>
+              <a:gd name="connsiteX5" fmla="*/ 7989101 w 8004328"/>
+              <a:gd name="connsiteY5" fmla="*/ 1226214 h 1763361"/>
+              <a:gd name="connsiteX6" fmla="*/ 7250192 w 8004328"/>
+              <a:gd name="connsiteY6" fmla="*/ 284105 h 1763361"/>
+              <a:gd name="connsiteX7" fmla="*/ 4479282 w 8004328"/>
+              <a:gd name="connsiteY7" fmla="*/ 330287 h 1763361"/>
+              <a:gd name="connsiteX8" fmla="*/ 2317973 w 8004328"/>
+              <a:gd name="connsiteY8" fmla="*/ 99378 h 1763361"/>
+              <a:gd name="connsiteX9" fmla="*/ 572300 w 8004328"/>
+              <a:gd name="connsiteY9" fmla="*/ 25487 h 1763361"/>
+              <a:gd name="connsiteX10" fmla="*/ 110482 w 8004328"/>
+              <a:gd name="connsiteY10" fmla="*/ 524251 h 1763361"/>
+              <a:gd name="connsiteX11" fmla="*/ 18118 w 8004328"/>
+              <a:gd name="connsiteY11" fmla="*/ 1161560 h 1763361"/>
+              <a:gd name="connsiteX0" fmla="*/ 18118 w 8013231"/>
+              <a:gd name="connsiteY0" fmla="*/ 1161560 h 1763361"/>
+              <a:gd name="connsiteX1" fmla="*/ 720082 w 8013231"/>
+              <a:gd name="connsiteY1" fmla="*/ 1724978 h 1763361"/>
+              <a:gd name="connsiteX2" fmla="*/ 2816736 w 8013231"/>
+              <a:gd name="connsiteY2" fmla="*/ 1688032 h 1763361"/>
+              <a:gd name="connsiteX3" fmla="*/ 4811791 w 8013231"/>
+              <a:gd name="connsiteY3" fmla="*/ 1567960 h 1763361"/>
+              <a:gd name="connsiteX4" fmla="*/ 6769900 w 8013231"/>
+              <a:gd name="connsiteY4" fmla="*/ 1392469 h 1763361"/>
+              <a:gd name="connsiteX5" fmla="*/ 7998338 w 8013231"/>
+              <a:gd name="connsiteY5" fmla="*/ 1023014 h 1763361"/>
+              <a:gd name="connsiteX6" fmla="*/ 7250192 w 8013231"/>
+              <a:gd name="connsiteY6" fmla="*/ 284105 h 1763361"/>
+              <a:gd name="connsiteX7" fmla="*/ 4479282 w 8013231"/>
+              <a:gd name="connsiteY7" fmla="*/ 330287 h 1763361"/>
+              <a:gd name="connsiteX8" fmla="*/ 2317973 w 8013231"/>
+              <a:gd name="connsiteY8" fmla="*/ 99378 h 1763361"/>
+              <a:gd name="connsiteX9" fmla="*/ 572300 w 8013231"/>
+              <a:gd name="connsiteY9" fmla="*/ 25487 h 1763361"/>
+              <a:gd name="connsiteX10" fmla="*/ 110482 w 8013231"/>
+              <a:gd name="connsiteY10" fmla="*/ 524251 h 1763361"/>
+              <a:gd name="connsiteX11" fmla="*/ 18118 w 8013231"/>
+              <a:gd name="connsiteY11" fmla="*/ 1161560 h 1763361"/>
+              <a:gd name="connsiteX0" fmla="*/ 18118 w 7999803"/>
+              <a:gd name="connsiteY0" fmla="*/ 1161560 h 1763361"/>
+              <a:gd name="connsiteX1" fmla="*/ 720082 w 7999803"/>
+              <a:gd name="connsiteY1" fmla="*/ 1724978 h 1763361"/>
+              <a:gd name="connsiteX2" fmla="*/ 2816736 w 7999803"/>
+              <a:gd name="connsiteY2" fmla="*/ 1688032 h 1763361"/>
+              <a:gd name="connsiteX3" fmla="*/ 4811791 w 7999803"/>
+              <a:gd name="connsiteY3" fmla="*/ 1567960 h 1763361"/>
+              <a:gd name="connsiteX4" fmla="*/ 7130118 w 7999803"/>
+              <a:gd name="connsiteY4" fmla="*/ 1512542 h 1763361"/>
+              <a:gd name="connsiteX5" fmla="*/ 7998338 w 7999803"/>
+              <a:gd name="connsiteY5" fmla="*/ 1023014 h 1763361"/>
+              <a:gd name="connsiteX6" fmla="*/ 7250192 w 7999803"/>
+              <a:gd name="connsiteY6" fmla="*/ 284105 h 1763361"/>
+              <a:gd name="connsiteX7" fmla="*/ 4479282 w 7999803"/>
+              <a:gd name="connsiteY7" fmla="*/ 330287 h 1763361"/>
+              <a:gd name="connsiteX8" fmla="*/ 2317973 w 7999803"/>
+              <a:gd name="connsiteY8" fmla="*/ 99378 h 1763361"/>
+              <a:gd name="connsiteX9" fmla="*/ 572300 w 7999803"/>
+              <a:gd name="connsiteY9" fmla="*/ 25487 h 1763361"/>
+              <a:gd name="connsiteX10" fmla="*/ 110482 w 7999803"/>
+              <a:gd name="connsiteY10" fmla="*/ 524251 h 1763361"/>
+              <a:gd name="connsiteX11" fmla="*/ 18118 w 7999803"/>
+              <a:gd name="connsiteY11" fmla="*/ 1161560 h 1763361"/>
+            </a:gdLst>
+            <a:ahLst/>
+            <a:cxnLst>
+              <a:cxn ang="0">
+                <a:pos x="connsiteX0" y="connsiteY0"/>
+              </a:cxn>
+              <a:cxn ang="0">
+                <a:pos x="connsiteX1" y="connsiteY1"/>
+              </a:cxn>
+              <a:cxn ang="0">
+                <a:pos x="connsiteX2" y="connsiteY2"/>
+              </a:cxn>
+              <a:cxn ang="0">
+                <a:pos x="connsiteX3" y="connsiteY3"/>
+              </a:cxn>
+              <a:cxn ang="0">
+                <a:pos x="connsiteX4" y="connsiteY4"/>
+              </a:cxn>
+              <a:cxn ang="0">
+                <a:pos x="connsiteX5" y="connsiteY5"/>
+              </a:cxn>
+              <a:cxn ang="0">
+                <a:pos x="connsiteX6" y="connsiteY6"/>
+              </a:cxn>
+              <a:cxn ang="0">
+                <a:pos x="connsiteX7" y="connsiteY7"/>
+              </a:cxn>
+              <a:cxn ang="0">
+                <a:pos x="connsiteX8" y="connsiteY8"/>
+              </a:cxn>
+              <a:cxn ang="0">
+                <a:pos x="connsiteX9" y="connsiteY9"/>
+              </a:cxn>
+              <a:cxn ang="0">
+                <a:pos x="connsiteX10" y="connsiteY10"/>
+              </a:cxn>
+              <a:cxn ang="0">
+                <a:pos x="connsiteX11" y="connsiteY11"/>
+              </a:cxn>
+            </a:cxnLst>
+            <a:rect l="l" t="t" r="r" b="b"/>
+            <a:pathLst>
+              <a:path w="7999803" h="1763361">
+                <a:moveTo>
+                  <a:pt x="18118" y="1161560"/>
+                </a:moveTo>
+                <a:cubicBezTo>
+                  <a:pt x="64300" y="1361681"/>
+                  <a:pt x="253646" y="1637233"/>
+                  <a:pt x="720082" y="1724978"/>
+                </a:cubicBezTo>
+                <a:cubicBezTo>
+                  <a:pt x="1186518" y="1812723"/>
+                  <a:pt x="2151718" y="1728056"/>
+                  <a:pt x="2816736" y="1688032"/>
+                </a:cubicBezTo>
+                <a:cubicBezTo>
+                  <a:pt x="3481754" y="1648008"/>
+                  <a:pt x="4092894" y="1597208"/>
+                  <a:pt x="4811791" y="1567960"/>
+                </a:cubicBezTo>
+                <a:cubicBezTo>
+                  <a:pt x="5530688" y="1538712"/>
+                  <a:pt x="6599027" y="1603366"/>
+                  <a:pt x="7130118" y="1512542"/>
+                </a:cubicBezTo>
+                <a:cubicBezTo>
+                  <a:pt x="7661209" y="1421718"/>
+                  <a:pt x="7978326" y="1227753"/>
+                  <a:pt x="7998338" y="1023014"/>
+                </a:cubicBezTo>
+                <a:cubicBezTo>
+                  <a:pt x="8018350" y="818275"/>
+                  <a:pt x="7836701" y="399560"/>
+                  <a:pt x="7250192" y="284105"/>
+                </a:cubicBezTo>
+                <a:cubicBezTo>
+                  <a:pt x="6663683" y="168651"/>
+                  <a:pt x="5199718" y="407257"/>
+                  <a:pt x="4479282" y="330287"/>
+                </a:cubicBezTo>
+                <a:lnTo>
+                  <a:pt x="2317973" y="99378"/>
+                </a:lnTo>
+                <a:cubicBezTo>
+                  <a:pt x="1666809" y="48578"/>
+                  <a:pt x="940215" y="-45325"/>
+                  <a:pt x="572300" y="25487"/>
+                </a:cubicBezTo>
+                <a:cubicBezTo>
+                  <a:pt x="204385" y="96299"/>
+                  <a:pt x="202846" y="334906"/>
+                  <a:pt x="110482" y="524251"/>
+                </a:cubicBezTo>
+                <a:cubicBezTo>
+                  <a:pt x="18118" y="713596"/>
+                  <a:pt x="-28064" y="961439"/>
+                  <a:pt x="18118" y="1161560"/>
+                </a:cubicBezTo>
+                <a:close/>
+              </a:path>
+            </a:pathLst>
+          </a:custGeom>
+          <a:solidFill>
+            <a:schemeClr val="accent2">
+              <a:lumMod val="20000"/>
+              <a:lumOff val="80000"/>
+            </a:schemeClr>
+          </a:solidFill>
+        </p:spPr>
+        <p:style>
+          <a:lnRef idx="2">
+            <a:schemeClr val="accent1">
+              <a:shade val="50000"/>
+            </a:schemeClr>
+          </a:lnRef>
+          <a:fillRef idx="1">
+            <a:schemeClr val="accent1"/>
+          </a:fillRef>
+          <a:effectRef idx="0">
+            <a:schemeClr val="accent1"/>
+          </a:effectRef>
+          <a:fontRef idx="minor">
+            <a:schemeClr val="lt1"/>
+          </a:fontRef>
+        </p:style>
+        <p:txBody>
+          <a:bodyPr rtlCol="0" anchor="ctr"/>
+          <a:lstStyle/>
+          <a:p>
+            <a:pPr algn="ctr"/>
+            <a:endParaRPr lang="fr-FR"/>
+          </a:p>
+        </p:txBody>
+      </p:sp>
+      <p:sp>
+        <p:nvSpPr>
+          <p:cNvPr id="37" name="Forme libre 36"/>
+          <p:cNvSpPr/>
+          <p:nvPr/>
+        </p:nvSpPr>
+        <p:spPr>
+          <a:xfrm>
+            <a:off x="793333" y="1170134"/>
+            <a:ext cx="11396657" cy="4585480"/>
+          </a:xfrm>
+          <a:custGeom>
+            <a:avLst/>
+            <a:gdLst>
+              <a:gd name="connsiteX0" fmla="*/ 295564 w 11379378"/>
+              <a:gd name="connsiteY0" fmla="*/ 2059709 h 4544291"/>
+              <a:gd name="connsiteX1" fmla="*/ 1357746 w 11379378"/>
+              <a:gd name="connsiteY1" fmla="*/ 2373745 h 4544291"/>
+              <a:gd name="connsiteX2" fmla="*/ 2521528 w 11379378"/>
+              <a:gd name="connsiteY2" fmla="*/ 3177309 h 4544291"/>
+              <a:gd name="connsiteX3" fmla="*/ 3851564 w 11379378"/>
+              <a:gd name="connsiteY3" fmla="*/ 3833091 h 4544291"/>
+              <a:gd name="connsiteX4" fmla="*/ 5135418 w 11379378"/>
+              <a:gd name="connsiteY4" fmla="*/ 4193309 h 4544291"/>
+              <a:gd name="connsiteX5" fmla="*/ 6899564 w 11379378"/>
+              <a:gd name="connsiteY5" fmla="*/ 4424218 h 4544291"/>
+              <a:gd name="connsiteX6" fmla="*/ 9134764 w 11379378"/>
+              <a:gd name="connsiteY6" fmla="*/ 4544291 h 4544291"/>
+              <a:gd name="connsiteX7" fmla="*/ 10677237 w 11379378"/>
+              <a:gd name="connsiteY7" fmla="*/ 4350327 h 4544291"/>
+              <a:gd name="connsiteX8" fmla="*/ 11342255 w 11379378"/>
+              <a:gd name="connsiteY8" fmla="*/ 4221018 h 4544291"/>
+              <a:gd name="connsiteX9" fmla="*/ 11305309 w 11379378"/>
+              <a:gd name="connsiteY9" fmla="*/ 3177309 h 4544291"/>
+              <a:gd name="connsiteX10" fmla="*/ 10908146 w 11379378"/>
+              <a:gd name="connsiteY10" fmla="*/ 2530763 h 4544291"/>
+              <a:gd name="connsiteX11" fmla="*/ 11046691 w 11379378"/>
+              <a:gd name="connsiteY11" fmla="*/ 1736436 h 4544291"/>
+              <a:gd name="connsiteX12" fmla="*/ 11342255 w 11379378"/>
+              <a:gd name="connsiteY12" fmla="*/ 1459345 h 4544291"/>
+              <a:gd name="connsiteX13" fmla="*/ 11369964 w 11379378"/>
+              <a:gd name="connsiteY13" fmla="*/ 1311563 h 4544291"/>
+              <a:gd name="connsiteX14" fmla="*/ 11379200 w 11379378"/>
+              <a:gd name="connsiteY14" fmla="*/ 1246909 h 4544291"/>
+              <a:gd name="connsiteX15" fmla="*/ 11369964 w 11379378"/>
+              <a:gd name="connsiteY15" fmla="*/ 1071418 h 4544291"/>
+              <a:gd name="connsiteX16" fmla="*/ 11333018 w 11379378"/>
+              <a:gd name="connsiteY16" fmla="*/ 1016000 h 4544291"/>
+              <a:gd name="connsiteX17" fmla="*/ 11314546 w 11379378"/>
+              <a:gd name="connsiteY17" fmla="*/ 988291 h 4544291"/>
+              <a:gd name="connsiteX18" fmla="*/ 11296073 w 11379378"/>
+              <a:gd name="connsiteY18" fmla="*/ 960581 h 4544291"/>
+              <a:gd name="connsiteX19" fmla="*/ 11305309 w 11379378"/>
+              <a:gd name="connsiteY19" fmla="*/ 794327 h 4544291"/>
+              <a:gd name="connsiteX20" fmla="*/ 11351491 w 11379378"/>
+              <a:gd name="connsiteY20" fmla="*/ 785091 h 4544291"/>
+              <a:gd name="connsiteX21" fmla="*/ 11360728 w 11379378"/>
+              <a:gd name="connsiteY21" fmla="*/ 757381 h 4544291"/>
+              <a:gd name="connsiteX22" fmla="*/ 11296073 w 11379378"/>
+              <a:gd name="connsiteY22" fmla="*/ 738909 h 4544291"/>
+              <a:gd name="connsiteX23" fmla="*/ 11296073 w 11379378"/>
+              <a:gd name="connsiteY23" fmla="*/ 738909 h 4544291"/>
+              <a:gd name="connsiteX24" fmla="*/ 9337964 w 11379378"/>
+              <a:gd name="connsiteY24" fmla="*/ 766618 h 4544291"/>
+              <a:gd name="connsiteX25" fmla="*/ 7130473 w 11379378"/>
+              <a:gd name="connsiteY25" fmla="*/ 729672 h 4544291"/>
+              <a:gd name="connsiteX26" fmla="*/ 4784437 w 11379378"/>
+              <a:gd name="connsiteY26" fmla="*/ 895927 h 4544291"/>
+              <a:gd name="connsiteX27" fmla="*/ 3768437 w 11379378"/>
+              <a:gd name="connsiteY27" fmla="*/ 711200 h 4544291"/>
+              <a:gd name="connsiteX28" fmla="*/ 3103418 w 11379378"/>
+              <a:gd name="connsiteY28" fmla="*/ 378691 h 4544291"/>
+              <a:gd name="connsiteX29" fmla="*/ 2309091 w 11379378"/>
+              <a:gd name="connsiteY29" fmla="*/ 0 h 4544291"/>
+              <a:gd name="connsiteX30" fmla="*/ 1431637 w 11379378"/>
+              <a:gd name="connsiteY30" fmla="*/ 110836 h 4544291"/>
+              <a:gd name="connsiteX31" fmla="*/ 1034473 w 11379378"/>
+              <a:gd name="connsiteY31" fmla="*/ 720436 h 4544291"/>
+              <a:gd name="connsiteX32" fmla="*/ 323273 w 11379378"/>
+              <a:gd name="connsiteY32" fmla="*/ 997527 h 4544291"/>
+              <a:gd name="connsiteX33" fmla="*/ 0 w 11379378"/>
+              <a:gd name="connsiteY33" fmla="*/ 1524000 h 4544291"/>
+              <a:gd name="connsiteX34" fmla="*/ 295564 w 11379378"/>
+              <a:gd name="connsiteY34" fmla="*/ 2059709 h 4544291"/>
+              <a:gd name="connsiteX0" fmla="*/ 295564 w 11379378"/>
+              <a:gd name="connsiteY0" fmla="*/ 2059709 h 4544291"/>
+              <a:gd name="connsiteX1" fmla="*/ 1357746 w 11379378"/>
+              <a:gd name="connsiteY1" fmla="*/ 2373745 h 4544291"/>
+              <a:gd name="connsiteX2" fmla="*/ 2521528 w 11379378"/>
+              <a:gd name="connsiteY2" fmla="*/ 3177309 h 4544291"/>
+              <a:gd name="connsiteX3" fmla="*/ 3851564 w 11379378"/>
+              <a:gd name="connsiteY3" fmla="*/ 3833091 h 4544291"/>
+              <a:gd name="connsiteX4" fmla="*/ 5135418 w 11379378"/>
+              <a:gd name="connsiteY4" fmla="*/ 4193309 h 4544291"/>
+              <a:gd name="connsiteX5" fmla="*/ 6899564 w 11379378"/>
+              <a:gd name="connsiteY5" fmla="*/ 4424218 h 4544291"/>
+              <a:gd name="connsiteX6" fmla="*/ 9134764 w 11379378"/>
+              <a:gd name="connsiteY6" fmla="*/ 4544291 h 4544291"/>
+              <a:gd name="connsiteX7" fmla="*/ 10677237 w 11379378"/>
+              <a:gd name="connsiteY7" fmla="*/ 4350327 h 4544291"/>
+              <a:gd name="connsiteX8" fmla="*/ 11342255 w 11379378"/>
+              <a:gd name="connsiteY8" fmla="*/ 4221018 h 4544291"/>
+              <a:gd name="connsiteX9" fmla="*/ 11305309 w 11379378"/>
+              <a:gd name="connsiteY9" fmla="*/ 3177309 h 4544291"/>
+              <a:gd name="connsiteX10" fmla="*/ 10908146 w 11379378"/>
+              <a:gd name="connsiteY10" fmla="*/ 2530763 h 4544291"/>
+              <a:gd name="connsiteX11" fmla="*/ 11046691 w 11379378"/>
+              <a:gd name="connsiteY11" fmla="*/ 1736436 h 4544291"/>
+              <a:gd name="connsiteX12" fmla="*/ 11342255 w 11379378"/>
+              <a:gd name="connsiteY12" fmla="*/ 1459345 h 4544291"/>
+              <a:gd name="connsiteX13" fmla="*/ 11369964 w 11379378"/>
+              <a:gd name="connsiteY13" fmla="*/ 1311563 h 4544291"/>
+              <a:gd name="connsiteX14" fmla="*/ 11379200 w 11379378"/>
+              <a:gd name="connsiteY14" fmla="*/ 1246909 h 4544291"/>
+              <a:gd name="connsiteX15" fmla="*/ 11369964 w 11379378"/>
+              <a:gd name="connsiteY15" fmla="*/ 1071418 h 4544291"/>
+              <a:gd name="connsiteX16" fmla="*/ 11333018 w 11379378"/>
+              <a:gd name="connsiteY16" fmla="*/ 1016000 h 4544291"/>
+              <a:gd name="connsiteX17" fmla="*/ 11314546 w 11379378"/>
+              <a:gd name="connsiteY17" fmla="*/ 988291 h 4544291"/>
+              <a:gd name="connsiteX18" fmla="*/ 11305309 w 11379378"/>
+              <a:gd name="connsiteY18" fmla="*/ 794327 h 4544291"/>
+              <a:gd name="connsiteX19" fmla="*/ 11351491 w 11379378"/>
+              <a:gd name="connsiteY19" fmla="*/ 785091 h 4544291"/>
+              <a:gd name="connsiteX20" fmla="*/ 11360728 w 11379378"/>
+              <a:gd name="connsiteY20" fmla="*/ 757381 h 4544291"/>
+              <a:gd name="connsiteX21" fmla="*/ 11296073 w 11379378"/>
+              <a:gd name="connsiteY21" fmla="*/ 738909 h 4544291"/>
+              <a:gd name="connsiteX22" fmla="*/ 11296073 w 11379378"/>
+              <a:gd name="connsiteY22" fmla="*/ 738909 h 4544291"/>
+              <a:gd name="connsiteX23" fmla="*/ 9337964 w 11379378"/>
+              <a:gd name="connsiteY23" fmla="*/ 766618 h 4544291"/>
+              <a:gd name="connsiteX24" fmla="*/ 7130473 w 11379378"/>
+              <a:gd name="connsiteY24" fmla="*/ 729672 h 4544291"/>
+              <a:gd name="connsiteX25" fmla="*/ 4784437 w 11379378"/>
+              <a:gd name="connsiteY25" fmla="*/ 895927 h 4544291"/>
+              <a:gd name="connsiteX26" fmla="*/ 3768437 w 11379378"/>
+              <a:gd name="connsiteY26" fmla="*/ 711200 h 4544291"/>
+              <a:gd name="connsiteX27" fmla="*/ 3103418 w 11379378"/>
+              <a:gd name="connsiteY27" fmla="*/ 378691 h 4544291"/>
+              <a:gd name="connsiteX28" fmla="*/ 2309091 w 11379378"/>
+              <a:gd name="connsiteY28" fmla="*/ 0 h 4544291"/>
+              <a:gd name="connsiteX29" fmla="*/ 1431637 w 11379378"/>
+              <a:gd name="connsiteY29" fmla="*/ 110836 h 4544291"/>
+              <a:gd name="connsiteX30" fmla="*/ 1034473 w 11379378"/>
+              <a:gd name="connsiteY30" fmla="*/ 720436 h 4544291"/>
+              <a:gd name="connsiteX31" fmla="*/ 323273 w 11379378"/>
+              <a:gd name="connsiteY31" fmla="*/ 997527 h 4544291"/>
+              <a:gd name="connsiteX32" fmla="*/ 0 w 11379378"/>
+              <a:gd name="connsiteY32" fmla="*/ 1524000 h 4544291"/>
+              <a:gd name="connsiteX33" fmla="*/ 295564 w 11379378"/>
+              <a:gd name="connsiteY33" fmla="*/ 2059709 h 4544291"/>
+              <a:gd name="connsiteX0" fmla="*/ 295564 w 11379378"/>
+              <a:gd name="connsiteY0" fmla="*/ 2059709 h 4544291"/>
+              <a:gd name="connsiteX1" fmla="*/ 1357746 w 11379378"/>
+              <a:gd name="connsiteY1" fmla="*/ 2373745 h 4544291"/>
+              <a:gd name="connsiteX2" fmla="*/ 2521528 w 11379378"/>
+              <a:gd name="connsiteY2" fmla="*/ 3177309 h 4544291"/>
+              <a:gd name="connsiteX3" fmla="*/ 3851564 w 11379378"/>
+              <a:gd name="connsiteY3" fmla="*/ 3833091 h 4544291"/>
+              <a:gd name="connsiteX4" fmla="*/ 5135418 w 11379378"/>
+              <a:gd name="connsiteY4" fmla="*/ 4193309 h 4544291"/>
+              <a:gd name="connsiteX5" fmla="*/ 6899564 w 11379378"/>
+              <a:gd name="connsiteY5" fmla="*/ 4424218 h 4544291"/>
+              <a:gd name="connsiteX6" fmla="*/ 9134764 w 11379378"/>
+              <a:gd name="connsiteY6" fmla="*/ 4544291 h 4544291"/>
+              <a:gd name="connsiteX7" fmla="*/ 10677237 w 11379378"/>
+              <a:gd name="connsiteY7" fmla="*/ 4350327 h 4544291"/>
+              <a:gd name="connsiteX8" fmla="*/ 11342255 w 11379378"/>
+              <a:gd name="connsiteY8" fmla="*/ 4221018 h 4544291"/>
+              <a:gd name="connsiteX9" fmla="*/ 11305309 w 11379378"/>
+              <a:gd name="connsiteY9" fmla="*/ 3177309 h 4544291"/>
+              <a:gd name="connsiteX10" fmla="*/ 10908146 w 11379378"/>
+              <a:gd name="connsiteY10" fmla="*/ 2530763 h 4544291"/>
+              <a:gd name="connsiteX11" fmla="*/ 11046691 w 11379378"/>
+              <a:gd name="connsiteY11" fmla="*/ 1736436 h 4544291"/>
+              <a:gd name="connsiteX12" fmla="*/ 11342255 w 11379378"/>
+              <a:gd name="connsiteY12" fmla="*/ 1459345 h 4544291"/>
+              <a:gd name="connsiteX13" fmla="*/ 11369964 w 11379378"/>
+              <a:gd name="connsiteY13" fmla="*/ 1311563 h 4544291"/>
+              <a:gd name="connsiteX14" fmla="*/ 11379200 w 11379378"/>
+              <a:gd name="connsiteY14" fmla="*/ 1246909 h 4544291"/>
+              <a:gd name="connsiteX15" fmla="*/ 11369964 w 11379378"/>
+              <a:gd name="connsiteY15" fmla="*/ 1071418 h 4544291"/>
+              <a:gd name="connsiteX16" fmla="*/ 11333018 w 11379378"/>
+              <a:gd name="connsiteY16" fmla="*/ 1016000 h 4544291"/>
+              <a:gd name="connsiteX17" fmla="*/ 11314546 w 11379378"/>
+              <a:gd name="connsiteY17" fmla="*/ 988291 h 4544291"/>
+              <a:gd name="connsiteX18" fmla="*/ 11305309 w 11379378"/>
+              <a:gd name="connsiteY18" fmla="*/ 794327 h 4544291"/>
+              <a:gd name="connsiteX19" fmla="*/ 11351491 w 11379378"/>
+              <a:gd name="connsiteY19" fmla="*/ 785091 h 4544291"/>
+              <a:gd name="connsiteX20" fmla="*/ 11296073 w 11379378"/>
+              <a:gd name="connsiteY20" fmla="*/ 738909 h 4544291"/>
+              <a:gd name="connsiteX21" fmla="*/ 11296073 w 11379378"/>
+              <a:gd name="connsiteY21" fmla="*/ 738909 h 4544291"/>
+              <a:gd name="connsiteX22" fmla="*/ 9337964 w 11379378"/>
+              <a:gd name="connsiteY22" fmla="*/ 766618 h 4544291"/>
+              <a:gd name="connsiteX23" fmla="*/ 7130473 w 11379378"/>
+              <a:gd name="connsiteY23" fmla="*/ 729672 h 4544291"/>
+              <a:gd name="connsiteX24" fmla="*/ 4784437 w 11379378"/>
+              <a:gd name="connsiteY24" fmla="*/ 895927 h 4544291"/>
+              <a:gd name="connsiteX25" fmla="*/ 3768437 w 11379378"/>
+              <a:gd name="connsiteY25" fmla="*/ 711200 h 4544291"/>
+              <a:gd name="connsiteX26" fmla="*/ 3103418 w 11379378"/>
+              <a:gd name="connsiteY26" fmla="*/ 378691 h 4544291"/>
+              <a:gd name="connsiteX27" fmla="*/ 2309091 w 11379378"/>
+              <a:gd name="connsiteY27" fmla="*/ 0 h 4544291"/>
+              <a:gd name="connsiteX28" fmla="*/ 1431637 w 11379378"/>
+              <a:gd name="connsiteY28" fmla="*/ 110836 h 4544291"/>
+              <a:gd name="connsiteX29" fmla="*/ 1034473 w 11379378"/>
+              <a:gd name="connsiteY29" fmla="*/ 720436 h 4544291"/>
+              <a:gd name="connsiteX30" fmla="*/ 323273 w 11379378"/>
+              <a:gd name="connsiteY30" fmla="*/ 997527 h 4544291"/>
+              <a:gd name="connsiteX31" fmla="*/ 0 w 11379378"/>
+              <a:gd name="connsiteY31" fmla="*/ 1524000 h 4544291"/>
+              <a:gd name="connsiteX32" fmla="*/ 295564 w 11379378"/>
+              <a:gd name="connsiteY32" fmla="*/ 2059709 h 4544291"/>
+              <a:gd name="connsiteX0" fmla="*/ 295564 w 11379378"/>
+              <a:gd name="connsiteY0" fmla="*/ 2059709 h 4544291"/>
+              <a:gd name="connsiteX1" fmla="*/ 1357746 w 11379378"/>
+              <a:gd name="connsiteY1" fmla="*/ 2373745 h 4544291"/>
+              <a:gd name="connsiteX2" fmla="*/ 2521528 w 11379378"/>
+              <a:gd name="connsiteY2" fmla="*/ 3177309 h 4544291"/>
+              <a:gd name="connsiteX3" fmla="*/ 3851564 w 11379378"/>
+              <a:gd name="connsiteY3" fmla="*/ 3833091 h 4544291"/>
+              <a:gd name="connsiteX4" fmla="*/ 5135418 w 11379378"/>
+              <a:gd name="connsiteY4" fmla="*/ 4193309 h 4544291"/>
+              <a:gd name="connsiteX5" fmla="*/ 6899564 w 11379378"/>
+              <a:gd name="connsiteY5" fmla="*/ 4424218 h 4544291"/>
+              <a:gd name="connsiteX6" fmla="*/ 9134764 w 11379378"/>
+              <a:gd name="connsiteY6" fmla="*/ 4544291 h 4544291"/>
+              <a:gd name="connsiteX7" fmla="*/ 10677237 w 11379378"/>
+              <a:gd name="connsiteY7" fmla="*/ 4350327 h 4544291"/>
+              <a:gd name="connsiteX8" fmla="*/ 11342255 w 11379378"/>
+              <a:gd name="connsiteY8" fmla="*/ 4221018 h 4544291"/>
+              <a:gd name="connsiteX9" fmla="*/ 11305309 w 11379378"/>
+              <a:gd name="connsiteY9" fmla="*/ 3177309 h 4544291"/>
+              <a:gd name="connsiteX10" fmla="*/ 10908146 w 11379378"/>
+              <a:gd name="connsiteY10" fmla="*/ 2530763 h 4544291"/>
+              <a:gd name="connsiteX11" fmla="*/ 11046691 w 11379378"/>
+              <a:gd name="connsiteY11" fmla="*/ 1736436 h 4544291"/>
+              <a:gd name="connsiteX12" fmla="*/ 11342255 w 11379378"/>
+              <a:gd name="connsiteY12" fmla="*/ 1459345 h 4544291"/>
+              <a:gd name="connsiteX13" fmla="*/ 11369964 w 11379378"/>
+              <a:gd name="connsiteY13" fmla="*/ 1311563 h 4544291"/>
+              <a:gd name="connsiteX14" fmla="*/ 11379200 w 11379378"/>
+              <a:gd name="connsiteY14" fmla="*/ 1246909 h 4544291"/>
+              <a:gd name="connsiteX15" fmla="*/ 11369964 w 11379378"/>
+              <a:gd name="connsiteY15" fmla="*/ 1071418 h 4544291"/>
+              <a:gd name="connsiteX16" fmla="*/ 11333018 w 11379378"/>
+              <a:gd name="connsiteY16" fmla="*/ 1016000 h 4544291"/>
+              <a:gd name="connsiteX17" fmla="*/ 11314546 w 11379378"/>
+              <a:gd name="connsiteY17" fmla="*/ 988291 h 4544291"/>
+              <a:gd name="connsiteX18" fmla="*/ 11305309 w 11379378"/>
+              <a:gd name="connsiteY18" fmla="*/ 794327 h 4544291"/>
+              <a:gd name="connsiteX19" fmla="*/ 11296073 w 11379378"/>
+              <a:gd name="connsiteY19" fmla="*/ 738909 h 4544291"/>
+              <a:gd name="connsiteX20" fmla="*/ 11296073 w 11379378"/>
+              <a:gd name="connsiteY20" fmla="*/ 738909 h 4544291"/>
+              <a:gd name="connsiteX21" fmla="*/ 9337964 w 11379378"/>
+              <a:gd name="connsiteY21" fmla="*/ 766618 h 4544291"/>
+              <a:gd name="connsiteX22" fmla="*/ 7130473 w 11379378"/>
+              <a:gd name="connsiteY22" fmla="*/ 729672 h 4544291"/>
+              <a:gd name="connsiteX23" fmla="*/ 4784437 w 11379378"/>
+              <a:gd name="connsiteY23" fmla="*/ 895927 h 4544291"/>
+              <a:gd name="connsiteX24" fmla="*/ 3768437 w 11379378"/>
+              <a:gd name="connsiteY24" fmla="*/ 711200 h 4544291"/>
+              <a:gd name="connsiteX25" fmla="*/ 3103418 w 11379378"/>
+              <a:gd name="connsiteY25" fmla="*/ 378691 h 4544291"/>
+              <a:gd name="connsiteX26" fmla="*/ 2309091 w 11379378"/>
+              <a:gd name="connsiteY26" fmla="*/ 0 h 4544291"/>
+              <a:gd name="connsiteX27" fmla="*/ 1431637 w 11379378"/>
+              <a:gd name="connsiteY27" fmla="*/ 110836 h 4544291"/>
+              <a:gd name="connsiteX28" fmla="*/ 1034473 w 11379378"/>
+              <a:gd name="connsiteY28" fmla="*/ 720436 h 4544291"/>
+              <a:gd name="connsiteX29" fmla="*/ 323273 w 11379378"/>
+              <a:gd name="connsiteY29" fmla="*/ 997527 h 4544291"/>
+              <a:gd name="connsiteX30" fmla="*/ 0 w 11379378"/>
+              <a:gd name="connsiteY30" fmla="*/ 1524000 h 4544291"/>
+              <a:gd name="connsiteX31" fmla="*/ 295564 w 11379378"/>
+              <a:gd name="connsiteY31" fmla="*/ 2059709 h 4544291"/>
+              <a:gd name="connsiteX0" fmla="*/ 295564 w 11379378"/>
+              <a:gd name="connsiteY0" fmla="*/ 2059709 h 4544291"/>
+              <a:gd name="connsiteX1" fmla="*/ 1357746 w 11379378"/>
+              <a:gd name="connsiteY1" fmla="*/ 2373745 h 4544291"/>
+              <a:gd name="connsiteX2" fmla="*/ 2521528 w 11379378"/>
+              <a:gd name="connsiteY2" fmla="*/ 3177309 h 4544291"/>
+              <a:gd name="connsiteX3" fmla="*/ 3851564 w 11379378"/>
+              <a:gd name="connsiteY3" fmla="*/ 3833091 h 4544291"/>
+              <a:gd name="connsiteX4" fmla="*/ 5135418 w 11379378"/>
+              <a:gd name="connsiteY4" fmla="*/ 4193309 h 4544291"/>
+              <a:gd name="connsiteX5" fmla="*/ 6899564 w 11379378"/>
+              <a:gd name="connsiteY5" fmla="*/ 4424218 h 4544291"/>
+              <a:gd name="connsiteX6" fmla="*/ 9134764 w 11379378"/>
+              <a:gd name="connsiteY6" fmla="*/ 4544291 h 4544291"/>
+              <a:gd name="connsiteX7" fmla="*/ 10677237 w 11379378"/>
+              <a:gd name="connsiteY7" fmla="*/ 4350327 h 4544291"/>
+              <a:gd name="connsiteX8" fmla="*/ 11342255 w 11379378"/>
+              <a:gd name="connsiteY8" fmla="*/ 4221018 h 4544291"/>
+              <a:gd name="connsiteX9" fmla="*/ 11305309 w 11379378"/>
+              <a:gd name="connsiteY9" fmla="*/ 3177309 h 4544291"/>
+              <a:gd name="connsiteX10" fmla="*/ 10908146 w 11379378"/>
+              <a:gd name="connsiteY10" fmla="*/ 2530763 h 4544291"/>
+              <a:gd name="connsiteX11" fmla="*/ 11046691 w 11379378"/>
+              <a:gd name="connsiteY11" fmla="*/ 1736436 h 4544291"/>
+              <a:gd name="connsiteX12" fmla="*/ 11342255 w 11379378"/>
+              <a:gd name="connsiteY12" fmla="*/ 1459345 h 4544291"/>
+              <a:gd name="connsiteX13" fmla="*/ 11369964 w 11379378"/>
+              <a:gd name="connsiteY13" fmla="*/ 1311563 h 4544291"/>
+              <a:gd name="connsiteX14" fmla="*/ 11379200 w 11379378"/>
+              <a:gd name="connsiteY14" fmla="*/ 1246909 h 4544291"/>
+              <a:gd name="connsiteX15" fmla="*/ 11369964 w 11379378"/>
+              <a:gd name="connsiteY15" fmla="*/ 1071418 h 4544291"/>
+              <a:gd name="connsiteX16" fmla="*/ 11333018 w 11379378"/>
+              <a:gd name="connsiteY16" fmla="*/ 1016000 h 4544291"/>
+              <a:gd name="connsiteX17" fmla="*/ 11351492 w 11379378"/>
+              <a:gd name="connsiteY17" fmla="*/ 960582 h 4544291"/>
+              <a:gd name="connsiteX18" fmla="*/ 11305309 w 11379378"/>
+              <a:gd name="connsiteY18" fmla="*/ 794327 h 4544291"/>
+              <a:gd name="connsiteX19" fmla="*/ 11296073 w 11379378"/>
+              <a:gd name="connsiteY19" fmla="*/ 738909 h 4544291"/>
+              <a:gd name="connsiteX20" fmla="*/ 11296073 w 11379378"/>
+              <a:gd name="connsiteY20" fmla="*/ 738909 h 4544291"/>
+              <a:gd name="connsiteX21" fmla="*/ 9337964 w 11379378"/>
+              <a:gd name="connsiteY21" fmla="*/ 766618 h 4544291"/>
+              <a:gd name="connsiteX22" fmla="*/ 7130473 w 11379378"/>
+              <a:gd name="connsiteY22" fmla="*/ 729672 h 4544291"/>
+              <a:gd name="connsiteX23" fmla="*/ 4784437 w 11379378"/>
+              <a:gd name="connsiteY23" fmla="*/ 895927 h 4544291"/>
+              <a:gd name="connsiteX24" fmla="*/ 3768437 w 11379378"/>
+              <a:gd name="connsiteY24" fmla="*/ 711200 h 4544291"/>
+              <a:gd name="connsiteX25" fmla="*/ 3103418 w 11379378"/>
+              <a:gd name="connsiteY25" fmla="*/ 378691 h 4544291"/>
+              <a:gd name="connsiteX26" fmla="*/ 2309091 w 11379378"/>
+              <a:gd name="connsiteY26" fmla="*/ 0 h 4544291"/>
+              <a:gd name="connsiteX27" fmla="*/ 1431637 w 11379378"/>
+              <a:gd name="connsiteY27" fmla="*/ 110836 h 4544291"/>
+              <a:gd name="connsiteX28" fmla="*/ 1034473 w 11379378"/>
+              <a:gd name="connsiteY28" fmla="*/ 720436 h 4544291"/>
+              <a:gd name="connsiteX29" fmla="*/ 323273 w 11379378"/>
+              <a:gd name="connsiteY29" fmla="*/ 997527 h 4544291"/>
+              <a:gd name="connsiteX30" fmla="*/ 0 w 11379378"/>
+              <a:gd name="connsiteY30" fmla="*/ 1524000 h 4544291"/>
+              <a:gd name="connsiteX31" fmla="*/ 295564 w 11379378"/>
+              <a:gd name="connsiteY31" fmla="*/ 2059709 h 4544291"/>
+              <a:gd name="connsiteX0" fmla="*/ 295564 w 11379378"/>
+              <a:gd name="connsiteY0" fmla="*/ 2059709 h 4544291"/>
+              <a:gd name="connsiteX1" fmla="*/ 1357746 w 11379378"/>
+              <a:gd name="connsiteY1" fmla="*/ 2373745 h 4544291"/>
+              <a:gd name="connsiteX2" fmla="*/ 2521528 w 11379378"/>
+              <a:gd name="connsiteY2" fmla="*/ 3177309 h 4544291"/>
+              <a:gd name="connsiteX3" fmla="*/ 3851564 w 11379378"/>
+              <a:gd name="connsiteY3" fmla="*/ 3833091 h 4544291"/>
+              <a:gd name="connsiteX4" fmla="*/ 5135418 w 11379378"/>
+              <a:gd name="connsiteY4" fmla="*/ 4193309 h 4544291"/>
+              <a:gd name="connsiteX5" fmla="*/ 6899564 w 11379378"/>
+              <a:gd name="connsiteY5" fmla="*/ 4424218 h 4544291"/>
+              <a:gd name="connsiteX6" fmla="*/ 9134764 w 11379378"/>
+              <a:gd name="connsiteY6" fmla="*/ 4544291 h 4544291"/>
+              <a:gd name="connsiteX7" fmla="*/ 10677237 w 11379378"/>
+              <a:gd name="connsiteY7" fmla="*/ 4350327 h 4544291"/>
+              <a:gd name="connsiteX8" fmla="*/ 11342255 w 11379378"/>
+              <a:gd name="connsiteY8" fmla="*/ 4221018 h 4544291"/>
+              <a:gd name="connsiteX9" fmla="*/ 11305309 w 11379378"/>
+              <a:gd name="connsiteY9" fmla="*/ 3177309 h 4544291"/>
+              <a:gd name="connsiteX10" fmla="*/ 10908146 w 11379378"/>
+              <a:gd name="connsiteY10" fmla="*/ 2530763 h 4544291"/>
+              <a:gd name="connsiteX11" fmla="*/ 11046691 w 11379378"/>
+              <a:gd name="connsiteY11" fmla="*/ 1736436 h 4544291"/>
+              <a:gd name="connsiteX12" fmla="*/ 11342255 w 11379378"/>
+              <a:gd name="connsiteY12" fmla="*/ 1459345 h 4544291"/>
+              <a:gd name="connsiteX13" fmla="*/ 11369964 w 11379378"/>
+              <a:gd name="connsiteY13" fmla="*/ 1311563 h 4544291"/>
+              <a:gd name="connsiteX14" fmla="*/ 11379200 w 11379378"/>
+              <a:gd name="connsiteY14" fmla="*/ 1246909 h 4544291"/>
+              <a:gd name="connsiteX15" fmla="*/ 11369964 w 11379378"/>
+              <a:gd name="connsiteY15" fmla="*/ 1071418 h 4544291"/>
+              <a:gd name="connsiteX16" fmla="*/ 11333018 w 11379378"/>
+              <a:gd name="connsiteY16" fmla="*/ 1016000 h 4544291"/>
+              <a:gd name="connsiteX17" fmla="*/ 11305309 w 11379378"/>
+              <a:gd name="connsiteY17" fmla="*/ 794327 h 4544291"/>
+              <a:gd name="connsiteX18" fmla="*/ 11296073 w 11379378"/>
+              <a:gd name="connsiteY18" fmla="*/ 738909 h 4544291"/>
+              <a:gd name="connsiteX19" fmla="*/ 11296073 w 11379378"/>
+              <a:gd name="connsiteY19" fmla="*/ 738909 h 4544291"/>
+              <a:gd name="connsiteX20" fmla="*/ 9337964 w 11379378"/>
+              <a:gd name="connsiteY20" fmla="*/ 766618 h 4544291"/>
+              <a:gd name="connsiteX21" fmla="*/ 7130473 w 11379378"/>
+              <a:gd name="connsiteY21" fmla="*/ 729672 h 4544291"/>
+              <a:gd name="connsiteX22" fmla="*/ 4784437 w 11379378"/>
+              <a:gd name="connsiteY22" fmla="*/ 895927 h 4544291"/>
+              <a:gd name="connsiteX23" fmla="*/ 3768437 w 11379378"/>
+              <a:gd name="connsiteY23" fmla="*/ 711200 h 4544291"/>
+              <a:gd name="connsiteX24" fmla="*/ 3103418 w 11379378"/>
+              <a:gd name="connsiteY24" fmla="*/ 378691 h 4544291"/>
+              <a:gd name="connsiteX25" fmla="*/ 2309091 w 11379378"/>
+              <a:gd name="connsiteY25" fmla="*/ 0 h 4544291"/>
+              <a:gd name="connsiteX26" fmla="*/ 1431637 w 11379378"/>
+              <a:gd name="connsiteY26" fmla="*/ 110836 h 4544291"/>
+              <a:gd name="connsiteX27" fmla="*/ 1034473 w 11379378"/>
+              <a:gd name="connsiteY27" fmla="*/ 720436 h 4544291"/>
+              <a:gd name="connsiteX28" fmla="*/ 323273 w 11379378"/>
+              <a:gd name="connsiteY28" fmla="*/ 997527 h 4544291"/>
+              <a:gd name="connsiteX29" fmla="*/ 0 w 11379378"/>
+              <a:gd name="connsiteY29" fmla="*/ 1524000 h 4544291"/>
+              <a:gd name="connsiteX30" fmla="*/ 295564 w 11379378"/>
+              <a:gd name="connsiteY30" fmla="*/ 2059709 h 4544291"/>
+              <a:gd name="connsiteX0" fmla="*/ 295564 w 11379200"/>
+              <a:gd name="connsiteY0" fmla="*/ 2059709 h 4544291"/>
+              <a:gd name="connsiteX1" fmla="*/ 1357746 w 11379200"/>
+              <a:gd name="connsiteY1" fmla="*/ 2373745 h 4544291"/>
+              <a:gd name="connsiteX2" fmla="*/ 2521528 w 11379200"/>
+              <a:gd name="connsiteY2" fmla="*/ 3177309 h 4544291"/>
+              <a:gd name="connsiteX3" fmla="*/ 3851564 w 11379200"/>
+              <a:gd name="connsiteY3" fmla="*/ 3833091 h 4544291"/>
+              <a:gd name="connsiteX4" fmla="*/ 5135418 w 11379200"/>
+              <a:gd name="connsiteY4" fmla="*/ 4193309 h 4544291"/>
+              <a:gd name="connsiteX5" fmla="*/ 6899564 w 11379200"/>
+              <a:gd name="connsiteY5" fmla="*/ 4424218 h 4544291"/>
+              <a:gd name="connsiteX6" fmla="*/ 9134764 w 11379200"/>
+              <a:gd name="connsiteY6" fmla="*/ 4544291 h 4544291"/>
+              <a:gd name="connsiteX7" fmla="*/ 10677237 w 11379200"/>
+              <a:gd name="connsiteY7" fmla="*/ 4350327 h 4544291"/>
+              <a:gd name="connsiteX8" fmla="*/ 11342255 w 11379200"/>
+              <a:gd name="connsiteY8" fmla="*/ 4221018 h 4544291"/>
+              <a:gd name="connsiteX9" fmla="*/ 11305309 w 11379200"/>
+              <a:gd name="connsiteY9" fmla="*/ 3177309 h 4544291"/>
+              <a:gd name="connsiteX10" fmla="*/ 10908146 w 11379200"/>
+              <a:gd name="connsiteY10" fmla="*/ 2530763 h 4544291"/>
+              <a:gd name="connsiteX11" fmla="*/ 11046691 w 11379200"/>
+              <a:gd name="connsiteY11" fmla="*/ 1736436 h 4544291"/>
+              <a:gd name="connsiteX12" fmla="*/ 11342255 w 11379200"/>
+              <a:gd name="connsiteY12" fmla="*/ 1459345 h 4544291"/>
+              <a:gd name="connsiteX13" fmla="*/ 11369964 w 11379200"/>
+              <a:gd name="connsiteY13" fmla="*/ 1311563 h 4544291"/>
+              <a:gd name="connsiteX14" fmla="*/ 11379200 w 11379200"/>
+              <a:gd name="connsiteY14" fmla="*/ 1246909 h 4544291"/>
+              <a:gd name="connsiteX15" fmla="*/ 11369964 w 11379200"/>
+              <a:gd name="connsiteY15" fmla="*/ 1071418 h 4544291"/>
+              <a:gd name="connsiteX16" fmla="*/ 11351491 w 11379200"/>
+              <a:gd name="connsiteY16" fmla="*/ 951346 h 4544291"/>
+              <a:gd name="connsiteX17" fmla="*/ 11305309 w 11379200"/>
+              <a:gd name="connsiteY17" fmla="*/ 794327 h 4544291"/>
+              <a:gd name="connsiteX18" fmla="*/ 11296073 w 11379200"/>
+              <a:gd name="connsiteY18" fmla="*/ 738909 h 4544291"/>
+              <a:gd name="connsiteX19" fmla="*/ 11296073 w 11379200"/>
+              <a:gd name="connsiteY19" fmla="*/ 738909 h 4544291"/>
+              <a:gd name="connsiteX20" fmla="*/ 9337964 w 11379200"/>
+              <a:gd name="connsiteY20" fmla="*/ 766618 h 4544291"/>
+              <a:gd name="connsiteX21" fmla="*/ 7130473 w 11379200"/>
+              <a:gd name="connsiteY21" fmla="*/ 729672 h 4544291"/>
+              <a:gd name="connsiteX22" fmla="*/ 4784437 w 11379200"/>
+              <a:gd name="connsiteY22" fmla="*/ 895927 h 4544291"/>
+              <a:gd name="connsiteX23" fmla="*/ 3768437 w 11379200"/>
+              <a:gd name="connsiteY23" fmla="*/ 711200 h 4544291"/>
+              <a:gd name="connsiteX24" fmla="*/ 3103418 w 11379200"/>
+              <a:gd name="connsiteY24" fmla="*/ 378691 h 4544291"/>
+              <a:gd name="connsiteX25" fmla="*/ 2309091 w 11379200"/>
+              <a:gd name="connsiteY25" fmla="*/ 0 h 4544291"/>
+              <a:gd name="connsiteX26" fmla="*/ 1431637 w 11379200"/>
+              <a:gd name="connsiteY26" fmla="*/ 110836 h 4544291"/>
+              <a:gd name="connsiteX27" fmla="*/ 1034473 w 11379200"/>
+              <a:gd name="connsiteY27" fmla="*/ 720436 h 4544291"/>
+              <a:gd name="connsiteX28" fmla="*/ 323273 w 11379200"/>
+              <a:gd name="connsiteY28" fmla="*/ 997527 h 4544291"/>
+              <a:gd name="connsiteX29" fmla="*/ 0 w 11379200"/>
+              <a:gd name="connsiteY29" fmla="*/ 1524000 h 4544291"/>
+              <a:gd name="connsiteX30" fmla="*/ 295564 w 11379200"/>
+              <a:gd name="connsiteY30" fmla="*/ 2059709 h 4544291"/>
+              <a:gd name="connsiteX0" fmla="*/ 295564 w 11379200"/>
+              <a:gd name="connsiteY0" fmla="*/ 2059709 h 4544291"/>
+              <a:gd name="connsiteX1" fmla="*/ 1357746 w 11379200"/>
+              <a:gd name="connsiteY1" fmla="*/ 2373745 h 4544291"/>
+              <a:gd name="connsiteX2" fmla="*/ 2521528 w 11379200"/>
+              <a:gd name="connsiteY2" fmla="*/ 3177309 h 4544291"/>
+              <a:gd name="connsiteX3" fmla="*/ 3851564 w 11379200"/>
+              <a:gd name="connsiteY3" fmla="*/ 3833091 h 4544291"/>
+              <a:gd name="connsiteX4" fmla="*/ 5135418 w 11379200"/>
+              <a:gd name="connsiteY4" fmla="*/ 4193309 h 4544291"/>
+              <a:gd name="connsiteX5" fmla="*/ 6899564 w 11379200"/>
+              <a:gd name="connsiteY5" fmla="*/ 4424218 h 4544291"/>
+              <a:gd name="connsiteX6" fmla="*/ 9134764 w 11379200"/>
+              <a:gd name="connsiteY6" fmla="*/ 4544291 h 4544291"/>
+              <a:gd name="connsiteX7" fmla="*/ 10677237 w 11379200"/>
+              <a:gd name="connsiteY7" fmla="*/ 4350327 h 4544291"/>
+              <a:gd name="connsiteX8" fmla="*/ 11342255 w 11379200"/>
+              <a:gd name="connsiteY8" fmla="*/ 4221018 h 4544291"/>
+              <a:gd name="connsiteX9" fmla="*/ 11305309 w 11379200"/>
+              <a:gd name="connsiteY9" fmla="*/ 3177309 h 4544291"/>
+              <a:gd name="connsiteX10" fmla="*/ 10908146 w 11379200"/>
+              <a:gd name="connsiteY10" fmla="*/ 2530763 h 4544291"/>
+              <a:gd name="connsiteX11" fmla="*/ 11046691 w 11379200"/>
+              <a:gd name="connsiteY11" fmla="*/ 1736436 h 4544291"/>
+              <a:gd name="connsiteX12" fmla="*/ 11342255 w 11379200"/>
+              <a:gd name="connsiteY12" fmla="*/ 1459345 h 4544291"/>
+              <a:gd name="connsiteX13" fmla="*/ 11369964 w 11379200"/>
+              <a:gd name="connsiteY13" fmla="*/ 1311563 h 4544291"/>
+              <a:gd name="connsiteX14" fmla="*/ 11379200 w 11379200"/>
+              <a:gd name="connsiteY14" fmla="*/ 1246909 h 4544291"/>
+              <a:gd name="connsiteX15" fmla="*/ 11369964 w 11379200"/>
+              <a:gd name="connsiteY15" fmla="*/ 1071418 h 4544291"/>
+              <a:gd name="connsiteX16" fmla="*/ 11351491 w 11379200"/>
+              <a:gd name="connsiteY16" fmla="*/ 951346 h 4544291"/>
+              <a:gd name="connsiteX17" fmla="*/ 11305309 w 11379200"/>
+              <a:gd name="connsiteY17" fmla="*/ 794327 h 4544291"/>
+              <a:gd name="connsiteX18" fmla="*/ 11296073 w 11379200"/>
+              <a:gd name="connsiteY18" fmla="*/ 738909 h 4544291"/>
+              <a:gd name="connsiteX19" fmla="*/ 11296073 w 11379200"/>
+              <a:gd name="connsiteY19" fmla="*/ 738909 h 4544291"/>
+              <a:gd name="connsiteX20" fmla="*/ 9337964 w 11379200"/>
+              <a:gd name="connsiteY20" fmla="*/ 766618 h 4544291"/>
+              <a:gd name="connsiteX21" fmla="*/ 7130473 w 11379200"/>
+              <a:gd name="connsiteY21" fmla="*/ 729672 h 4544291"/>
+              <a:gd name="connsiteX22" fmla="*/ 4784437 w 11379200"/>
+              <a:gd name="connsiteY22" fmla="*/ 895927 h 4544291"/>
+              <a:gd name="connsiteX23" fmla="*/ 3768437 w 11379200"/>
+              <a:gd name="connsiteY23" fmla="*/ 711200 h 4544291"/>
+              <a:gd name="connsiteX24" fmla="*/ 3103418 w 11379200"/>
+              <a:gd name="connsiteY24" fmla="*/ 378691 h 4544291"/>
+              <a:gd name="connsiteX25" fmla="*/ 2309091 w 11379200"/>
+              <a:gd name="connsiteY25" fmla="*/ 0 h 4544291"/>
+              <a:gd name="connsiteX26" fmla="*/ 1431637 w 11379200"/>
+              <a:gd name="connsiteY26" fmla="*/ 110836 h 4544291"/>
+              <a:gd name="connsiteX27" fmla="*/ 1034473 w 11379200"/>
+              <a:gd name="connsiteY27" fmla="*/ 720436 h 4544291"/>
+              <a:gd name="connsiteX28" fmla="*/ 323273 w 11379200"/>
+              <a:gd name="connsiteY28" fmla="*/ 997527 h 4544291"/>
+              <a:gd name="connsiteX29" fmla="*/ 0 w 11379200"/>
+              <a:gd name="connsiteY29" fmla="*/ 1524000 h 4544291"/>
+              <a:gd name="connsiteX30" fmla="*/ 295564 w 11379200"/>
+              <a:gd name="connsiteY30" fmla="*/ 2059709 h 4544291"/>
+              <a:gd name="connsiteX0" fmla="*/ 295564 w 11379200"/>
+              <a:gd name="connsiteY0" fmla="*/ 2059709 h 4544291"/>
+              <a:gd name="connsiteX1" fmla="*/ 1357746 w 11379200"/>
+              <a:gd name="connsiteY1" fmla="*/ 2373745 h 4544291"/>
+              <a:gd name="connsiteX2" fmla="*/ 2521528 w 11379200"/>
+              <a:gd name="connsiteY2" fmla="*/ 3177309 h 4544291"/>
+              <a:gd name="connsiteX3" fmla="*/ 3851564 w 11379200"/>
+              <a:gd name="connsiteY3" fmla="*/ 3833091 h 4544291"/>
+              <a:gd name="connsiteX4" fmla="*/ 5135418 w 11379200"/>
+              <a:gd name="connsiteY4" fmla="*/ 4193309 h 4544291"/>
+              <a:gd name="connsiteX5" fmla="*/ 6899564 w 11379200"/>
+              <a:gd name="connsiteY5" fmla="*/ 4424218 h 4544291"/>
+              <a:gd name="connsiteX6" fmla="*/ 9134764 w 11379200"/>
+              <a:gd name="connsiteY6" fmla="*/ 4544291 h 4544291"/>
+              <a:gd name="connsiteX7" fmla="*/ 10677237 w 11379200"/>
+              <a:gd name="connsiteY7" fmla="*/ 4350327 h 4544291"/>
+              <a:gd name="connsiteX8" fmla="*/ 11342255 w 11379200"/>
+              <a:gd name="connsiteY8" fmla="*/ 4221018 h 4544291"/>
+              <a:gd name="connsiteX9" fmla="*/ 11305309 w 11379200"/>
+              <a:gd name="connsiteY9" fmla="*/ 3177309 h 4544291"/>
+              <a:gd name="connsiteX10" fmla="*/ 10908146 w 11379200"/>
+              <a:gd name="connsiteY10" fmla="*/ 2530763 h 4544291"/>
+              <a:gd name="connsiteX11" fmla="*/ 11046691 w 11379200"/>
+              <a:gd name="connsiteY11" fmla="*/ 1736436 h 4544291"/>
+              <a:gd name="connsiteX12" fmla="*/ 11342255 w 11379200"/>
+              <a:gd name="connsiteY12" fmla="*/ 1459345 h 4544291"/>
+              <a:gd name="connsiteX13" fmla="*/ 11369964 w 11379200"/>
+              <a:gd name="connsiteY13" fmla="*/ 1311563 h 4544291"/>
+              <a:gd name="connsiteX14" fmla="*/ 11379200 w 11379200"/>
+              <a:gd name="connsiteY14" fmla="*/ 1246909 h 4544291"/>
+              <a:gd name="connsiteX15" fmla="*/ 11369964 w 11379200"/>
+              <a:gd name="connsiteY15" fmla="*/ 1071418 h 4544291"/>
+              <a:gd name="connsiteX16" fmla="*/ 11351491 w 11379200"/>
+              <a:gd name="connsiteY16" fmla="*/ 951346 h 4544291"/>
+              <a:gd name="connsiteX17" fmla="*/ 11305309 w 11379200"/>
+              <a:gd name="connsiteY17" fmla="*/ 794327 h 4544291"/>
+              <a:gd name="connsiteX18" fmla="*/ 11296073 w 11379200"/>
+              <a:gd name="connsiteY18" fmla="*/ 738909 h 4544291"/>
+              <a:gd name="connsiteX19" fmla="*/ 11296073 w 11379200"/>
+              <a:gd name="connsiteY19" fmla="*/ 738909 h 4544291"/>
+              <a:gd name="connsiteX20" fmla="*/ 9337964 w 11379200"/>
+              <a:gd name="connsiteY20" fmla="*/ 766618 h 4544291"/>
+              <a:gd name="connsiteX21" fmla="*/ 7130473 w 11379200"/>
+              <a:gd name="connsiteY21" fmla="*/ 729672 h 4544291"/>
+              <a:gd name="connsiteX22" fmla="*/ 4784437 w 11379200"/>
+              <a:gd name="connsiteY22" fmla="*/ 895927 h 4544291"/>
+              <a:gd name="connsiteX23" fmla="*/ 3768437 w 11379200"/>
+              <a:gd name="connsiteY23" fmla="*/ 711200 h 4544291"/>
+              <a:gd name="connsiteX24" fmla="*/ 3103418 w 11379200"/>
+              <a:gd name="connsiteY24" fmla="*/ 378691 h 4544291"/>
+              <a:gd name="connsiteX25" fmla="*/ 2309091 w 11379200"/>
+              <a:gd name="connsiteY25" fmla="*/ 0 h 4544291"/>
+              <a:gd name="connsiteX26" fmla="*/ 1431637 w 11379200"/>
+              <a:gd name="connsiteY26" fmla="*/ 110836 h 4544291"/>
+              <a:gd name="connsiteX27" fmla="*/ 1034473 w 11379200"/>
+              <a:gd name="connsiteY27" fmla="*/ 720436 h 4544291"/>
+              <a:gd name="connsiteX28" fmla="*/ 323273 w 11379200"/>
+              <a:gd name="connsiteY28" fmla="*/ 997527 h 4544291"/>
+              <a:gd name="connsiteX29" fmla="*/ 0 w 11379200"/>
+              <a:gd name="connsiteY29" fmla="*/ 1524000 h 4544291"/>
+              <a:gd name="connsiteX30" fmla="*/ 295564 w 11379200"/>
+              <a:gd name="connsiteY30" fmla="*/ 2059709 h 4544291"/>
+              <a:gd name="connsiteX0" fmla="*/ 295564 w 11395664"/>
+              <a:gd name="connsiteY0" fmla="*/ 2059709 h 4544291"/>
+              <a:gd name="connsiteX1" fmla="*/ 1357746 w 11395664"/>
+              <a:gd name="connsiteY1" fmla="*/ 2373745 h 4544291"/>
+              <a:gd name="connsiteX2" fmla="*/ 2521528 w 11395664"/>
+              <a:gd name="connsiteY2" fmla="*/ 3177309 h 4544291"/>
+              <a:gd name="connsiteX3" fmla="*/ 3851564 w 11395664"/>
+              <a:gd name="connsiteY3" fmla="*/ 3833091 h 4544291"/>
+              <a:gd name="connsiteX4" fmla="*/ 5135418 w 11395664"/>
+              <a:gd name="connsiteY4" fmla="*/ 4193309 h 4544291"/>
+              <a:gd name="connsiteX5" fmla="*/ 6899564 w 11395664"/>
+              <a:gd name="connsiteY5" fmla="*/ 4424218 h 4544291"/>
+              <a:gd name="connsiteX6" fmla="*/ 9134764 w 11395664"/>
+              <a:gd name="connsiteY6" fmla="*/ 4544291 h 4544291"/>
+              <a:gd name="connsiteX7" fmla="*/ 10677237 w 11395664"/>
+              <a:gd name="connsiteY7" fmla="*/ 4350327 h 4544291"/>
+              <a:gd name="connsiteX8" fmla="*/ 11342255 w 11395664"/>
+              <a:gd name="connsiteY8" fmla="*/ 4221018 h 4544291"/>
+              <a:gd name="connsiteX9" fmla="*/ 11305309 w 11395664"/>
+              <a:gd name="connsiteY9" fmla="*/ 3177309 h 4544291"/>
+              <a:gd name="connsiteX10" fmla="*/ 10908146 w 11395664"/>
+              <a:gd name="connsiteY10" fmla="*/ 2530763 h 4544291"/>
+              <a:gd name="connsiteX11" fmla="*/ 11046691 w 11395664"/>
+              <a:gd name="connsiteY11" fmla="*/ 1736436 h 4544291"/>
+              <a:gd name="connsiteX12" fmla="*/ 11342255 w 11395664"/>
+              <a:gd name="connsiteY12" fmla="*/ 1459345 h 4544291"/>
+              <a:gd name="connsiteX13" fmla="*/ 11369964 w 11395664"/>
+              <a:gd name="connsiteY13" fmla="*/ 1311563 h 4544291"/>
+              <a:gd name="connsiteX14" fmla="*/ 11379200 w 11395664"/>
+              <a:gd name="connsiteY14" fmla="*/ 1246909 h 4544291"/>
+              <a:gd name="connsiteX15" fmla="*/ 11369964 w 11395664"/>
+              <a:gd name="connsiteY15" fmla="*/ 1071418 h 4544291"/>
+              <a:gd name="connsiteX16" fmla="*/ 11351491 w 11395664"/>
+              <a:gd name="connsiteY16" fmla="*/ 951346 h 4544291"/>
+              <a:gd name="connsiteX17" fmla="*/ 11305309 w 11395664"/>
+              <a:gd name="connsiteY17" fmla="*/ 794327 h 4544291"/>
+              <a:gd name="connsiteX18" fmla="*/ 11296073 w 11395664"/>
+              <a:gd name="connsiteY18" fmla="*/ 738909 h 4544291"/>
+              <a:gd name="connsiteX19" fmla="*/ 11296073 w 11395664"/>
+              <a:gd name="connsiteY19" fmla="*/ 738909 h 4544291"/>
+              <a:gd name="connsiteX20" fmla="*/ 9337964 w 11395664"/>
+              <a:gd name="connsiteY20" fmla="*/ 766618 h 4544291"/>
+              <a:gd name="connsiteX21" fmla="*/ 7130473 w 11395664"/>
+              <a:gd name="connsiteY21" fmla="*/ 729672 h 4544291"/>
+              <a:gd name="connsiteX22" fmla="*/ 4784437 w 11395664"/>
+              <a:gd name="connsiteY22" fmla="*/ 895927 h 4544291"/>
+              <a:gd name="connsiteX23" fmla="*/ 3768437 w 11395664"/>
+              <a:gd name="connsiteY23" fmla="*/ 711200 h 4544291"/>
+              <a:gd name="connsiteX24" fmla="*/ 3103418 w 11395664"/>
+              <a:gd name="connsiteY24" fmla="*/ 378691 h 4544291"/>
+              <a:gd name="connsiteX25" fmla="*/ 2309091 w 11395664"/>
+              <a:gd name="connsiteY25" fmla="*/ 0 h 4544291"/>
+              <a:gd name="connsiteX26" fmla="*/ 1431637 w 11395664"/>
+              <a:gd name="connsiteY26" fmla="*/ 110836 h 4544291"/>
+              <a:gd name="connsiteX27" fmla="*/ 1034473 w 11395664"/>
+              <a:gd name="connsiteY27" fmla="*/ 720436 h 4544291"/>
+              <a:gd name="connsiteX28" fmla="*/ 323273 w 11395664"/>
+              <a:gd name="connsiteY28" fmla="*/ 997527 h 4544291"/>
+              <a:gd name="connsiteX29" fmla="*/ 0 w 11395664"/>
+              <a:gd name="connsiteY29" fmla="*/ 1524000 h 4544291"/>
+              <a:gd name="connsiteX30" fmla="*/ 295564 w 11395664"/>
+              <a:gd name="connsiteY30" fmla="*/ 2059709 h 4544291"/>
+              <a:gd name="connsiteX0" fmla="*/ 295564 w 11395664"/>
+              <a:gd name="connsiteY0" fmla="*/ 2059709 h 4544291"/>
+              <a:gd name="connsiteX1" fmla="*/ 1357746 w 11395664"/>
+              <a:gd name="connsiteY1" fmla="*/ 2373745 h 4544291"/>
+              <a:gd name="connsiteX2" fmla="*/ 2521528 w 11395664"/>
+              <a:gd name="connsiteY2" fmla="*/ 3177309 h 4544291"/>
+              <a:gd name="connsiteX3" fmla="*/ 3851564 w 11395664"/>
+              <a:gd name="connsiteY3" fmla="*/ 3833091 h 4544291"/>
+              <a:gd name="connsiteX4" fmla="*/ 5135418 w 11395664"/>
+              <a:gd name="connsiteY4" fmla="*/ 4193309 h 4544291"/>
+              <a:gd name="connsiteX5" fmla="*/ 6899564 w 11395664"/>
+              <a:gd name="connsiteY5" fmla="*/ 4424218 h 4544291"/>
+              <a:gd name="connsiteX6" fmla="*/ 9134764 w 11395664"/>
+              <a:gd name="connsiteY6" fmla="*/ 4544291 h 4544291"/>
+              <a:gd name="connsiteX7" fmla="*/ 10677237 w 11395664"/>
+              <a:gd name="connsiteY7" fmla="*/ 4350327 h 4544291"/>
+              <a:gd name="connsiteX8" fmla="*/ 11342255 w 11395664"/>
+              <a:gd name="connsiteY8" fmla="*/ 4221018 h 4544291"/>
+              <a:gd name="connsiteX9" fmla="*/ 11305309 w 11395664"/>
+              <a:gd name="connsiteY9" fmla="*/ 3177309 h 4544291"/>
+              <a:gd name="connsiteX10" fmla="*/ 10908146 w 11395664"/>
+              <a:gd name="connsiteY10" fmla="*/ 2530763 h 4544291"/>
+              <a:gd name="connsiteX11" fmla="*/ 11046691 w 11395664"/>
+              <a:gd name="connsiteY11" fmla="*/ 1736436 h 4544291"/>
+              <a:gd name="connsiteX12" fmla="*/ 11342255 w 11395664"/>
+              <a:gd name="connsiteY12" fmla="*/ 1459345 h 4544291"/>
+              <a:gd name="connsiteX13" fmla="*/ 11369964 w 11395664"/>
+              <a:gd name="connsiteY13" fmla="*/ 1311563 h 4544291"/>
+              <a:gd name="connsiteX14" fmla="*/ 11379200 w 11395664"/>
+              <a:gd name="connsiteY14" fmla="*/ 1246909 h 4544291"/>
+              <a:gd name="connsiteX15" fmla="*/ 11369964 w 11395664"/>
+              <a:gd name="connsiteY15" fmla="*/ 1071418 h 4544291"/>
+              <a:gd name="connsiteX16" fmla="*/ 11351491 w 11395664"/>
+              <a:gd name="connsiteY16" fmla="*/ 951346 h 4544291"/>
+              <a:gd name="connsiteX17" fmla="*/ 11305309 w 11395664"/>
+              <a:gd name="connsiteY17" fmla="*/ 794327 h 4544291"/>
+              <a:gd name="connsiteX18" fmla="*/ 11296073 w 11395664"/>
+              <a:gd name="connsiteY18" fmla="*/ 738909 h 4544291"/>
+              <a:gd name="connsiteX19" fmla="*/ 11296073 w 11395664"/>
+              <a:gd name="connsiteY19" fmla="*/ 738909 h 4544291"/>
+              <a:gd name="connsiteX20" fmla="*/ 9337964 w 11395664"/>
+              <a:gd name="connsiteY20" fmla="*/ 766618 h 4544291"/>
+              <a:gd name="connsiteX21" fmla="*/ 7130473 w 11395664"/>
+              <a:gd name="connsiteY21" fmla="*/ 729672 h 4544291"/>
+              <a:gd name="connsiteX22" fmla="*/ 4784437 w 11395664"/>
+              <a:gd name="connsiteY22" fmla="*/ 895927 h 4544291"/>
+              <a:gd name="connsiteX23" fmla="*/ 3768437 w 11395664"/>
+              <a:gd name="connsiteY23" fmla="*/ 711200 h 4544291"/>
+              <a:gd name="connsiteX24" fmla="*/ 3103418 w 11395664"/>
+              <a:gd name="connsiteY24" fmla="*/ 378691 h 4544291"/>
+              <a:gd name="connsiteX25" fmla="*/ 2309091 w 11395664"/>
+              <a:gd name="connsiteY25" fmla="*/ 0 h 4544291"/>
+              <a:gd name="connsiteX26" fmla="*/ 1431637 w 11395664"/>
+              <a:gd name="connsiteY26" fmla="*/ 110836 h 4544291"/>
+              <a:gd name="connsiteX27" fmla="*/ 1034473 w 11395664"/>
+              <a:gd name="connsiteY27" fmla="*/ 720436 h 4544291"/>
+              <a:gd name="connsiteX28" fmla="*/ 323273 w 11395664"/>
+              <a:gd name="connsiteY28" fmla="*/ 997527 h 4544291"/>
+              <a:gd name="connsiteX29" fmla="*/ 0 w 11395664"/>
+              <a:gd name="connsiteY29" fmla="*/ 1524000 h 4544291"/>
+              <a:gd name="connsiteX30" fmla="*/ 295564 w 11395664"/>
+              <a:gd name="connsiteY30" fmla="*/ 2059709 h 4544291"/>
+              <a:gd name="connsiteX0" fmla="*/ 295564 w 11395664"/>
+              <a:gd name="connsiteY0" fmla="*/ 2059709 h 4544291"/>
+              <a:gd name="connsiteX1" fmla="*/ 1357746 w 11395664"/>
+              <a:gd name="connsiteY1" fmla="*/ 2373745 h 4544291"/>
+              <a:gd name="connsiteX2" fmla="*/ 2521528 w 11395664"/>
+              <a:gd name="connsiteY2" fmla="*/ 3177309 h 4544291"/>
+              <a:gd name="connsiteX3" fmla="*/ 3851564 w 11395664"/>
+              <a:gd name="connsiteY3" fmla="*/ 3833091 h 4544291"/>
+              <a:gd name="connsiteX4" fmla="*/ 5135418 w 11395664"/>
+              <a:gd name="connsiteY4" fmla="*/ 4193309 h 4544291"/>
+              <a:gd name="connsiteX5" fmla="*/ 6899564 w 11395664"/>
+              <a:gd name="connsiteY5" fmla="*/ 4424218 h 4544291"/>
+              <a:gd name="connsiteX6" fmla="*/ 9134764 w 11395664"/>
+              <a:gd name="connsiteY6" fmla="*/ 4544291 h 4544291"/>
+              <a:gd name="connsiteX7" fmla="*/ 10677237 w 11395664"/>
+              <a:gd name="connsiteY7" fmla="*/ 4350327 h 4544291"/>
+              <a:gd name="connsiteX8" fmla="*/ 11342255 w 11395664"/>
+              <a:gd name="connsiteY8" fmla="*/ 4221018 h 4544291"/>
+              <a:gd name="connsiteX9" fmla="*/ 11305309 w 11395664"/>
+              <a:gd name="connsiteY9" fmla="*/ 3177309 h 4544291"/>
+              <a:gd name="connsiteX10" fmla="*/ 10908146 w 11395664"/>
+              <a:gd name="connsiteY10" fmla="*/ 2530763 h 4544291"/>
+              <a:gd name="connsiteX11" fmla="*/ 11046691 w 11395664"/>
+              <a:gd name="connsiteY11" fmla="*/ 1736436 h 4544291"/>
+              <a:gd name="connsiteX12" fmla="*/ 11342255 w 11395664"/>
+              <a:gd name="connsiteY12" fmla="*/ 1459345 h 4544291"/>
+              <a:gd name="connsiteX13" fmla="*/ 11369964 w 11395664"/>
+              <a:gd name="connsiteY13" fmla="*/ 1311563 h 4544291"/>
+              <a:gd name="connsiteX14" fmla="*/ 11379200 w 11395664"/>
+              <a:gd name="connsiteY14" fmla="*/ 1246909 h 4544291"/>
+              <a:gd name="connsiteX15" fmla="*/ 11369964 w 11395664"/>
+              <a:gd name="connsiteY15" fmla="*/ 1071418 h 4544291"/>
+              <a:gd name="connsiteX16" fmla="*/ 11351491 w 11395664"/>
+              <a:gd name="connsiteY16" fmla="*/ 951346 h 4544291"/>
+              <a:gd name="connsiteX17" fmla="*/ 11305309 w 11395664"/>
+              <a:gd name="connsiteY17" fmla="*/ 794327 h 4544291"/>
+              <a:gd name="connsiteX18" fmla="*/ 11296073 w 11395664"/>
+              <a:gd name="connsiteY18" fmla="*/ 738909 h 4544291"/>
+              <a:gd name="connsiteX19" fmla="*/ 11296073 w 11395664"/>
+              <a:gd name="connsiteY19" fmla="*/ 738909 h 4544291"/>
+              <a:gd name="connsiteX20" fmla="*/ 9337964 w 11395664"/>
+              <a:gd name="connsiteY20" fmla="*/ 766618 h 4544291"/>
+              <a:gd name="connsiteX21" fmla="*/ 7130473 w 11395664"/>
+              <a:gd name="connsiteY21" fmla="*/ 729672 h 4544291"/>
+              <a:gd name="connsiteX22" fmla="*/ 4784437 w 11395664"/>
+              <a:gd name="connsiteY22" fmla="*/ 895927 h 4544291"/>
+              <a:gd name="connsiteX23" fmla="*/ 3768437 w 11395664"/>
+              <a:gd name="connsiteY23" fmla="*/ 711200 h 4544291"/>
+              <a:gd name="connsiteX24" fmla="*/ 3103418 w 11395664"/>
+              <a:gd name="connsiteY24" fmla="*/ 378691 h 4544291"/>
+              <a:gd name="connsiteX25" fmla="*/ 2309091 w 11395664"/>
+              <a:gd name="connsiteY25" fmla="*/ 0 h 4544291"/>
+              <a:gd name="connsiteX26" fmla="*/ 1431637 w 11395664"/>
+              <a:gd name="connsiteY26" fmla="*/ 110836 h 4544291"/>
+              <a:gd name="connsiteX27" fmla="*/ 1034473 w 11395664"/>
+              <a:gd name="connsiteY27" fmla="*/ 720436 h 4544291"/>
+              <a:gd name="connsiteX28" fmla="*/ 323273 w 11395664"/>
+              <a:gd name="connsiteY28" fmla="*/ 997527 h 4544291"/>
+              <a:gd name="connsiteX29" fmla="*/ 0 w 11395664"/>
+              <a:gd name="connsiteY29" fmla="*/ 1524000 h 4544291"/>
+              <a:gd name="connsiteX30" fmla="*/ 295564 w 11395664"/>
+              <a:gd name="connsiteY30" fmla="*/ 2059709 h 4544291"/>
+              <a:gd name="connsiteX0" fmla="*/ 295564 w 11395664"/>
+              <a:gd name="connsiteY0" fmla="*/ 2059709 h 4545650"/>
+              <a:gd name="connsiteX1" fmla="*/ 1357746 w 11395664"/>
+              <a:gd name="connsiteY1" fmla="*/ 2373745 h 4545650"/>
+              <a:gd name="connsiteX2" fmla="*/ 2521528 w 11395664"/>
+              <a:gd name="connsiteY2" fmla="*/ 3177309 h 4545650"/>
+              <a:gd name="connsiteX3" fmla="*/ 3851564 w 11395664"/>
+              <a:gd name="connsiteY3" fmla="*/ 3833091 h 4545650"/>
+              <a:gd name="connsiteX4" fmla="*/ 5135418 w 11395664"/>
+              <a:gd name="connsiteY4" fmla="*/ 4193309 h 4545650"/>
+              <a:gd name="connsiteX5" fmla="*/ 6899564 w 11395664"/>
+              <a:gd name="connsiteY5" fmla="*/ 4424218 h 4545650"/>
+              <a:gd name="connsiteX6" fmla="*/ 9134764 w 11395664"/>
+              <a:gd name="connsiteY6" fmla="*/ 4544291 h 4545650"/>
+              <a:gd name="connsiteX7" fmla="*/ 10677237 w 11395664"/>
+              <a:gd name="connsiteY7" fmla="*/ 4350327 h 4545650"/>
+              <a:gd name="connsiteX8" fmla="*/ 11342255 w 11395664"/>
+              <a:gd name="connsiteY8" fmla="*/ 4221018 h 4545650"/>
+              <a:gd name="connsiteX9" fmla="*/ 11305309 w 11395664"/>
+              <a:gd name="connsiteY9" fmla="*/ 3177309 h 4545650"/>
+              <a:gd name="connsiteX10" fmla="*/ 10908146 w 11395664"/>
+              <a:gd name="connsiteY10" fmla="*/ 2530763 h 4545650"/>
+              <a:gd name="connsiteX11" fmla="*/ 11046691 w 11395664"/>
+              <a:gd name="connsiteY11" fmla="*/ 1736436 h 4545650"/>
+              <a:gd name="connsiteX12" fmla="*/ 11342255 w 11395664"/>
+              <a:gd name="connsiteY12" fmla="*/ 1459345 h 4545650"/>
+              <a:gd name="connsiteX13" fmla="*/ 11369964 w 11395664"/>
+              <a:gd name="connsiteY13" fmla="*/ 1311563 h 4545650"/>
+              <a:gd name="connsiteX14" fmla="*/ 11379200 w 11395664"/>
+              <a:gd name="connsiteY14" fmla="*/ 1246909 h 4545650"/>
+              <a:gd name="connsiteX15" fmla="*/ 11369964 w 11395664"/>
+              <a:gd name="connsiteY15" fmla="*/ 1071418 h 4545650"/>
+              <a:gd name="connsiteX16" fmla="*/ 11351491 w 11395664"/>
+              <a:gd name="connsiteY16" fmla="*/ 951346 h 4545650"/>
+              <a:gd name="connsiteX17" fmla="*/ 11305309 w 11395664"/>
+              <a:gd name="connsiteY17" fmla="*/ 794327 h 4545650"/>
+              <a:gd name="connsiteX18" fmla="*/ 11296073 w 11395664"/>
+              <a:gd name="connsiteY18" fmla="*/ 738909 h 4545650"/>
+              <a:gd name="connsiteX19" fmla="*/ 11296073 w 11395664"/>
+              <a:gd name="connsiteY19" fmla="*/ 738909 h 4545650"/>
+              <a:gd name="connsiteX20" fmla="*/ 9337964 w 11395664"/>
+              <a:gd name="connsiteY20" fmla="*/ 766618 h 4545650"/>
+              <a:gd name="connsiteX21" fmla="*/ 7130473 w 11395664"/>
+              <a:gd name="connsiteY21" fmla="*/ 729672 h 4545650"/>
+              <a:gd name="connsiteX22" fmla="*/ 4784437 w 11395664"/>
+              <a:gd name="connsiteY22" fmla="*/ 895927 h 4545650"/>
+              <a:gd name="connsiteX23" fmla="*/ 3768437 w 11395664"/>
+              <a:gd name="connsiteY23" fmla="*/ 711200 h 4545650"/>
+              <a:gd name="connsiteX24" fmla="*/ 3103418 w 11395664"/>
+              <a:gd name="connsiteY24" fmla="*/ 378691 h 4545650"/>
+              <a:gd name="connsiteX25" fmla="*/ 2309091 w 11395664"/>
+              <a:gd name="connsiteY25" fmla="*/ 0 h 4545650"/>
+              <a:gd name="connsiteX26" fmla="*/ 1431637 w 11395664"/>
+              <a:gd name="connsiteY26" fmla="*/ 110836 h 4545650"/>
+              <a:gd name="connsiteX27" fmla="*/ 1034473 w 11395664"/>
+              <a:gd name="connsiteY27" fmla="*/ 720436 h 4545650"/>
+              <a:gd name="connsiteX28" fmla="*/ 323273 w 11395664"/>
+              <a:gd name="connsiteY28" fmla="*/ 997527 h 4545650"/>
+              <a:gd name="connsiteX29" fmla="*/ 0 w 11395664"/>
+              <a:gd name="connsiteY29" fmla="*/ 1524000 h 4545650"/>
+              <a:gd name="connsiteX30" fmla="*/ 295564 w 11395664"/>
+              <a:gd name="connsiteY30" fmla="*/ 2059709 h 4545650"/>
+              <a:gd name="connsiteX0" fmla="*/ 295564 w 11395664"/>
+              <a:gd name="connsiteY0" fmla="*/ 2059709 h 4545650"/>
+              <a:gd name="connsiteX1" fmla="*/ 1357746 w 11395664"/>
+              <a:gd name="connsiteY1" fmla="*/ 2373745 h 4545650"/>
+              <a:gd name="connsiteX2" fmla="*/ 2521528 w 11395664"/>
+              <a:gd name="connsiteY2" fmla="*/ 3177309 h 4545650"/>
+              <a:gd name="connsiteX3" fmla="*/ 3851564 w 11395664"/>
+              <a:gd name="connsiteY3" fmla="*/ 3833091 h 4545650"/>
+              <a:gd name="connsiteX4" fmla="*/ 5135418 w 11395664"/>
+              <a:gd name="connsiteY4" fmla="*/ 4193309 h 4545650"/>
+              <a:gd name="connsiteX5" fmla="*/ 6899564 w 11395664"/>
+              <a:gd name="connsiteY5" fmla="*/ 4424218 h 4545650"/>
+              <a:gd name="connsiteX6" fmla="*/ 9134764 w 11395664"/>
+              <a:gd name="connsiteY6" fmla="*/ 4544291 h 4545650"/>
+              <a:gd name="connsiteX7" fmla="*/ 10677237 w 11395664"/>
+              <a:gd name="connsiteY7" fmla="*/ 4350327 h 4545650"/>
+              <a:gd name="connsiteX8" fmla="*/ 11342255 w 11395664"/>
+              <a:gd name="connsiteY8" fmla="*/ 4221018 h 4545650"/>
+              <a:gd name="connsiteX9" fmla="*/ 11305309 w 11395664"/>
+              <a:gd name="connsiteY9" fmla="*/ 3177309 h 4545650"/>
+              <a:gd name="connsiteX10" fmla="*/ 10908146 w 11395664"/>
+              <a:gd name="connsiteY10" fmla="*/ 2530763 h 4545650"/>
+              <a:gd name="connsiteX11" fmla="*/ 11046691 w 11395664"/>
+              <a:gd name="connsiteY11" fmla="*/ 1736436 h 4545650"/>
+              <a:gd name="connsiteX12" fmla="*/ 11342255 w 11395664"/>
+              <a:gd name="connsiteY12" fmla="*/ 1459345 h 4545650"/>
+              <a:gd name="connsiteX13" fmla="*/ 11369964 w 11395664"/>
+              <a:gd name="connsiteY13" fmla="*/ 1311563 h 4545650"/>
+              <a:gd name="connsiteX14" fmla="*/ 11379200 w 11395664"/>
+              <a:gd name="connsiteY14" fmla="*/ 1246909 h 4545650"/>
+              <a:gd name="connsiteX15" fmla="*/ 11369964 w 11395664"/>
+              <a:gd name="connsiteY15" fmla="*/ 1071418 h 4545650"/>
+              <a:gd name="connsiteX16" fmla="*/ 11351491 w 11395664"/>
+              <a:gd name="connsiteY16" fmla="*/ 951346 h 4545650"/>
+              <a:gd name="connsiteX17" fmla="*/ 11305309 w 11395664"/>
+              <a:gd name="connsiteY17" fmla="*/ 794327 h 4545650"/>
+              <a:gd name="connsiteX18" fmla="*/ 11296073 w 11395664"/>
+              <a:gd name="connsiteY18" fmla="*/ 738909 h 4545650"/>
+              <a:gd name="connsiteX19" fmla="*/ 11296073 w 11395664"/>
+              <a:gd name="connsiteY19" fmla="*/ 738909 h 4545650"/>
+              <a:gd name="connsiteX20" fmla="*/ 9337964 w 11395664"/>
+              <a:gd name="connsiteY20" fmla="*/ 766618 h 4545650"/>
+              <a:gd name="connsiteX21" fmla="*/ 7130473 w 11395664"/>
+              <a:gd name="connsiteY21" fmla="*/ 729672 h 4545650"/>
+              <a:gd name="connsiteX22" fmla="*/ 4784437 w 11395664"/>
+              <a:gd name="connsiteY22" fmla="*/ 895927 h 4545650"/>
+              <a:gd name="connsiteX23" fmla="*/ 3768437 w 11395664"/>
+              <a:gd name="connsiteY23" fmla="*/ 711200 h 4545650"/>
+              <a:gd name="connsiteX24" fmla="*/ 3103418 w 11395664"/>
+              <a:gd name="connsiteY24" fmla="*/ 378691 h 4545650"/>
+              <a:gd name="connsiteX25" fmla="*/ 2309091 w 11395664"/>
+              <a:gd name="connsiteY25" fmla="*/ 0 h 4545650"/>
+              <a:gd name="connsiteX26" fmla="*/ 1431637 w 11395664"/>
+              <a:gd name="connsiteY26" fmla="*/ 110836 h 4545650"/>
+              <a:gd name="connsiteX27" fmla="*/ 1034473 w 11395664"/>
+              <a:gd name="connsiteY27" fmla="*/ 720436 h 4545650"/>
+              <a:gd name="connsiteX28" fmla="*/ 323273 w 11395664"/>
+              <a:gd name="connsiteY28" fmla="*/ 997527 h 4545650"/>
+              <a:gd name="connsiteX29" fmla="*/ 0 w 11395664"/>
+              <a:gd name="connsiteY29" fmla="*/ 1524000 h 4545650"/>
+              <a:gd name="connsiteX30" fmla="*/ 295564 w 11395664"/>
+              <a:gd name="connsiteY30" fmla="*/ 2059709 h 4545650"/>
+              <a:gd name="connsiteX0" fmla="*/ 295564 w 11395664"/>
+              <a:gd name="connsiteY0" fmla="*/ 2059709 h 4545650"/>
+              <a:gd name="connsiteX1" fmla="*/ 1357746 w 11395664"/>
+              <a:gd name="connsiteY1" fmla="*/ 2373745 h 4545650"/>
+              <a:gd name="connsiteX2" fmla="*/ 2521528 w 11395664"/>
+              <a:gd name="connsiteY2" fmla="*/ 3177309 h 4545650"/>
+              <a:gd name="connsiteX3" fmla="*/ 3851564 w 11395664"/>
+              <a:gd name="connsiteY3" fmla="*/ 3833091 h 4545650"/>
+              <a:gd name="connsiteX4" fmla="*/ 5135418 w 11395664"/>
+              <a:gd name="connsiteY4" fmla="*/ 4193309 h 4545650"/>
+              <a:gd name="connsiteX5" fmla="*/ 6899564 w 11395664"/>
+              <a:gd name="connsiteY5" fmla="*/ 4424218 h 4545650"/>
+              <a:gd name="connsiteX6" fmla="*/ 9134764 w 11395664"/>
+              <a:gd name="connsiteY6" fmla="*/ 4544291 h 4545650"/>
+              <a:gd name="connsiteX7" fmla="*/ 10677237 w 11395664"/>
+              <a:gd name="connsiteY7" fmla="*/ 4350327 h 4545650"/>
+              <a:gd name="connsiteX8" fmla="*/ 11342255 w 11395664"/>
+              <a:gd name="connsiteY8" fmla="*/ 4221018 h 4545650"/>
+              <a:gd name="connsiteX9" fmla="*/ 11305309 w 11395664"/>
+              <a:gd name="connsiteY9" fmla="*/ 3177309 h 4545650"/>
+              <a:gd name="connsiteX10" fmla="*/ 10908146 w 11395664"/>
+              <a:gd name="connsiteY10" fmla="*/ 2530763 h 4545650"/>
+              <a:gd name="connsiteX11" fmla="*/ 11046691 w 11395664"/>
+              <a:gd name="connsiteY11" fmla="*/ 1736436 h 4545650"/>
+              <a:gd name="connsiteX12" fmla="*/ 11342255 w 11395664"/>
+              <a:gd name="connsiteY12" fmla="*/ 1459345 h 4545650"/>
+              <a:gd name="connsiteX13" fmla="*/ 11369964 w 11395664"/>
+              <a:gd name="connsiteY13" fmla="*/ 1311563 h 4545650"/>
+              <a:gd name="connsiteX14" fmla="*/ 11379200 w 11395664"/>
+              <a:gd name="connsiteY14" fmla="*/ 1246909 h 4545650"/>
+              <a:gd name="connsiteX15" fmla="*/ 11369964 w 11395664"/>
+              <a:gd name="connsiteY15" fmla="*/ 1071418 h 4545650"/>
+              <a:gd name="connsiteX16" fmla="*/ 11351491 w 11395664"/>
+              <a:gd name="connsiteY16" fmla="*/ 951346 h 4545650"/>
+              <a:gd name="connsiteX17" fmla="*/ 11305309 w 11395664"/>
+              <a:gd name="connsiteY17" fmla="*/ 794327 h 4545650"/>
+              <a:gd name="connsiteX18" fmla="*/ 11296073 w 11395664"/>
+              <a:gd name="connsiteY18" fmla="*/ 738909 h 4545650"/>
+              <a:gd name="connsiteX19" fmla="*/ 11296073 w 11395664"/>
+              <a:gd name="connsiteY19" fmla="*/ 738909 h 4545650"/>
+              <a:gd name="connsiteX20" fmla="*/ 9337964 w 11395664"/>
+              <a:gd name="connsiteY20" fmla="*/ 766618 h 4545650"/>
+              <a:gd name="connsiteX21" fmla="*/ 7130473 w 11395664"/>
+              <a:gd name="connsiteY21" fmla="*/ 729672 h 4545650"/>
+              <a:gd name="connsiteX22" fmla="*/ 4784437 w 11395664"/>
+              <a:gd name="connsiteY22" fmla="*/ 895927 h 4545650"/>
+              <a:gd name="connsiteX23" fmla="*/ 3768437 w 11395664"/>
+              <a:gd name="connsiteY23" fmla="*/ 711200 h 4545650"/>
+              <a:gd name="connsiteX24" fmla="*/ 3103418 w 11395664"/>
+              <a:gd name="connsiteY24" fmla="*/ 378691 h 4545650"/>
+              <a:gd name="connsiteX25" fmla="*/ 2309091 w 11395664"/>
+              <a:gd name="connsiteY25" fmla="*/ 0 h 4545650"/>
+              <a:gd name="connsiteX26" fmla="*/ 1431637 w 11395664"/>
+              <a:gd name="connsiteY26" fmla="*/ 110836 h 4545650"/>
+              <a:gd name="connsiteX27" fmla="*/ 1034473 w 11395664"/>
+              <a:gd name="connsiteY27" fmla="*/ 720436 h 4545650"/>
+              <a:gd name="connsiteX28" fmla="*/ 323273 w 11395664"/>
+              <a:gd name="connsiteY28" fmla="*/ 997527 h 4545650"/>
+              <a:gd name="connsiteX29" fmla="*/ 0 w 11395664"/>
+              <a:gd name="connsiteY29" fmla="*/ 1524000 h 4545650"/>
+              <a:gd name="connsiteX30" fmla="*/ 295564 w 11395664"/>
+              <a:gd name="connsiteY30" fmla="*/ 2059709 h 4545650"/>
+              <a:gd name="connsiteX0" fmla="*/ 295564 w 11395664"/>
+              <a:gd name="connsiteY0" fmla="*/ 2059709 h 4545650"/>
+              <a:gd name="connsiteX1" fmla="*/ 1357746 w 11395664"/>
+              <a:gd name="connsiteY1" fmla="*/ 2373745 h 4545650"/>
+              <a:gd name="connsiteX2" fmla="*/ 2521528 w 11395664"/>
+              <a:gd name="connsiteY2" fmla="*/ 3177309 h 4545650"/>
+              <a:gd name="connsiteX3" fmla="*/ 3851564 w 11395664"/>
+              <a:gd name="connsiteY3" fmla="*/ 3833091 h 4545650"/>
+              <a:gd name="connsiteX4" fmla="*/ 5135418 w 11395664"/>
+              <a:gd name="connsiteY4" fmla="*/ 4193309 h 4545650"/>
+              <a:gd name="connsiteX5" fmla="*/ 6899564 w 11395664"/>
+              <a:gd name="connsiteY5" fmla="*/ 4424218 h 4545650"/>
+              <a:gd name="connsiteX6" fmla="*/ 9134764 w 11395664"/>
+              <a:gd name="connsiteY6" fmla="*/ 4544291 h 4545650"/>
+              <a:gd name="connsiteX7" fmla="*/ 10677237 w 11395664"/>
+              <a:gd name="connsiteY7" fmla="*/ 4350327 h 4545650"/>
+              <a:gd name="connsiteX8" fmla="*/ 11342255 w 11395664"/>
+              <a:gd name="connsiteY8" fmla="*/ 4221018 h 4545650"/>
+              <a:gd name="connsiteX9" fmla="*/ 11305309 w 11395664"/>
+              <a:gd name="connsiteY9" fmla="*/ 3177309 h 4545650"/>
+              <a:gd name="connsiteX10" fmla="*/ 10908146 w 11395664"/>
+              <a:gd name="connsiteY10" fmla="*/ 2530763 h 4545650"/>
+              <a:gd name="connsiteX11" fmla="*/ 11046691 w 11395664"/>
+              <a:gd name="connsiteY11" fmla="*/ 1736436 h 4545650"/>
+              <a:gd name="connsiteX12" fmla="*/ 11342255 w 11395664"/>
+              <a:gd name="connsiteY12" fmla="*/ 1459345 h 4545650"/>
+              <a:gd name="connsiteX13" fmla="*/ 11369964 w 11395664"/>
+              <a:gd name="connsiteY13" fmla="*/ 1311563 h 4545650"/>
+              <a:gd name="connsiteX14" fmla="*/ 11379200 w 11395664"/>
+              <a:gd name="connsiteY14" fmla="*/ 1246909 h 4545650"/>
+              <a:gd name="connsiteX15" fmla="*/ 11369964 w 11395664"/>
+              <a:gd name="connsiteY15" fmla="*/ 1071418 h 4545650"/>
+              <a:gd name="connsiteX16" fmla="*/ 11351491 w 11395664"/>
+              <a:gd name="connsiteY16" fmla="*/ 951346 h 4545650"/>
+              <a:gd name="connsiteX17" fmla="*/ 11305309 w 11395664"/>
+              <a:gd name="connsiteY17" fmla="*/ 794327 h 4545650"/>
+              <a:gd name="connsiteX18" fmla="*/ 11296073 w 11395664"/>
+              <a:gd name="connsiteY18" fmla="*/ 738909 h 4545650"/>
+              <a:gd name="connsiteX19" fmla="*/ 10751127 w 11395664"/>
+              <a:gd name="connsiteY19" fmla="*/ 544945 h 4545650"/>
+              <a:gd name="connsiteX20" fmla="*/ 9337964 w 11395664"/>
+              <a:gd name="connsiteY20" fmla="*/ 766618 h 4545650"/>
+              <a:gd name="connsiteX21" fmla="*/ 7130473 w 11395664"/>
+              <a:gd name="connsiteY21" fmla="*/ 729672 h 4545650"/>
+              <a:gd name="connsiteX22" fmla="*/ 4784437 w 11395664"/>
+              <a:gd name="connsiteY22" fmla="*/ 895927 h 4545650"/>
+              <a:gd name="connsiteX23" fmla="*/ 3768437 w 11395664"/>
+              <a:gd name="connsiteY23" fmla="*/ 711200 h 4545650"/>
+              <a:gd name="connsiteX24" fmla="*/ 3103418 w 11395664"/>
+              <a:gd name="connsiteY24" fmla="*/ 378691 h 4545650"/>
+              <a:gd name="connsiteX25" fmla="*/ 2309091 w 11395664"/>
+              <a:gd name="connsiteY25" fmla="*/ 0 h 4545650"/>
+              <a:gd name="connsiteX26" fmla="*/ 1431637 w 11395664"/>
+              <a:gd name="connsiteY26" fmla="*/ 110836 h 4545650"/>
+              <a:gd name="connsiteX27" fmla="*/ 1034473 w 11395664"/>
+              <a:gd name="connsiteY27" fmla="*/ 720436 h 4545650"/>
+              <a:gd name="connsiteX28" fmla="*/ 323273 w 11395664"/>
+              <a:gd name="connsiteY28" fmla="*/ 997527 h 4545650"/>
+              <a:gd name="connsiteX29" fmla="*/ 0 w 11395664"/>
+              <a:gd name="connsiteY29" fmla="*/ 1524000 h 4545650"/>
+              <a:gd name="connsiteX30" fmla="*/ 295564 w 11395664"/>
+              <a:gd name="connsiteY30" fmla="*/ 2059709 h 4545650"/>
+              <a:gd name="connsiteX0" fmla="*/ 295564 w 11395664"/>
+              <a:gd name="connsiteY0" fmla="*/ 2059709 h 4545650"/>
+              <a:gd name="connsiteX1" fmla="*/ 1357746 w 11395664"/>
+              <a:gd name="connsiteY1" fmla="*/ 2373745 h 4545650"/>
+              <a:gd name="connsiteX2" fmla="*/ 2521528 w 11395664"/>
+              <a:gd name="connsiteY2" fmla="*/ 3177309 h 4545650"/>
+              <a:gd name="connsiteX3" fmla="*/ 3851564 w 11395664"/>
+              <a:gd name="connsiteY3" fmla="*/ 3833091 h 4545650"/>
+              <a:gd name="connsiteX4" fmla="*/ 5135418 w 11395664"/>
+              <a:gd name="connsiteY4" fmla="*/ 4193309 h 4545650"/>
+              <a:gd name="connsiteX5" fmla="*/ 6899564 w 11395664"/>
+              <a:gd name="connsiteY5" fmla="*/ 4424218 h 4545650"/>
+              <a:gd name="connsiteX6" fmla="*/ 9134764 w 11395664"/>
+              <a:gd name="connsiteY6" fmla="*/ 4544291 h 4545650"/>
+              <a:gd name="connsiteX7" fmla="*/ 10677237 w 11395664"/>
+              <a:gd name="connsiteY7" fmla="*/ 4350327 h 4545650"/>
+              <a:gd name="connsiteX8" fmla="*/ 11342255 w 11395664"/>
+              <a:gd name="connsiteY8" fmla="*/ 4221018 h 4545650"/>
+              <a:gd name="connsiteX9" fmla="*/ 11305309 w 11395664"/>
+              <a:gd name="connsiteY9" fmla="*/ 3177309 h 4545650"/>
+              <a:gd name="connsiteX10" fmla="*/ 10908146 w 11395664"/>
+              <a:gd name="connsiteY10" fmla="*/ 2530763 h 4545650"/>
+              <a:gd name="connsiteX11" fmla="*/ 11046691 w 11395664"/>
+              <a:gd name="connsiteY11" fmla="*/ 1736436 h 4545650"/>
+              <a:gd name="connsiteX12" fmla="*/ 11342255 w 11395664"/>
+              <a:gd name="connsiteY12" fmla="*/ 1459345 h 4545650"/>
+              <a:gd name="connsiteX13" fmla="*/ 11369964 w 11395664"/>
+              <a:gd name="connsiteY13" fmla="*/ 1311563 h 4545650"/>
+              <a:gd name="connsiteX14" fmla="*/ 11379200 w 11395664"/>
+              <a:gd name="connsiteY14" fmla="*/ 1246909 h 4545650"/>
+              <a:gd name="connsiteX15" fmla="*/ 11369964 w 11395664"/>
+              <a:gd name="connsiteY15" fmla="*/ 1071418 h 4545650"/>
+              <a:gd name="connsiteX16" fmla="*/ 11351491 w 11395664"/>
+              <a:gd name="connsiteY16" fmla="*/ 951346 h 4545650"/>
+              <a:gd name="connsiteX17" fmla="*/ 11305309 w 11395664"/>
+              <a:gd name="connsiteY17" fmla="*/ 794327 h 4545650"/>
+              <a:gd name="connsiteX18" fmla="*/ 11194473 w 11395664"/>
+              <a:gd name="connsiteY18" fmla="*/ 711200 h 4545650"/>
+              <a:gd name="connsiteX19" fmla="*/ 10751127 w 11395664"/>
+              <a:gd name="connsiteY19" fmla="*/ 544945 h 4545650"/>
+              <a:gd name="connsiteX20" fmla="*/ 9337964 w 11395664"/>
+              <a:gd name="connsiteY20" fmla="*/ 766618 h 4545650"/>
+              <a:gd name="connsiteX21" fmla="*/ 7130473 w 11395664"/>
+              <a:gd name="connsiteY21" fmla="*/ 729672 h 4545650"/>
+              <a:gd name="connsiteX22" fmla="*/ 4784437 w 11395664"/>
+              <a:gd name="connsiteY22" fmla="*/ 895927 h 4545650"/>
+              <a:gd name="connsiteX23" fmla="*/ 3768437 w 11395664"/>
+              <a:gd name="connsiteY23" fmla="*/ 711200 h 4545650"/>
+              <a:gd name="connsiteX24" fmla="*/ 3103418 w 11395664"/>
+              <a:gd name="connsiteY24" fmla="*/ 378691 h 4545650"/>
+              <a:gd name="connsiteX25" fmla="*/ 2309091 w 11395664"/>
+              <a:gd name="connsiteY25" fmla="*/ 0 h 4545650"/>
+              <a:gd name="connsiteX26" fmla="*/ 1431637 w 11395664"/>
+              <a:gd name="connsiteY26" fmla="*/ 110836 h 4545650"/>
+              <a:gd name="connsiteX27" fmla="*/ 1034473 w 11395664"/>
+              <a:gd name="connsiteY27" fmla="*/ 720436 h 4545650"/>
+              <a:gd name="connsiteX28" fmla="*/ 323273 w 11395664"/>
+              <a:gd name="connsiteY28" fmla="*/ 997527 h 4545650"/>
+              <a:gd name="connsiteX29" fmla="*/ 0 w 11395664"/>
+              <a:gd name="connsiteY29" fmla="*/ 1524000 h 4545650"/>
+              <a:gd name="connsiteX30" fmla="*/ 295564 w 11395664"/>
+              <a:gd name="connsiteY30" fmla="*/ 2059709 h 4545650"/>
+              <a:gd name="connsiteX0" fmla="*/ 295564 w 11395664"/>
+              <a:gd name="connsiteY0" fmla="*/ 2059709 h 4545650"/>
+              <a:gd name="connsiteX1" fmla="*/ 1357746 w 11395664"/>
+              <a:gd name="connsiteY1" fmla="*/ 2373745 h 4545650"/>
+              <a:gd name="connsiteX2" fmla="*/ 2521528 w 11395664"/>
+              <a:gd name="connsiteY2" fmla="*/ 3177309 h 4545650"/>
+              <a:gd name="connsiteX3" fmla="*/ 3851564 w 11395664"/>
+              <a:gd name="connsiteY3" fmla="*/ 3833091 h 4545650"/>
+              <a:gd name="connsiteX4" fmla="*/ 5135418 w 11395664"/>
+              <a:gd name="connsiteY4" fmla="*/ 4193309 h 4545650"/>
+              <a:gd name="connsiteX5" fmla="*/ 6899564 w 11395664"/>
+              <a:gd name="connsiteY5" fmla="*/ 4424218 h 4545650"/>
+              <a:gd name="connsiteX6" fmla="*/ 9134764 w 11395664"/>
+              <a:gd name="connsiteY6" fmla="*/ 4544291 h 4545650"/>
+              <a:gd name="connsiteX7" fmla="*/ 10677237 w 11395664"/>
+              <a:gd name="connsiteY7" fmla="*/ 4350327 h 4545650"/>
+              <a:gd name="connsiteX8" fmla="*/ 11342255 w 11395664"/>
+              <a:gd name="connsiteY8" fmla="*/ 4221018 h 4545650"/>
+              <a:gd name="connsiteX9" fmla="*/ 11305309 w 11395664"/>
+              <a:gd name="connsiteY9" fmla="*/ 3177309 h 4545650"/>
+              <a:gd name="connsiteX10" fmla="*/ 10908146 w 11395664"/>
+              <a:gd name="connsiteY10" fmla="*/ 2530763 h 4545650"/>
+              <a:gd name="connsiteX11" fmla="*/ 11046691 w 11395664"/>
+              <a:gd name="connsiteY11" fmla="*/ 1736436 h 4545650"/>
+              <a:gd name="connsiteX12" fmla="*/ 11342255 w 11395664"/>
+              <a:gd name="connsiteY12" fmla="*/ 1459345 h 4545650"/>
+              <a:gd name="connsiteX13" fmla="*/ 11369964 w 11395664"/>
+              <a:gd name="connsiteY13" fmla="*/ 1311563 h 4545650"/>
+              <a:gd name="connsiteX14" fmla="*/ 11379200 w 11395664"/>
+              <a:gd name="connsiteY14" fmla="*/ 1246909 h 4545650"/>
+              <a:gd name="connsiteX15" fmla="*/ 11369964 w 11395664"/>
+              <a:gd name="connsiteY15" fmla="*/ 1071418 h 4545650"/>
+              <a:gd name="connsiteX16" fmla="*/ 11351491 w 11395664"/>
+              <a:gd name="connsiteY16" fmla="*/ 951346 h 4545650"/>
+              <a:gd name="connsiteX17" fmla="*/ 11194473 w 11395664"/>
+              <a:gd name="connsiteY17" fmla="*/ 711200 h 4545650"/>
+              <a:gd name="connsiteX18" fmla="*/ 10751127 w 11395664"/>
+              <a:gd name="connsiteY18" fmla="*/ 544945 h 4545650"/>
+              <a:gd name="connsiteX19" fmla="*/ 9337964 w 11395664"/>
+              <a:gd name="connsiteY19" fmla="*/ 766618 h 4545650"/>
+              <a:gd name="connsiteX20" fmla="*/ 7130473 w 11395664"/>
+              <a:gd name="connsiteY20" fmla="*/ 729672 h 4545650"/>
+              <a:gd name="connsiteX21" fmla="*/ 4784437 w 11395664"/>
+              <a:gd name="connsiteY21" fmla="*/ 895927 h 4545650"/>
+              <a:gd name="connsiteX22" fmla="*/ 3768437 w 11395664"/>
+              <a:gd name="connsiteY22" fmla="*/ 711200 h 4545650"/>
+              <a:gd name="connsiteX23" fmla="*/ 3103418 w 11395664"/>
+              <a:gd name="connsiteY23" fmla="*/ 378691 h 4545650"/>
+              <a:gd name="connsiteX24" fmla="*/ 2309091 w 11395664"/>
+              <a:gd name="connsiteY24" fmla="*/ 0 h 4545650"/>
+              <a:gd name="connsiteX25" fmla="*/ 1431637 w 11395664"/>
+              <a:gd name="connsiteY25" fmla="*/ 110836 h 4545650"/>
+              <a:gd name="connsiteX26" fmla="*/ 1034473 w 11395664"/>
+              <a:gd name="connsiteY26" fmla="*/ 720436 h 4545650"/>
+              <a:gd name="connsiteX27" fmla="*/ 323273 w 11395664"/>
+              <a:gd name="connsiteY27" fmla="*/ 997527 h 4545650"/>
+              <a:gd name="connsiteX28" fmla="*/ 0 w 11395664"/>
+              <a:gd name="connsiteY28" fmla="*/ 1524000 h 4545650"/>
+              <a:gd name="connsiteX29" fmla="*/ 295564 w 11395664"/>
+              <a:gd name="connsiteY29" fmla="*/ 2059709 h 4545650"/>
+              <a:gd name="connsiteX0" fmla="*/ 295564 w 11395664"/>
+              <a:gd name="connsiteY0" fmla="*/ 2059709 h 4545650"/>
+              <a:gd name="connsiteX1" fmla="*/ 1357746 w 11395664"/>
+              <a:gd name="connsiteY1" fmla="*/ 2373745 h 4545650"/>
+              <a:gd name="connsiteX2" fmla="*/ 2521528 w 11395664"/>
+              <a:gd name="connsiteY2" fmla="*/ 3177309 h 4545650"/>
+              <a:gd name="connsiteX3" fmla="*/ 3851564 w 11395664"/>
+              <a:gd name="connsiteY3" fmla="*/ 3833091 h 4545650"/>
+              <a:gd name="connsiteX4" fmla="*/ 5135418 w 11395664"/>
+              <a:gd name="connsiteY4" fmla="*/ 4193309 h 4545650"/>
+              <a:gd name="connsiteX5" fmla="*/ 6899564 w 11395664"/>
+              <a:gd name="connsiteY5" fmla="*/ 4424218 h 4545650"/>
+              <a:gd name="connsiteX6" fmla="*/ 9134764 w 11395664"/>
+              <a:gd name="connsiteY6" fmla="*/ 4544291 h 4545650"/>
+              <a:gd name="connsiteX7" fmla="*/ 10677237 w 11395664"/>
+              <a:gd name="connsiteY7" fmla="*/ 4350327 h 4545650"/>
+              <a:gd name="connsiteX8" fmla="*/ 11342255 w 11395664"/>
+              <a:gd name="connsiteY8" fmla="*/ 4221018 h 4545650"/>
+              <a:gd name="connsiteX9" fmla="*/ 11305309 w 11395664"/>
+              <a:gd name="connsiteY9" fmla="*/ 3177309 h 4545650"/>
+              <a:gd name="connsiteX10" fmla="*/ 10908146 w 11395664"/>
+              <a:gd name="connsiteY10" fmla="*/ 2530763 h 4545650"/>
+              <a:gd name="connsiteX11" fmla="*/ 11046691 w 11395664"/>
+              <a:gd name="connsiteY11" fmla="*/ 1736436 h 4545650"/>
+              <a:gd name="connsiteX12" fmla="*/ 11342255 w 11395664"/>
+              <a:gd name="connsiteY12" fmla="*/ 1459345 h 4545650"/>
+              <a:gd name="connsiteX13" fmla="*/ 11369964 w 11395664"/>
+              <a:gd name="connsiteY13" fmla="*/ 1311563 h 4545650"/>
+              <a:gd name="connsiteX14" fmla="*/ 11379200 w 11395664"/>
+              <a:gd name="connsiteY14" fmla="*/ 1246909 h 4545650"/>
+              <a:gd name="connsiteX15" fmla="*/ 11351491 w 11395664"/>
+              <a:gd name="connsiteY15" fmla="*/ 951346 h 4545650"/>
+              <a:gd name="connsiteX16" fmla="*/ 11194473 w 11395664"/>
+              <a:gd name="connsiteY16" fmla="*/ 711200 h 4545650"/>
+              <a:gd name="connsiteX17" fmla="*/ 10751127 w 11395664"/>
+              <a:gd name="connsiteY17" fmla="*/ 544945 h 4545650"/>
+              <a:gd name="connsiteX18" fmla="*/ 9337964 w 11395664"/>
+              <a:gd name="connsiteY18" fmla="*/ 766618 h 4545650"/>
+              <a:gd name="connsiteX19" fmla="*/ 7130473 w 11395664"/>
+              <a:gd name="connsiteY19" fmla="*/ 729672 h 4545650"/>
+              <a:gd name="connsiteX20" fmla="*/ 4784437 w 11395664"/>
+              <a:gd name="connsiteY20" fmla="*/ 895927 h 4545650"/>
+              <a:gd name="connsiteX21" fmla="*/ 3768437 w 11395664"/>
+              <a:gd name="connsiteY21" fmla="*/ 711200 h 4545650"/>
+              <a:gd name="connsiteX22" fmla="*/ 3103418 w 11395664"/>
+              <a:gd name="connsiteY22" fmla="*/ 378691 h 4545650"/>
+              <a:gd name="connsiteX23" fmla="*/ 2309091 w 11395664"/>
+              <a:gd name="connsiteY23" fmla="*/ 0 h 4545650"/>
+              <a:gd name="connsiteX24" fmla="*/ 1431637 w 11395664"/>
+              <a:gd name="connsiteY24" fmla="*/ 110836 h 4545650"/>
+              <a:gd name="connsiteX25" fmla="*/ 1034473 w 11395664"/>
+              <a:gd name="connsiteY25" fmla="*/ 720436 h 4545650"/>
+              <a:gd name="connsiteX26" fmla="*/ 323273 w 11395664"/>
+              <a:gd name="connsiteY26" fmla="*/ 997527 h 4545650"/>
+              <a:gd name="connsiteX27" fmla="*/ 0 w 11395664"/>
+              <a:gd name="connsiteY27" fmla="*/ 1524000 h 4545650"/>
+              <a:gd name="connsiteX28" fmla="*/ 295564 w 11395664"/>
+              <a:gd name="connsiteY28" fmla="*/ 2059709 h 4545650"/>
+              <a:gd name="connsiteX0" fmla="*/ 295564 w 11395664"/>
+              <a:gd name="connsiteY0" fmla="*/ 2059709 h 4545650"/>
+              <a:gd name="connsiteX1" fmla="*/ 1357746 w 11395664"/>
+              <a:gd name="connsiteY1" fmla="*/ 2373745 h 4545650"/>
+              <a:gd name="connsiteX2" fmla="*/ 2521528 w 11395664"/>
+              <a:gd name="connsiteY2" fmla="*/ 3177309 h 4545650"/>
+              <a:gd name="connsiteX3" fmla="*/ 3851564 w 11395664"/>
+              <a:gd name="connsiteY3" fmla="*/ 3833091 h 4545650"/>
+              <a:gd name="connsiteX4" fmla="*/ 5135418 w 11395664"/>
+              <a:gd name="connsiteY4" fmla="*/ 4193309 h 4545650"/>
+              <a:gd name="connsiteX5" fmla="*/ 6899564 w 11395664"/>
+              <a:gd name="connsiteY5" fmla="*/ 4424218 h 4545650"/>
+              <a:gd name="connsiteX6" fmla="*/ 9134764 w 11395664"/>
+              <a:gd name="connsiteY6" fmla="*/ 4544291 h 4545650"/>
+              <a:gd name="connsiteX7" fmla="*/ 10677237 w 11395664"/>
+              <a:gd name="connsiteY7" fmla="*/ 4350327 h 4545650"/>
+              <a:gd name="connsiteX8" fmla="*/ 11342255 w 11395664"/>
+              <a:gd name="connsiteY8" fmla="*/ 4221018 h 4545650"/>
+              <a:gd name="connsiteX9" fmla="*/ 11305309 w 11395664"/>
+              <a:gd name="connsiteY9" fmla="*/ 3177309 h 4545650"/>
+              <a:gd name="connsiteX10" fmla="*/ 10908146 w 11395664"/>
+              <a:gd name="connsiteY10" fmla="*/ 2530763 h 4545650"/>
+              <a:gd name="connsiteX11" fmla="*/ 11046691 w 11395664"/>
+              <a:gd name="connsiteY11" fmla="*/ 1736436 h 4545650"/>
+              <a:gd name="connsiteX12" fmla="*/ 11342255 w 11395664"/>
+              <a:gd name="connsiteY12" fmla="*/ 1459345 h 4545650"/>
+              <a:gd name="connsiteX13" fmla="*/ 11379200 w 11395664"/>
+              <a:gd name="connsiteY13" fmla="*/ 1246909 h 4545650"/>
+              <a:gd name="connsiteX14" fmla="*/ 11351491 w 11395664"/>
+              <a:gd name="connsiteY14" fmla="*/ 951346 h 4545650"/>
+              <a:gd name="connsiteX15" fmla="*/ 11194473 w 11395664"/>
+              <a:gd name="connsiteY15" fmla="*/ 711200 h 4545650"/>
+              <a:gd name="connsiteX16" fmla="*/ 10751127 w 11395664"/>
+              <a:gd name="connsiteY16" fmla="*/ 544945 h 4545650"/>
+              <a:gd name="connsiteX17" fmla="*/ 9337964 w 11395664"/>
+              <a:gd name="connsiteY17" fmla="*/ 766618 h 4545650"/>
+              <a:gd name="connsiteX18" fmla="*/ 7130473 w 11395664"/>
+              <a:gd name="connsiteY18" fmla="*/ 729672 h 4545650"/>
+              <a:gd name="connsiteX19" fmla="*/ 4784437 w 11395664"/>
+              <a:gd name="connsiteY19" fmla="*/ 895927 h 4545650"/>
+              <a:gd name="connsiteX20" fmla="*/ 3768437 w 11395664"/>
+              <a:gd name="connsiteY20" fmla="*/ 711200 h 4545650"/>
+              <a:gd name="connsiteX21" fmla="*/ 3103418 w 11395664"/>
+              <a:gd name="connsiteY21" fmla="*/ 378691 h 4545650"/>
+              <a:gd name="connsiteX22" fmla="*/ 2309091 w 11395664"/>
+              <a:gd name="connsiteY22" fmla="*/ 0 h 4545650"/>
+              <a:gd name="connsiteX23" fmla="*/ 1431637 w 11395664"/>
+              <a:gd name="connsiteY23" fmla="*/ 110836 h 4545650"/>
+              <a:gd name="connsiteX24" fmla="*/ 1034473 w 11395664"/>
+              <a:gd name="connsiteY24" fmla="*/ 720436 h 4545650"/>
+              <a:gd name="connsiteX25" fmla="*/ 323273 w 11395664"/>
+              <a:gd name="connsiteY25" fmla="*/ 997527 h 4545650"/>
+              <a:gd name="connsiteX26" fmla="*/ 0 w 11395664"/>
+              <a:gd name="connsiteY26" fmla="*/ 1524000 h 4545650"/>
+              <a:gd name="connsiteX27" fmla="*/ 295564 w 11395664"/>
+              <a:gd name="connsiteY27" fmla="*/ 2059709 h 4545650"/>
+              <a:gd name="connsiteX0" fmla="*/ 295564 w 11395664"/>
+              <a:gd name="connsiteY0" fmla="*/ 2059709 h 4545650"/>
+              <a:gd name="connsiteX1" fmla="*/ 1357746 w 11395664"/>
+              <a:gd name="connsiteY1" fmla="*/ 2373745 h 4545650"/>
+              <a:gd name="connsiteX2" fmla="*/ 2521528 w 11395664"/>
+              <a:gd name="connsiteY2" fmla="*/ 3177309 h 4545650"/>
+              <a:gd name="connsiteX3" fmla="*/ 3851564 w 11395664"/>
+              <a:gd name="connsiteY3" fmla="*/ 3833091 h 4545650"/>
+              <a:gd name="connsiteX4" fmla="*/ 5135418 w 11395664"/>
+              <a:gd name="connsiteY4" fmla="*/ 4193309 h 4545650"/>
+              <a:gd name="connsiteX5" fmla="*/ 6899564 w 11395664"/>
+              <a:gd name="connsiteY5" fmla="*/ 4424218 h 4545650"/>
+              <a:gd name="connsiteX6" fmla="*/ 9134764 w 11395664"/>
+              <a:gd name="connsiteY6" fmla="*/ 4544291 h 4545650"/>
+              <a:gd name="connsiteX7" fmla="*/ 10677237 w 11395664"/>
+              <a:gd name="connsiteY7" fmla="*/ 4350327 h 4545650"/>
+              <a:gd name="connsiteX8" fmla="*/ 11342255 w 11395664"/>
+              <a:gd name="connsiteY8" fmla="*/ 4221018 h 4545650"/>
+              <a:gd name="connsiteX9" fmla="*/ 11305309 w 11395664"/>
+              <a:gd name="connsiteY9" fmla="*/ 3177309 h 4545650"/>
+              <a:gd name="connsiteX10" fmla="*/ 10908146 w 11395664"/>
+              <a:gd name="connsiteY10" fmla="*/ 2530763 h 4545650"/>
+              <a:gd name="connsiteX11" fmla="*/ 11046691 w 11395664"/>
+              <a:gd name="connsiteY11" fmla="*/ 1736436 h 4545650"/>
+              <a:gd name="connsiteX12" fmla="*/ 11342255 w 11395664"/>
+              <a:gd name="connsiteY12" fmla="*/ 1459345 h 4545650"/>
+              <a:gd name="connsiteX13" fmla="*/ 11379200 w 11395664"/>
+              <a:gd name="connsiteY13" fmla="*/ 1246909 h 4545650"/>
+              <a:gd name="connsiteX14" fmla="*/ 11351491 w 11395664"/>
+              <a:gd name="connsiteY14" fmla="*/ 951346 h 4545650"/>
+              <a:gd name="connsiteX15" fmla="*/ 11194473 w 11395664"/>
+              <a:gd name="connsiteY15" fmla="*/ 711200 h 4545650"/>
+              <a:gd name="connsiteX16" fmla="*/ 10492508 w 11395664"/>
+              <a:gd name="connsiteY16" fmla="*/ 775854 h 4545650"/>
+              <a:gd name="connsiteX17" fmla="*/ 9337964 w 11395664"/>
+              <a:gd name="connsiteY17" fmla="*/ 766618 h 4545650"/>
+              <a:gd name="connsiteX18" fmla="*/ 7130473 w 11395664"/>
+              <a:gd name="connsiteY18" fmla="*/ 729672 h 4545650"/>
+              <a:gd name="connsiteX19" fmla="*/ 4784437 w 11395664"/>
+              <a:gd name="connsiteY19" fmla="*/ 895927 h 4545650"/>
+              <a:gd name="connsiteX20" fmla="*/ 3768437 w 11395664"/>
+              <a:gd name="connsiteY20" fmla="*/ 711200 h 4545650"/>
+              <a:gd name="connsiteX21" fmla="*/ 3103418 w 11395664"/>
+              <a:gd name="connsiteY21" fmla="*/ 378691 h 4545650"/>
+              <a:gd name="connsiteX22" fmla="*/ 2309091 w 11395664"/>
+              <a:gd name="connsiteY22" fmla="*/ 0 h 4545650"/>
+              <a:gd name="connsiteX23" fmla="*/ 1431637 w 11395664"/>
+              <a:gd name="connsiteY23" fmla="*/ 110836 h 4545650"/>
+              <a:gd name="connsiteX24" fmla="*/ 1034473 w 11395664"/>
+              <a:gd name="connsiteY24" fmla="*/ 720436 h 4545650"/>
+              <a:gd name="connsiteX25" fmla="*/ 323273 w 11395664"/>
+              <a:gd name="connsiteY25" fmla="*/ 997527 h 4545650"/>
+              <a:gd name="connsiteX26" fmla="*/ 0 w 11395664"/>
+              <a:gd name="connsiteY26" fmla="*/ 1524000 h 4545650"/>
+              <a:gd name="connsiteX27" fmla="*/ 295564 w 11395664"/>
+              <a:gd name="connsiteY27" fmla="*/ 2059709 h 4545650"/>
+              <a:gd name="connsiteX0" fmla="*/ 295564 w 11395664"/>
+              <a:gd name="connsiteY0" fmla="*/ 2059709 h 4545650"/>
+              <a:gd name="connsiteX1" fmla="*/ 1357746 w 11395664"/>
+              <a:gd name="connsiteY1" fmla="*/ 2373745 h 4545650"/>
+              <a:gd name="connsiteX2" fmla="*/ 2521528 w 11395664"/>
+              <a:gd name="connsiteY2" fmla="*/ 3177309 h 4545650"/>
+              <a:gd name="connsiteX3" fmla="*/ 3851564 w 11395664"/>
+              <a:gd name="connsiteY3" fmla="*/ 3833091 h 4545650"/>
+              <a:gd name="connsiteX4" fmla="*/ 5135418 w 11395664"/>
+              <a:gd name="connsiteY4" fmla="*/ 4193309 h 4545650"/>
+              <a:gd name="connsiteX5" fmla="*/ 6899564 w 11395664"/>
+              <a:gd name="connsiteY5" fmla="*/ 4424218 h 4545650"/>
+              <a:gd name="connsiteX6" fmla="*/ 9134764 w 11395664"/>
+              <a:gd name="connsiteY6" fmla="*/ 4544291 h 4545650"/>
+              <a:gd name="connsiteX7" fmla="*/ 10677237 w 11395664"/>
+              <a:gd name="connsiteY7" fmla="*/ 4350327 h 4545650"/>
+              <a:gd name="connsiteX8" fmla="*/ 11342255 w 11395664"/>
+              <a:gd name="connsiteY8" fmla="*/ 4221018 h 4545650"/>
+              <a:gd name="connsiteX9" fmla="*/ 11305309 w 11395664"/>
+              <a:gd name="connsiteY9" fmla="*/ 3177309 h 4545650"/>
+              <a:gd name="connsiteX10" fmla="*/ 10908146 w 11395664"/>
+              <a:gd name="connsiteY10" fmla="*/ 2530763 h 4545650"/>
+              <a:gd name="connsiteX11" fmla="*/ 11046691 w 11395664"/>
+              <a:gd name="connsiteY11" fmla="*/ 1736436 h 4545650"/>
+              <a:gd name="connsiteX12" fmla="*/ 11342255 w 11395664"/>
+              <a:gd name="connsiteY12" fmla="*/ 1459345 h 4545650"/>
+              <a:gd name="connsiteX13" fmla="*/ 11379200 w 11395664"/>
+              <a:gd name="connsiteY13" fmla="*/ 1246909 h 4545650"/>
+              <a:gd name="connsiteX14" fmla="*/ 11351491 w 11395664"/>
+              <a:gd name="connsiteY14" fmla="*/ 951346 h 4545650"/>
+              <a:gd name="connsiteX15" fmla="*/ 11194473 w 11395664"/>
+              <a:gd name="connsiteY15" fmla="*/ 711200 h 4545650"/>
+              <a:gd name="connsiteX16" fmla="*/ 10492508 w 11395664"/>
+              <a:gd name="connsiteY16" fmla="*/ 775854 h 4545650"/>
+              <a:gd name="connsiteX17" fmla="*/ 9337964 w 11395664"/>
+              <a:gd name="connsiteY17" fmla="*/ 766618 h 4545650"/>
+              <a:gd name="connsiteX18" fmla="*/ 7130473 w 11395664"/>
+              <a:gd name="connsiteY18" fmla="*/ 729672 h 4545650"/>
+              <a:gd name="connsiteX19" fmla="*/ 4784437 w 11395664"/>
+              <a:gd name="connsiteY19" fmla="*/ 895927 h 4545650"/>
+              <a:gd name="connsiteX20" fmla="*/ 3768437 w 11395664"/>
+              <a:gd name="connsiteY20" fmla="*/ 711200 h 4545650"/>
+              <a:gd name="connsiteX21" fmla="*/ 3103418 w 11395664"/>
+              <a:gd name="connsiteY21" fmla="*/ 378691 h 4545650"/>
+              <a:gd name="connsiteX22" fmla="*/ 2309091 w 11395664"/>
+              <a:gd name="connsiteY22" fmla="*/ 0 h 4545650"/>
+              <a:gd name="connsiteX23" fmla="*/ 1431637 w 11395664"/>
+              <a:gd name="connsiteY23" fmla="*/ 110836 h 4545650"/>
+              <a:gd name="connsiteX24" fmla="*/ 1034473 w 11395664"/>
+              <a:gd name="connsiteY24" fmla="*/ 720436 h 4545650"/>
+              <a:gd name="connsiteX25" fmla="*/ 323273 w 11395664"/>
+              <a:gd name="connsiteY25" fmla="*/ 997527 h 4545650"/>
+              <a:gd name="connsiteX26" fmla="*/ 0 w 11395664"/>
+              <a:gd name="connsiteY26" fmla="*/ 1524000 h 4545650"/>
+              <a:gd name="connsiteX27" fmla="*/ 295564 w 11395664"/>
+              <a:gd name="connsiteY27" fmla="*/ 2059709 h 4545650"/>
+              <a:gd name="connsiteX0" fmla="*/ 295564 w 11395664"/>
+              <a:gd name="connsiteY0" fmla="*/ 2059709 h 4545650"/>
+              <a:gd name="connsiteX1" fmla="*/ 1357746 w 11395664"/>
+              <a:gd name="connsiteY1" fmla="*/ 2373745 h 4545650"/>
+              <a:gd name="connsiteX2" fmla="*/ 2521528 w 11395664"/>
+              <a:gd name="connsiteY2" fmla="*/ 3177309 h 4545650"/>
+              <a:gd name="connsiteX3" fmla="*/ 3851564 w 11395664"/>
+              <a:gd name="connsiteY3" fmla="*/ 3833091 h 4545650"/>
+              <a:gd name="connsiteX4" fmla="*/ 5135418 w 11395664"/>
+              <a:gd name="connsiteY4" fmla="*/ 4193309 h 4545650"/>
+              <a:gd name="connsiteX5" fmla="*/ 6899564 w 11395664"/>
+              <a:gd name="connsiteY5" fmla="*/ 4424218 h 4545650"/>
+              <a:gd name="connsiteX6" fmla="*/ 9134764 w 11395664"/>
+              <a:gd name="connsiteY6" fmla="*/ 4544291 h 4545650"/>
+              <a:gd name="connsiteX7" fmla="*/ 10677237 w 11395664"/>
+              <a:gd name="connsiteY7" fmla="*/ 4350327 h 4545650"/>
+              <a:gd name="connsiteX8" fmla="*/ 11342255 w 11395664"/>
+              <a:gd name="connsiteY8" fmla="*/ 4221018 h 4545650"/>
+              <a:gd name="connsiteX9" fmla="*/ 11305309 w 11395664"/>
+              <a:gd name="connsiteY9" fmla="*/ 3177309 h 4545650"/>
+              <a:gd name="connsiteX10" fmla="*/ 10908146 w 11395664"/>
+              <a:gd name="connsiteY10" fmla="*/ 2530763 h 4545650"/>
+              <a:gd name="connsiteX11" fmla="*/ 11046691 w 11395664"/>
+              <a:gd name="connsiteY11" fmla="*/ 1736436 h 4545650"/>
+              <a:gd name="connsiteX12" fmla="*/ 11342255 w 11395664"/>
+              <a:gd name="connsiteY12" fmla="*/ 1459345 h 4545650"/>
+              <a:gd name="connsiteX13" fmla="*/ 11379200 w 11395664"/>
+              <a:gd name="connsiteY13" fmla="*/ 1246909 h 4545650"/>
+              <a:gd name="connsiteX14" fmla="*/ 11351491 w 11395664"/>
+              <a:gd name="connsiteY14" fmla="*/ 951346 h 4545650"/>
+              <a:gd name="connsiteX15" fmla="*/ 11194473 w 11395664"/>
+              <a:gd name="connsiteY15" fmla="*/ 711200 h 4545650"/>
+              <a:gd name="connsiteX16" fmla="*/ 10492508 w 11395664"/>
+              <a:gd name="connsiteY16" fmla="*/ 775854 h 4545650"/>
+              <a:gd name="connsiteX17" fmla="*/ 9337964 w 11395664"/>
+              <a:gd name="connsiteY17" fmla="*/ 766618 h 4545650"/>
+              <a:gd name="connsiteX18" fmla="*/ 7130473 w 11395664"/>
+              <a:gd name="connsiteY18" fmla="*/ 729672 h 4545650"/>
+              <a:gd name="connsiteX19" fmla="*/ 4784437 w 11395664"/>
+              <a:gd name="connsiteY19" fmla="*/ 895927 h 4545650"/>
+              <a:gd name="connsiteX20" fmla="*/ 3768437 w 11395664"/>
+              <a:gd name="connsiteY20" fmla="*/ 711200 h 4545650"/>
+              <a:gd name="connsiteX21" fmla="*/ 3103418 w 11395664"/>
+              <a:gd name="connsiteY21" fmla="*/ 378691 h 4545650"/>
+              <a:gd name="connsiteX22" fmla="*/ 2309091 w 11395664"/>
+              <a:gd name="connsiteY22" fmla="*/ 0 h 4545650"/>
+              <a:gd name="connsiteX23" fmla="*/ 1431637 w 11395664"/>
+              <a:gd name="connsiteY23" fmla="*/ 110836 h 4545650"/>
+              <a:gd name="connsiteX24" fmla="*/ 1034473 w 11395664"/>
+              <a:gd name="connsiteY24" fmla="*/ 720436 h 4545650"/>
+              <a:gd name="connsiteX25" fmla="*/ 323273 w 11395664"/>
+              <a:gd name="connsiteY25" fmla="*/ 997527 h 4545650"/>
+              <a:gd name="connsiteX26" fmla="*/ 0 w 11395664"/>
+              <a:gd name="connsiteY26" fmla="*/ 1524000 h 4545650"/>
+              <a:gd name="connsiteX27" fmla="*/ 295564 w 11395664"/>
+              <a:gd name="connsiteY27" fmla="*/ 2059709 h 4545650"/>
+              <a:gd name="connsiteX0" fmla="*/ 295564 w 11395664"/>
+              <a:gd name="connsiteY0" fmla="*/ 2059709 h 4545650"/>
+              <a:gd name="connsiteX1" fmla="*/ 1357746 w 11395664"/>
+              <a:gd name="connsiteY1" fmla="*/ 2373745 h 4545650"/>
+              <a:gd name="connsiteX2" fmla="*/ 2521528 w 11395664"/>
+              <a:gd name="connsiteY2" fmla="*/ 3177309 h 4545650"/>
+              <a:gd name="connsiteX3" fmla="*/ 3851564 w 11395664"/>
+              <a:gd name="connsiteY3" fmla="*/ 3833091 h 4545650"/>
+              <a:gd name="connsiteX4" fmla="*/ 5135418 w 11395664"/>
+              <a:gd name="connsiteY4" fmla="*/ 4193309 h 4545650"/>
+              <a:gd name="connsiteX5" fmla="*/ 6899564 w 11395664"/>
+              <a:gd name="connsiteY5" fmla="*/ 4424218 h 4545650"/>
+              <a:gd name="connsiteX6" fmla="*/ 9134764 w 11395664"/>
+              <a:gd name="connsiteY6" fmla="*/ 4544291 h 4545650"/>
+              <a:gd name="connsiteX7" fmla="*/ 10677237 w 11395664"/>
+              <a:gd name="connsiteY7" fmla="*/ 4350327 h 4545650"/>
+              <a:gd name="connsiteX8" fmla="*/ 11342255 w 11395664"/>
+              <a:gd name="connsiteY8" fmla="*/ 4221018 h 4545650"/>
+              <a:gd name="connsiteX9" fmla="*/ 11305309 w 11395664"/>
+              <a:gd name="connsiteY9" fmla="*/ 3177309 h 4545650"/>
+              <a:gd name="connsiteX10" fmla="*/ 10908146 w 11395664"/>
+              <a:gd name="connsiteY10" fmla="*/ 2530763 h 4545650"/>
+              <a:gd name="connsiteX11" fmla="*/ 11046691 w 11395664"/>
+              <a:gd name="connsiteY11" fmla="*/ 1736436 h 4545650"/>
+              <a:gd name="connsiteX12" fmla="*/ 11342255 w 11395664"/>
+              <a:gd name="connsiteY12" fmla="*/ 1459345 h 4545650"/>
+              <a:gd name="connsiteX13" fmla="*/ 11379200 w 11395664"/>
+              <a:gd name="connsiteY13" fmla="*/ 1246909 h 4545650"/>
+              <a:gd name="connsiteX14" fmla="*/ 11351491 w 11395664"/>
+              <a:gd name="connsiteY14" fmla="*/ 951346 h 4545650"/>
+              <a:gd name="connsiteX15" fmla="*/ 11194473 w 11395664"/>
+              <a:gd name="connsiteY15" fmla="*/ 711200 h 4545650"/>
+              <a:gd name="connsiteX16" fmla="*/ 10492508 w 11395664"/>
+              <a:gd name="connsiteY16" fmla="*/ 775854 h 4545650"/>
+              <a:gd name="connsiteX17" fmla="*/ 9337964 w 11395664"/>
+              <a:gd name="connsiteY17" fmla="*/ 766618 h 4545650"/>
+              <a:gd name="connsiteX18" fmla="*/ 7130473 w 11395664"/>
+              <a:gd name="connsiteY18" fmla="*/ 729672 h 4545650"/>
+              <a:gd name="connsiteX19" fmla="*/ 4784437 w 11395664"/>
+              <a:gd name="connsiteY19" fmla="*/ 895927 h 4545650"/>
+              <a:gd name="connsiteX20" fmla="*/ 3768437 w 11395664"/>
+              <a:gd name="connsiteY20" fmla="*/ 711200 h 4545650"/>
+              <a:gd name="connsiteX21" fmla="*/ 3103418 w 11395664"/>
+              <a:gd name="connsiteY21" fmla="*/ 378691 h 4545650"/>
+              <a:gd name="connsiteX22" fmla="*/ 2309091 w 11395664"/>
+              <a:gd name="connsiteY22" fmla="*/ 0 h 4545650"/>
+              <a:gd name="connsiteX23" fmla="*/ 1431637 w 11395664"/>
+              <a:gd name="connsiteY23" fmla="*/ 110836 h 4545650"/>
+              <a:gd name="connsiteX24" fmla="*/ 1034473 w 11395664"/>
+              <a:gd name="connsiteY24" fmla="*/ 720436 h 4545650"/>
+              <a:gd name="connsiteX25" fmla="*/ 323273 w 11395664"/>
+              <a:gd name="connsiteY25" fmla="*/ 997527 h 4545650"/>
+              <a:gd name="connsiteX26" fmla="*/ 0 w 11395664"/>
+              <a:gd name="connsiteY26" fmla="*/ 1524000 h 4545650"/>
+              <a:gd name="connsiteX27" fmla="*/ 295564 w 11395664"/>
+              <a:gd name="connsiteY27" fmla="*/ 2059709 h 4545650"/>
+              <a:gd name="connsiteX0" fmla="*/ 295564 w 11395664"/>
+              <a:gd name="connsiteY0" fmla="*/ 2059709 h 4545650"/>
+              <a:gd name="connsiteX1" fmla="*/ 1357746 w 11395664"/>
+              <a:gd name="connsiteY1" fmla="*/ 2373745 h 4545650"/>
+              <a:gd name="connsiteX2" fmla="*/ 2521528 w 11395664"/>
+              <a:gd name="connsiteY2" fmla="*/ 3177309 h 4545650"/>
+              <a:gd name="connsiteX3" fmla="*/ 3851564 w 11395664"/>
+              <a:gd name="connsiteY3" fmla="*/ 3833091 h 4545650"/>
+              <a:gd name="connsiteX4" fmla="*/ 5135418 w 11395664"/>
+              <a:gd name="connsiteY4" fmla="*/ 4193309 h 4545650"/>
+              <a:gd name="connsiteX5" fmla="*/ 6899564 w 11395664"/>
+              <a:gd name="connsiteY5" fmla="*/ 4424218 h 4545650"/>
+              <a:gd name="connsiteX6" fmla="*/ 9134764 w 11395664"/>
+              <a:gd name="connsiteY6" fmla="*/ 4544291 h 4545650"/>
+              <a:gd name="connsiteX7" fmla="*/ 10677237 w 11395664"/>
+              <a:gd name="connsiteY7" fmla="*/ 4350327 h 4545650"/>
+              <a:gd name="connsiteX8" fmla="*/ 11342255 w 11395664"/>
+              <a:gd name="connsiteY8" fmla="*/ 4221018 h 4545650"/>
+              <a:gd name="connsiteX9" fmla="*/ 11305309 w 11395664"/>
+              <a:gd name="connsiteY9" fmla="*/ 3177309 h 4545650"/>
+              <a:gd name="connsiteX10" fmla="*/ 10908146 w 11395664"/>
+              <a:gd name="connsiteY10" fmla="*/ 2530763 h 4545650"/>
+              <a:gd name="connsiteX11" fmla="*/ 11046691 w 11395664"/>
+              <a:gd name="connsiteY11" fmla="*/ 1736436 h 4545650"/>
+              <a:gd name="connsiteX12" fmla="*/ 11342255 w 11395664"/>
+              <a:gd name="connsiteY12" fmla="*/ 1459345 h 4545650"/>
+              <a:gd name="connsiteX13" fmla="*/ 11379200 w 11395664"/>
+              <a:gd name="connsiteY13" fmla="*/ 1246909 h 4545650"/>
+              <a:gd name="connsiteX14" fmla="*/ 11351491 w 11395664"/>
+              <a:gd name="connsiteY14" fmla="*/ 951346 h 4545650"/>
+              <a:gd name="connsiteX15" fmla="*/ 11194473 w 11395664"/>
+              <a:gd name="connsiteY15" fmla="*/ 711200 h 4545650"/>
+              <a:gd name="connsiteX16" fmla="*/ 10492508 w 11395664"/>
+              <a:gd name="connsiteY16" fmla="*/ 775854 h 4545650"/>
+              <a:gd name="connsiteX17" fmla="*/ 9337964 w 11395664"/>
+              <a:gd name="connsiteY17" fmla="*/ 766618 h 4545650"/>
+              <a:gd name="connsiteX18" fmla="*/ 7130473 w 11395664"/>
+              <a:gd name="connsiteY18" fmla="*/ 729672 h 4545650"/>
+              <a:gd name="connsiteX19" fmla="*/ 4784437 w 11395664"/>
+              <a:gd name="connsiteY19" fmla="*/ 895927 h 4545650"/>
+              <a:gd name="connsiteX20" fmla="*/ 3768437 w 11395664"/>
+              <a:gd name="connsiteY20" fmla="*/ 711200 h 4545650"/>
+              <a:gd name="connsiteX21" fmla="*/ 3103418 w 11395664"/>
+              <a:gd name="connsiteY21" fmla="*/ 378691 h 4545650"/>
+              <a:gd name="connsiteX22" fmla="*/ 2309091 w 11395664"/>
+              <a:gd name="connsiteY22" fmla="*/ 0 h 4545650"/>
+              <a:gd name="connsiteX23" fmla="*/ 1431637 w 11395664"/>
+              <a:gd name="connsiteY23" fmla="*/ 110836 h 4545650"/>
+              <a:gd name="connsiteX24" fmla="*/ 1034473 w 11395664"/>
+              <a:gd name="connsiteY24" fmla="*/ 720436 h 4545650"/>
+              <a:gd name="connsiteX25" fmla="*/ 323273 w 11395664"/>
+              <a:gd name="connsiteY25" fmla="*/ 997527 h 4545650"/>
+              <a:gd name="connsiteX26" fmla="*/ 0 w 11395664"/>
+              <a:gd name="connsiteY26" fmla="*/ 1524000 h 4545650"/>
+              <a:gd name="connsiteX27" fmla="*/ 295564 w 11395664"/>
+              <a:gd name="connsiteY27" fmla="*/ 2059709 h 4545650"/>
+              <a:gd name="connsiteX0" fmla="*/ 295564 w 11395664"/>
+              <a:gd name="connsiteY0" fmla="*/ 2062866 h 4548807"/>
+              <a:gd name="connsiteX1" fmla="*/ 1357746 w 11395664"/>
+              <a:gd name="connsiteY1" fmla="*/ 2376902 h 4548807"/>
+              <a:gd name="connsiteX2" fmla="*/ 2521528 w 11395664"/>
+              <a:gd name="connsiteY2" fmla="*/ 3180466 h 4548807"/>
+              <a:gd name="connsiteX3" fmla="*/ 3851564 w 11395664"/>
+              <a:gd name="connsiteY3" fmla="*/ 3836248 h 4548807"/>
+              <a:gd name="connsiteX4" fmla="*/ 5135418 w 11395664"/>
+              <a:gd name="connsiteY4" fmla="*/ 4196466 h 4548807"/>
+              <a:gd name="connsiteX5" fmla="*/ 6899564 w 11395664"/>
+              <a:gd name="connsiteY5" fmla="*/ 4427375 h 4548807"/>
+              <a:gd name="connsiteX6" fmla="*/ 9134764 w 11395664"/>
+              <a:gd name="connsiteY6" fmla="*/ 4547448 h 4548807"/>
+              <a:gd name="connsiteX7" fmla="*/ 10677237 w 11395664"/>
+              <a:gd name="connsiteY7" fmla="*/ 4353484 h 4548807"/>
+              <a:gd name="connsiteX8" fmla="*/ 11342255 w 11395664"/>
+              <a:gd name="connsiteY8" fmla="*/ 4224175 h 4548807"/>
+              <a:gd name="connsiteX9" fmla="*/ 11305309 w 11395664"/>
+              <a:gd name="connsiteY9" fmla="*/ 3180466 h 4548807"/>
+              <a:gd name="connsiteX10" fmla="*/ 10908146 w 11395664"/>
+              <a:gd name="connsiteY10" fmla="*/ 2533920 h 4548807"/>
+              <a:gd name="connsiteX11" fmla="*/ 11046691 w 11395664"/>
+              <a:gd name="connsiteY11" fmla="*/ 1739593 h 4548807"/>
+              <a:gd name="connsiteX12" fmla="*/ 11342255 w 11395664"/>
+              <a:gd name="connsiteY12" fmla="*/ 1462502 h 4548807"/>
+              <a:gd name="connsiteX13" fmla="*/ 11379200 w 11395664"/>
+              <a:gd name="connsiteY13" fmla="*/ 1250066 h 4548807"/>
+              <a:gd name="connsiteX14" fmla="*/ 11351491 w 11395664"/>
+              <a:gd name="connsiteY14" fmla="*/ 954503 h 4548807"/>
+              <a:gd name="connsiteX15" fmla="*/ 11194473 w 11395664"/>
+              <a:gd name="connsiteY15" fmla="*/ 714357 h 4548807"/>
+              <a:gd name="connsiteX16" fmla="*/ 10492508 w 11395664"/>
+              <a:gd name="connsiteY16" fmla="*/ 779011 h 4548807"/>
+              <a:gd name="connsiteX17" fmla="*/ 9337964 w 11395664"/>
+              <a:gd name="connsiteY17" fmla="*/ 769775 h 4548807"/>
+              <a:gd name="connsiteX18" fmla="*/ 7130473 w 11395664"/>
+              <a:gd name="connsiteY18" fmla="*/ 732829 h 4548807"/>
+              <a:gd name="connsiteX19" fmla="*/ 4784437 w 11395664"/>
+              <a:gd name="connsiteY19" fmla="*/ 899084 h 4548807"/>
+              <a:gd name="connsiteX20" fmla="*/ 3768437 w 11395664"/>
+              <a:gd name="connsiteY20" fmla="*/ 714357 h 4548807"/>
+              <a:gd name="connsiteX21" fmla="*/ 3103418 w 11395664"/>
+              <a:gd name="connsiteY21" fmla="*/ 381848 h 4548807"/>
+              <a:gd name="connsiteX22" fmla="*/ 2309091 w 11395664"/>
+              <a:gd name="connsiteY22" fmla="*/ 3157 h 4548807"/>
+              <a:gd name="connsiteX23" fmla="*/ 1431637 w 11395664"/>
+              <a:gd name="connsiteY23" fmla="*/ 113993 h 4548807"/>
+              <a:gd name="connsiteX24" fmla="*/ 1034473 w 11395664"/>
+              <a:gd name="connsiteY24" fmla="*/ 723593 h 4548807"/>
+              <a:gd name="connsiteX25" fmla="*/ 323273 w 11395664"/>
+              <a:gd name="connsiteY25" fmla="*/ 1000684 h 4548807"/>
+              <a:gd name="connsiteX26" fmla="*/ 0 w 11395664"/>
+              <a:gd name="connsiteY26" fmla="*/ 1527157 h 4548807"/>
+              <a:gd name="connsiteX27" fmla="*/ 295564 w 11395664"/>
+              <a:gd name="connsiteY27" fmla="*/ 2062866 h 4548807"/>
+              <a:gd name="connsiteX0" fmla="*/ 295564 w 11395664"/>
+              <a:gd name="connsiteY0" fmla="*/ 2062866 h 4548807"/>
+              <a:gd name="connsiteX1" fmla="*/ 1357746 w 11395664"/>
+              <a:gd name="connsiteY1" fmla="*/ 2376902 h 4548807"/>
+              <a:gd name="connsiteX2" fmla="*/ 2521528 w 11395664"/>
+              <a:gd name="connsiteY2" fmla="*/ 3180466 h 4548807"/>
+              <a:gd name="connsiteX3" fmla="*/ 3851564 w 11395664"/>
+              <a:gd name="connsiteY3" fmla="*/ 3836248 h 4548807"/>
+              <a:gd name="connsiteX4" fmla="*/ 5135418 w 11395664"/>
+              <a:gd name="connsiteY4" fmla="*/ 4196466 h 4548807"/>
+              <a:gd name="connsiteX5" fmla="*/ 6899564 w 11395664"/>
+              <a:gd name="connsiteY5" fmla="*/ 4427375 h 4548807"/>
+              <a:gd name="connsiteX6" fmla="*/ 9134764 w 11395664"/>
+              <a:gd name="connsiteY6" fmla="*/ 4547448 h 4548807"/>
+              <a:gd name="connsiteX7" fmla="*/ 10677237 w 11395664"/>
+              <a:gd name="connsiteY7" fmla="*/ 4353484 h 4548807"/>
+              <a:gd name="connsiteX8" fmla="*/ 11342255 w 11395664"/>
+              <a:gd name="connsiteY8" fmla="*/ 4224175 h 4548807"/>
+              <a:gd name="connsiteX9" fmla="*/ 11305309 w 11395664"/>
+              <a:gd name="connsiteY9" fmla="*/ 3180466 h 4548807"/>
+              <a:gd name="connsiteX10" fmla="*/ 10908146 w 11395664"/>
+              <a:gd name="connsiteY10" fmla="*/ 2533920 h 4548807"/>
+              <a:gd name="connsiteX11" fmla="*/ 11046691 w 11395664"/>
+              <a:gd name="connsiteY11" fmla="*/ 1739593 h 4548807"/>
+              <a:gd name="connsiteX12" fmla="*/ 11342255 w 11395664"/>
+              <a:gd name="connsiteY12" fmla="*/ 1462502 h 4548807"/>
+              <a:gd name="connsiteX13" fmla="*/ 11379200 w 11395664"/>
+              <a:gd name="connsiteY13" fmla="*/ 1250066 h 4548807"/>
+              <a:gd name="connsiteX14" fmla="*/ 11351491 w 11395664"/>
+              <a:gd name="connsiteY14" fmla="*/ 954503 h 4548807"/>
+              <a:gd name="connsiteX15" fmla="*/ 11194473 w 11395664"/>
+              <a:gd name="connsiteY15" fmla="*/ 714357 h 4548807"/>
+              <a:gd name="connsiteX16" fmla="*/ 10492508 w 11395664"/>
+              <a:gd name="connsiteY16" fmla="*/ 779011 h 4548807"/>
+              <a:gd name="connsiteX17" fmla="*/ 9337964 w 11395664"/>
+              <a:gd name="connsiteY17" fmla="*/ 769775 h 4548807"/>
+              <a:gd name="connsiteX18" fmla="*/ 7130473 w 11395664"/>
+              <a:gd name="connsiteY18" fmla="*/ 732829 h 4548807"/>
+              <a:gd name="connsiteX19" fmla="*/ 4784437 w 11395664"/>
+              <a:gd name="connsiteY19" fmla="*/ 899084 h 4548807"/>
+              <a:gd name="connsiteX20" fmla="*/ 3768437 w 11395664"/>
+              <a:gd name="connsiteY20" fmla="*/ 714357 h 4548807"/>
+              <a:gd name="connsiteX21" fmla="*/ 3103418 w 11395664"/>
+              <a:gd name="connsiteY21" fmla="*/ 381848 h 4548807"/>
+              <a:gd name="connsiteX22" fmla="*/ 2309091 w 11395664"/>
+              <a:gd name="connsiteY22" fmla="*/ 3157 h 4548807"/>
+              <a:gd name="connsiteX23" fmla="*/ 1431637 w 11395664"/>
+              <a:gd name="connsiteY23" fmla="*/ 113993 h 4548807"/>
+              <a:gd name="connsiteX24" fmla="*/ 1034473 w 11395664"/>
+              <a:gd name="connsiteY24" fmla="*/ 723593 h 4548807"/>
+              <a:gd name="connsiteX25" fmla="*/ 323273 w 11395664"/>
+              <a:gd name="connsiteY25" fmla="*/ 1000684 h 4548807"/>
+              <a:gd name="connsiteX26" fmla="*/ 0 w 11395664"/>
+              <a:gd name="connsiteY26" fmla="*/ 1527157 h 4548807"/>
+              <a:gd name="connsiteX27" fmla="*/ 295564 w 11395664"/>
+              <a:gd name="connsiteY27" fmla="*/ 2062866 h 4548807"/>
+              <a:gd name="connsiteX0" fmla="*/ 295564 w 11395664"/>
+              <a:gd name="connsiteY0" fmla="*/ 2062866 h 4548807"/>
+              <a:gd name="connsiteX1" fmla="*/ 1357746 w 11395664"/>
+              <a:gd name="connsiteY1" fmla="*/ 2376902 h 4548807"/>
+              <a:gd name="connsiteX2" fmla="*/ 2521528 w 11395664"/>
+              <a:gd name="connsiteY2" fmla="*/ 3180466 h 4548807"/>
+              <a:gd name="connsiteX3" fmla="*/ 3851564 w 11395664"/>
+              <a:gd name="connsiteY3" fmla="*/ 3836248 h 4548807"/>
+              <a:gd name="connsiteX4" fmla="*/ 5135418 w 11395664"/>
+              <a:gd name="connsiteY4" fmla="*/ 4196466 h 4548807"/>
+              <a:gd name="connsiteX5" fmla="*/ 6899564 w 11395664"/>
+              <a:gd name="connsiteY5" fmla="*/ 4427375 h 4548807"/>
+              <a:gd name="connsiteX6" fmla="*/ 9134764 w 11395664"/>
+              <a:gd name="connsiteY6" fmla="*/ 4547448 h 4548807"/>
+              <a:gd name="connsiteX7" fmla="*/ 10677237 w 11395664"/>
+              <a:gd name="connsiteY7" fmla="*/ 4353484 h 4548807"/>
+              <a:gd name="connsiteX8" fmla="*/ 11342255 w 11395664"/>
+              <a:gd name="connsiteY8" fmla="*/ 4224175 h 4548807"/>
+              <a:gd name="connsiteX9" fmla="*/ 11305309 w 11395664"/>
+              <a:gd name="connsiteY9" fmla="*/ 3180466 h 4548807"/>
+              <a:gd name="connsiteX10" fmla="*/ 10908146 w 11395664"/>
+              <a:gd name="connsiteY10" fmla="*/ 2533920 h 4548807"/>
+              <a:gd name="connsiteX11" fmla="*/ 11046691 w 11395664"/>
+              <a:gd name="connsiteY11" fmla="*/ 1739593 h 4548807"/>
+              <a:gd name="connsiteX12" fmla="*/ 11342255 w 11395664"/>
+              <a:gd name="connsiteY12" fmla="*/ 1462502 h 4548807"/>
+              <a:gd name="connsiteX13" fmla="*/ 11379200 w 11395664"/>
+              <a:gd name="connsiteY13" fmla="*/ 1250066 h 4548807"/>
+              <a:gd name="connsiteX14" fmla="*/ 11351491 w 11395664"/>
+              <a:gd name="connsiteY14" fmla="*/ 954503 h 4548807"/>
+              <a:gd name="connsiteX15" fmla="*/ 11194473 w 11395664"/>
+              <a:gd name="connsiteY15" fmla="*/ 714357 h 4548807"/>
+              <a:gd name="connsiteX16" fmla="*/ 10492508 w 11395664"/>
+              <a:gd name="connsiteY16" fmla="*/ 779011 h 4548807"/>
+              <a:gd name="connsiteX17" fmla="*/ 9337964 w 11395664"/>
+              <a:gd name="connsiteY17" fmla="*/ 769775 h 4548807"/>
+              <a:gd name="connsiteX18" fmla="*/ 7130473 w 11395664"/>
+              <a:gd name="connsiteY18" fmla="*/ 732829 h 4548807"/>
+              <a:gd name="connsiteX19" fmla="*/ 4784437 w 11395664"/>
+              <a:gd name="connsiteY19" fmla="*/ 899084 h 4548807"/>
+              <a:gd name="connsiteX20" fmla="*/ 3768437 w 11395664"/>
+              <a:gd name="connsiteY20" fmla="*/ 714357 h 4548807"/>
+              <a:gd name="connsiteX21" fmla="*/ 3103418 w 11395664"/>
+              <a:gd name="connsiteY21" fmla="*/ 381848 h 4548807"/>
+              <a:gd name="connsiteX22" fmla="*/ 2309091 w 11395664"/>
+              <a:gd name="connsiteY22" fmla="*/ 3157 h 4548807"/>
+              <a:gd name="connsiteX23" fmla="*/ 1431637 w 11395664"/>
+              <a:gd name="connsiteY23" fmla="*/ 113993 h 4548807"/>
+              <a:gd name="connsiteX24" fmla="*/ 1034473 w 11395664"/>
+              <a:gd name="connsiteY24" fmla="*/ 723593 h 4548807"/>
+              <a:gd name="connsiteX25" fmla="*/ 323273 w 11395664"/>
+              <a:gd name="connsiteY25" fmla="*/ 1000684 h 4548807"/>
+              <a:gd name="connsiteX26" fmla="*/ 0 w 11395664"/>
+              <a:gd name="connsiteY26" fmla="*/ 1527157 h 4548807"/>
+              <a:gd name="connsiteX27" fmla="*/ 295564 w 11395664"/>
+              <a:gd name="connsiteY27" fmla="*/ 2062866 h 4548807"/>
+              <a:gd name="connsiteX0" fmla="*/ 295564 w 11395664"/>
+              <a:gd name="connsiteY0" fmla="*/ 2062866 h 4548807"/>
+              <a:gd name="connsiteX1" fmla="*/ 1357746 w 11395664"/>
+              <a:gd name="connsiteY1" fmla="*/ 2376902 h 4548807"/>
+              <a:gd name="connsiteX2" fmla="*/ 2521528 w 11395664"/>
+              <a:gd name="connsiteY2" fmla="*/ 3180466 h 4548807"/>
+              <a:gd name="connsiteX3" fmla="*/ 3851564 w 11395664"/>
+              <a:gd name="connsiteY3" fmla="*/ 3836248 h 4548807"/>
+              <a:gd name="connsiteX4" fmla="*/ 5135418 w 11395664"/>
+              <a:gd name="connsiteY4" fmla="*/ 4196466 h 4548807"/>
+              <a:gd name="connsiteX5" fmla="*/ 6899564 w 11395664"/>
+              <a:gd name="connsiteY5" fmla="*/ 4427375 h 4548807"/>
+              <a:gd name="connsiteX6" fmla="*/ 9134764 w 11395664"/>
+              <a:gd name="connsiteY6" fmla="*/ 4547448 h 4548807"/>
+              <a:gd name="connsiteX7" fmla="*/ 10677237 w 11395664"/>
+              <a:gd name="connsiteY7" fmla="*/ 4353484 h 4548807"/>
+              <a:gd name="connsiteX8" fmla="*/ 11342255 w 11395664"/>
+              <a:gd name="connsiteY8" fmla="*/ 4224175 h 4548807"/>
+              <a:gd name="connsiteX9" fmla="*/ 11305309 w 11395664"/>
+              <a:gd name="connsiteY9" fmla="*/ 3180466 h 4548807"/>
+              <a:gd name="connsiteX10" fmla="*/ 10908146 w 11395664"/>
+              <a:gd name="connsiteY10" fmla="*/ 2533920 h 4548807"/>
+              <a:gd name="connsiteX11" fmla="*/ 11046691 w 11395664"/>
+              <a:gd name="connsiteY11" fmla="*/ 1739593 h 4548807"/>
+              <a:gd name="connsiteX12" fmla="*/ 11342255 w 11395664"/>
+              <a:gd name="connsiteY12" fmla="*/ 1462502 h 4548807"/>
+              <a:gd name="connsiteX13" fmla="*/ 11379200 w 11395664"/>
+              <a:gd name="connsiteY13" fmla="*/ 1250066 h 4548807"/>
+              <a:gd name="connsiteX14" fmla="*/ 11351491 w 11395664"/>
+              <a:gd name="connsiteY14" fmla="*/ 954503 h 4548807"/>
+              <a:gd name="connsiteX15" fmla="*/ 11194473 w 11395664"/>
+              <a:gd name="connsiteY15" fmla="*/ 714357 h 4548807"/>
+              <a:gd name="connsiteX16" fmla="*/ 10492508 w 11395664"/>
+              <a:gd name="connsiteY16" fmla="*/ 779011 h 4548807"/>
+              <a:gd name="connsiteX17" fmla="*/ 9337964 w 11395664"/>
+              <a:gd name="connsiteY17" fmla="*/ 769775 h 4548807"/>
+              <a:gd name="connsiteX18" fmla="*/ 7130473 w 11395664"/>
+              <a:gd name="connsiteY18" fmla="*/ 732829 h 4548807"/>
+              <a:gd name="connsiteX19" fmla="*/ 4784437 w 11395664"/>
+              <a:gd name="connsiteY19" fmla="*/ 899084 h 4548807"/>
+              <a:gd name="connsiteX20" fmla="*/ 3768437 w 11395664"/>
+              <a:gd name="connsiteY20" fmla="*/ 714357 h 4548807"/>
+              <a:gd name="connsiteX21" fmla="*/ 3103418 w 11395664"/>
+              <a:gd name="connsiteY21" fmla="*/ 381848 h 4548807"/>
+              <a:gd name="connsiteX22" fmla="*/ 2309091 w 11395664"/>
+              <a:gd name="connsiteY22" fmla="*/ 3157 h 4548807"/>
+              <a:gd name="connsiteX23" fmla="*/ 1431637 w 11395664"/>
+              <a:gd name="connsiteY23" fmla="*/ 113993 h 4548807"/>
+              <a:gd name="connsiteX24" fmla="*/ 1034473 w 11395664"/>
+              <a:gd name="connsiteY24" fmla="*/ 723593 h 4548807"/>
+              <a:gd name="connsiteX25" fmla="*/ 323273 w 11395664"/>
+              <a:gd name="connsiteY25" fmla="*/ 1000684 h 4548807"/>
+              <a:gd name="connsiteX26" fmla="*/ 0 w 11395664"/>
+              <a:gd name="connsiteY26" fmla="*/ 1527157 h 4548807"/>
+              <a:gd name="connsiteX27" fmla="*/ 295564 w 11395664"/>
+              <a:gd name="connsiteY27" fmla="*/ 2062866 h 4548807"/>
+              <a:gd name="connsiteX0" fmla="*/ 317885 w 11417985"/>
+              <a:gd name="connsiteY0" fmla="*/ 2062866 h 4548807"/>
+              <a:gd name="connsiteX1" fmla="*/ 1380067 w 11417985"/>
+              <a:gd name="connsiteY1" fmla="*/ 2376902 h 4548807"/>
+              <a:gd name="connsiteX2" fmla="*/ 2543849 w 11417985"/>
+              <a:gd name="connsiteY2" fmla="*/ 3180466 h 4548807"/>
+              <a:gd name="connsiteX3" fmla="*/ 3873885 w 11417985"/>
+              <a:gd name="connsiteY3" fmla="*/ 3836248 h 4548807"/>
+              <a:gd name="connsiteX4" fmla="*/ 5157739 w 11417985"/>
+              <a:gd name="connsiteY4" fmla="*/ 4196466 h 4548807"/>
+              <a:gd name="connsiteX5" fmla="*/ 6921885 w 11417985"/>
+              <a:gd name="connsiteY5" fmla="*/ 4427375 h 4548807"/>
+              <a:gd name="connsiteX6" fmla="*/ 9157085 w 11417985"/>
+              <a:gd name="connsiteY6" fmla="*/ 4547448 h 4548807"/>
+              <a:gd name="connsiteX7" fmla="*/ 10699558 w 11417985"/>
+              <a:gd name="connsiteY7" fmla="*/ 4353484 h 4548807"/>
+              <a:gd name="connsiteX8" fmla="*/ 11364576 w 11417985"/>
+              <a:gd name="connsiteY8" fmla="*/ 4224175 h 4548807"/>
+              <a:gd name="connsiteX9" fmla="*/ 11327630 w 11417985"/>
+              <a:gd name="connsiteY9" fmla="*/ 3180466 h 4548807"/>
+              <a:gd name="connsiteX10" fmla="*/ 10930467 w 11417985"/>
+              <a:gd name="connsiteY10" fmla="*/ 2533920 h 4548807"/>
+              <a:gd name="connsiteX11" fmla="*/ 11069012 w 11417985"/>
+              <a:gd name="connsiteY11" fmla="*/ 1739593 h 4548807"/>
+              <a:gd name="connsiteX12" fmla="*/ 11364576 w 11417985"/>
+              <a:gd name="connsiteY12" fmla="*/ 1462502 h 4548807"/>
+              <a:gd name="connsiteX13" fmla="*/ 11401521 w 11417985"/>
+              <a:gd name="connsiteY13" fmla="*/ 1250066 h 4548807"/>
+              <a:gd name="connsiteX14" fmla="*/ 11373812 w 11417985"/>
+              <a:gd name="connsiteY14" fmla="*/ 954503 h 4548807"/>
+              <a:gd name="connsiteX15" fmla="*/ 11216794 w 11417985"/>
+              <a:gd name="connsiteY15" fmla="*/ 714357 h 4548807"/>
+              <a:gd name="connsiteX16" fmla="*/ 10514829 w 11417985"/>
+              <a:gd name="connsiteY16" fmla="*/ 779011 h 4548807"/>
+              <a:gd name="connsiteX17" fmla="*/ 9360285 w 11417985"/>
+              <a:gd name="connsiteY17" fmla="*/ 769775 h 4548807"/>
+              <a:gd name="connsiteX18" fmla="*/ 7152794 w 11417985"/>
+              <a:gd name="connsiteY18" fmla="*/ 732829 h 4548807"/>
+              <a:gd name="connsiteX19" fmla="*/ 4806758 w 11417985"/>
+              <a:gd name="connsiteY19" fmla="*/ 899084 h 4548807"/>
+              <a:gd name="connsiteX20" fmla="*/ 3790758 w 11417985"/>
+              <a:gd name="connsiteY20" fmla="*/ 714357 h 4548807"/>
+              <a:gd name="connsiteX21" fmla="*/ 3125739 w 11417985"/>
+              <a:gd name="connsiteY21" fmla="*/ 381848 h 4548807"/>
+              <a:gd name="connsiteX22" fmla="*/ 2331412 w 11417985"/>
+              <a:gd name="connsiteY22" fmla="*/ 3157 h 4548807"/>
+              <a:gd name="connsiteX23" fmla="*/ 1453958 w 11417985"/>
+              <a:gd name="connsiteY23" fmla="*/ 113993 h 4548807"/>
+              <a:gd name="connsiteX24" fmla="*/ 1056794 w 11417985"/>
+              <a:gd name="connsiteY24" fmla="*/ 723593 h 4548807"/>
+              <a:gd name="connsiteX25" fmla="*/ 345594 w 11417985"/>
+              <a:gd name="connsiteY25" fmla="*/ 1000684 h 4548807"/>
+              <a:gd name="connsiteX26" fmla="*/ 22321 w 11417985"/>
+              <a:gd name="connsiteY26" fmla="*/ 1527157 h 4548807"/>
+              <a:gd name="connsiteX27" fmla="*/ 317885 w 11417985"/>
+              <a:gd name="connsiteY27" fmla="*/ 2062866 h 4548807"/>
+              <a:gd name="connsiteX0" fmla="*/ 317885 w 11417985"/>
+              <a:gd name="connsiteY0" fmla="*/ 2062866 h 4548807"/>
+              <a:gd name="connsiteX1" fmla="*/ 1380067 w 11417985"/>
+              <a:gd name="connsiteY1" fmla="*/ 2376902 h 4548807"/>
+              <a:gd name="connsiteX2" fmla="*/ 2543849 w 11417985"/>
+              <a:gd name="connsiteY2" fmla="*/ 3180466 h 4548807"/>
+              <a:gd name="connsiteX3" fmla="*/ 3873885 w 11417985"/>
+              <a:gd name="connsiteY3" fmla="*/ 3836248 h 4548807"/>
+              <a:gd name="connsiteX4" fmla="*/ 5157739 w 11417985"/>
+              <a:gd name="connsiteY4" fmla="*/ 4196466 h 4548807"/>
+              <a:gd name="connsiteX5" fmla="*/ 6921885 w 11417985"/>
+              <a:gd name="connsiteY5" fmla="*/ 4427375 h 4548807"/>
+              <a:gd name="connsiteX6" fmla="*/ 9157085 w 11417985"/>
+              <a:gd name="connsiteY6" fmla="*/ 4547448 h 4548807"/>
+              <a:gd name="connsiteX7" fmla="*/ 10699558 w 11417985"/>
+              <a:gd name="connsiteY7" fmla="*/ 4353484 h 4548807"/>
+              <a:gd name="connsiteX8" fmla="*/ 11364576 w 11417985"/>
+              <a:gd name="connsiteY8" fmla="*/ 4224175 h 4548807"/>
+              <a:gd name="connsiteX9" fmla="*/ 11327630 w 11417985"/>
+              <a:gd name="connsiteY9" fmla="*/ 3180466 h 4548807"/>
+              <a:gd name="connsiteX10" fmla="*/ 10930467 w 11417985"/>
+              <a:gd name="connsiteY10" fmla="*/ 2533920 h 4548807"/>
+              <a:gd name="connsiteX11" fmla="*/ 11069012 w 11417985"/>
+              <a:gd name="connsiteY11" fmla="*/ 1739593 h 4548807"/>
+              <a:gd name="connsiteX12" fmla="*/ 11364576 w 11417985"/>
+              <a:gd name="connsiteY12" fmla="*/ 1462502 h 4548807"/>
+              <a:gd name="connsiteX13" fmla="*/ 11401521 w 11417985"/>
+              <a:gd name="connsiteY13" fmla="*/ 1250066 h 4548807"/>
+              <a:gd name="connsiteX14" fmla="*/ 11373812 w 11417985"/>
+              <a:gd name="connsiteY14" fmla="*/ 954503 h 4548807"/>
+              <a:gd name="connsiteX15" fmla="*/ 11216794 w 11417985"/>
+              <a:gd name="connsiteY15" fmla="*/ 714357 h 4548807"/>
+              <a:gd name="connsiteX16" fmla="*/ 10514829 w 11417985"/>
+              <a:gd name="connsiteY16" fmla="*/ 779011 h 4548807"/>
+              <a:gd name="connsiteX17" fmla="*/ 9360285 w 11417985"/>
+              <a:gd name="connsiteY17" fmla="*/ 769775 h 4548807"/>
+              <a:gd name="connsiteX18" fmla="*/ 7152794 w 11417985"/>
+              <a:gd name="connsiteY18" fmla="*/ 732829 h 4548807"/>
+              <a:gd name="connsiteX19" fmla="*/ 4806758 w 11417985"/>
+              <a:gd name="connsiteY19" fmla="*/ 899084 h 4548807"/>
+              <a:gd name="connsiteX20" fmla="*/ 3790758 w 11417985"/>
+              <a:gd name="connsiteY20" fmla="*/ 714357 h 4548807"/>
+              <a:gd name="connsiteX21" fmla="*/ 3125739 w 11417985"/>
+              <a:gd name="connsiteY21" fmla="*/ 381848 h 4548807"/>
+              <a:gd name="connsiteX22" fmla="*/ 2331412 w 11417985"/>
+              <a:gd name="connsiteY22" fmla="*/ 3157 h 4548807"/>
+              <a:gd name="connsiteX23" fmla="*/ 1453958 w 11417985"/>
+              <a:gd name="connsiteY23" fmla="*/ 113993 h 4548807"/>
+              <a:gd name="connsiteX24" fmla="*/ 1056794 w 11417985"/>
+              <a:gd name="connsiteY24" fmla="*/ 723593 h 4548807"/>
+              <a:gd name="connsiteX25" fmla="*/ 345594 w 11417985"/>
+              <a:gd name="connsiteY25" fmla="*/ 1000684 h 4548807"/>
+              <a:gd name="connsiteX26" fmla="*/ 22321 w 11417985"/>
+              <a:gd name="connsiteY26" fmla="*/ 1527157 h 4548807"/>
+              <a:gd name="connsiteX27" fmla="*/ 317885 w 11417985"/>
+              <a:gd name="connsiteY27" fmla="*/ 2062866 h 4548807"/>
+              <a:gd name="connsiteX0" fmla="*/ 317885 w 11417985"/>
+              <a:gd name="connsiteY0" fmla="*/ 2062866 h 4548807"/>
+              <a:gd name="connsiteX1" fmla="*/ 1380067 w 11417985"/>
+              <a:gd name="connsiteY1" fmla="*/ 2376902 h 4548807"/>
+              <a:gd name="connsiteX2" fmla="*/ 2543849 w 11417985"/>
+              <a:gd name="connsiteY2" fmla="*/ 3180466 h 4548807"/>
+              <a:gd name="connsiteX3" fmla="*/ 3873885 w 11417985"/>
+              <a:gd name="connsiteY3" fmla="*/ 3836248 h 4548807"/>
+              <a:gd name="connsiteX4" fmla="*/ 5157739 w 11417985"/>
+              <a:gd name="connsiteY4" fmla="*/ 4196466 h 4548807"/>
+              <a:gd name="connsiteX5" fmla="*/ 6921885 w 11417985"/>
+              <a:gd name="connsiteY5" fmla="*/ 4427375 h 4548807"/>
+              <a:gd name="connsiteX6" fmla="*/ 9157085 w 11417985"/>
+              <a:gd name="connsiteY6" fmla="*/ 4547448 h 4548807"/>
+              <a:gd name="connsiteX7" fmla="*/ 10699558 w 11417985"/>
+              <a:gd name="connsiteY7" fmla="*/ 4353484 h 4548807"/>
+              <a:gd name="connsiteX8" fmla="*/ 11364576 w 11417985"/>
+              <a:gd name="connsiteY8" fmla="*/ 4224175 h 4548807"/>
+              <a:gd name="connsiteX9" fmla="*/ 11327630 w 11417985"/>
+              <a:gd name="connsiteY9" fmla="*/ 3180466 h 4548807"/>
+              <a:gd name="connsiteX10" fmla="*/ 10930467 w 11417985"/>
+              <a:gd name="connsiteY10" fmla="*/ 2533920 h 4548807"/>
+              <a:gd name="connsiteX11" fmla="*/ 11069012 w 11417985"/>
+              <a:gd name="connsiteY11" fmla="*/ 1739593 h 4548807"/>
+              <a:gd name="connsiteX12" fmla="*/ 11364576 w 11417985"/>
+              <a:gd name="connsiteY12" fmla="*/ 1462502 h 4548807"/>
+              <a:gd name="connsiteX13" fmla="*/ 11401521 w 11417985"/>
+              <a:gd name="connsiteY13" fmla="*/ 1250066 h 4548807"/>
+              <a:gd name="connsiteX14" fmla="*/ 11373812 w 11417985"/>
+              <a:gd name="connsiteY14" fmla="*/ 954503 h 4548807"/>
+              <a:gd name="connsiteX15" fmla="*/ 11216794 w 11417985"/>
+              <a:gd name="connsiteY15" fmla="*/ 714357 h 4548807"/>
+              <a:gd name="connsiteX16" fmla="*/ 10514829 w 11417985"/>
+              <a:gd name="connsiteY16" fmla="*/ 779011 h 4548807"/>
+              <a:gd name="connsiteX17" fmla="*/ 9360285 w 11417985"/>
+              <a:gd name="connsiteY17" fmla="*/ 769775 h 4548807"/>
+              <a:gd name="connsiteX18" fmla="*/ 7152794 w 11417985"/>
+              <a:gd name="connsiteY18" fmla="*/ 732829 h 4548807"/>
+              <a:gd name="connsiteX19" fmla="*/ 4806758 w 11417985"/>
+              <a:gd name="connsiteY19" fmla="*/ 899084 h 4548807"/>
+              <a:gd name="connsiteX20" fmla="*/ 3790758 w 11417985"/>
+              <a:gd name="connsiteY20" fmla="*/ 714357 h 4548807"/>
+              <a:gd name="connsiteX21" fmla="*/ 3125739 w 11417985"/>
+              <a:gd name="connsiteY21" fmla="*/ 381848 h 4548807"/>
+              <a:gd name="connsiteX22" fmla="*/ 2331412 w 11417985"/>
+              <a:gd name="connsiteY22" fmla="*/ 3157 h 4548807"/>
+              <a:gd name="connsiteX23" fmla="*/ 1453958 w 11417985"/>
+              <a:gd name="connsiteY23" fmla="*/ 113993 h 4548807"/>
+              <a:gd name="connsiteX24" fmla="*/ 1056794 w 11417985"/>
+              <a:gd name="connsiteY24" fmla="*/ 723593 h 4548807"/>
+              <a:gd name="connsiteX25" fmla="*/ 345594 w 11417985"/>
+              <a:gd name="connsiteY25" fmla="*/ 1000684 h 4548807"/>
+              <a:gd name="connsiteX26" fmla="*/ 22321 w 11417985"/>
+              <a:gd name="connsiteY26" fmla="*/ 1527157 h 4548807"/>
+              <a:gd name="connsiteX27" fmla="*/ 317885 w 11417985"/>
+              <a:gd name="connsiteY27" fmla="*/ 2062866 h 4548807"/>
+              <a:gd name="connsiteX0" fmla="*/ 317885 w 11417985"/>
+              <a:gd name="connsiteY0" fmla="*/ 2062866 h 4548807"/>
+              <a:gd name="connsiteX1" fmla="*/ 1380067 w 11417985"/>
+              <a:gd name="connsiteY1" fmla="*/ 2376902 h 4548807"/>
+              <a:gd name="connsiteX2" fmla="*/ 2543849 w 11417985"/>
+              <a:gd name="connsiteY2" fmla="*/ 3180466 h 4548807"/>
+              <a:gd name="connsiteX3" fmla="*/ 3873885 w 11417985"/>
+              <a:gd name="connsiteY3" fmla="*/ 3836248 h 4548807"/>
+              <a:gd name="connsiteX4" fmla="*/ 5157739 w 11417985"/>
+              <a:gd name="connsiteY4" fmla="*/ 4196466 h 4548807"/>
+              <a:gd name="connsiteX5" fmla="*/ 6921885 w 11417985"/>
+              <a:gd name="connsiteY5" fmla="*/ 4427375 h 4548807"/>
+              <a:gd name="connsiteX6" fmla="*/ 9157085 w 11417985"/>
+              <a:gd name="connsiteY6" fmla="*/ 4547448 h 4548807"/>
+              <a:gd name="connsiteX7" fmla="*/ 10699558 w 11417985"/>
+              <a:gd name="connsiteY7" fmla="*/ 4353484 h 4548807"/>
+              <a:gd name="connsiteX8" fmla="*/ 11364576 w 11417985"/>
+              <a:gd name="connsiteY8" fmla="*/ 4224175 h 4548807"/>
+              <a:gd name="connsiteX9" fmla="*/ 11327630 w 11417985"/>
+              <a:gd name="connsiteY9" fmla="*/ 3180466 h 4548807"/>
+              <a:gd name="connsiteX10" fmla="*/ 10930467 w 11417985"/>
+              <a:gd name="connsiteY10" fmla="*/ 2533920 h 4548807"/>
+              <a:gd name="connsiteX11" fmla="*/ 11069012 w 11417985"/>
+              <a:gd name="connsiteY11" fmla="*/ 1739593 h 4548807"/>
+              <a:gd name="connsiteX12" fmla="*/ 11364576 w 11417985"/>
+              <a:gd name="connsiteY12" fmla="*/ 1462502 h 4548807"/>
+              <a:gd name="connsiteX13" fmla="*/ 11401521 w 11417985"/>
+              <a:gd name="connsiteY13" fmla="*/ 1250066 h 4548807"/>
+              <a:gd name="connsiteX14" fmla="*/ 11373812 w 11417985"/>
+              <a:gd name="connsiteY14" fmla="*/ 954503 h 4548807"/>
+              <a:gd name="connsiteX15" fmla="*/ 11216794 w 11417985"/>
+              <a:gd name="connsiteY15" fmla="*/ 714357 h 4548807"/>
+              <a:gd name="connsiteX16" fmla="*/ 10514829 w 11417985"/>
+              <a:gd name="connsiteY16" fmla="*/ 779011 h 4548807"/>
+              <a:gd name="connsiteX17" fmla="*/ 9360285 w 11417985"/>
+              <a:gd name="connsiteY17" fmla="*/ 769775 h 4548807"/>
+              <a:gd name="connsiteX18" fmla="*/ 7152794 w 11417985"/>
+              <a:gd name="connsiteY18" fmla="*/ 732829 h 4548807"/>
+              <a:gd name="connsiteX19" fmla="*/ 4806758 w 11417985"/>
+              <a:gd name="connsiteY19" fmla="*/ 899084 h 4548807"/>
+              <a:gd name="connsiteX20" fmla="*/ 3790758 w 11417985"/>
+              <a:gd name="connsiteY20" fmla="*/ 714357 h 4548807"/>
+              <a:gd name="connsiteX21" fmla="*/ 3125739 w 11417985"/>
+              <a:gd name="connsiteY21" fmla="*/ 381848 h 4548807"/>
+              <a:gd name="connsiteX22" fmla="*/ 2331412 w 11417985"/>
+              <a:gd name="connsiteY22" fmla="*/ 3157 h 4548807"/>
+              <a:gd name="connsiteX23" fmla="*/ 1453958 w 11417985"/>
+              <a:gd name="connsiteY23" fmla="*/ 113993 h 4548807"/>
+              <a:gd name="connsiteX24" fmla="*/ 1056794 w 11417985"/>
+              <a:gd name="connsiteY24" fmla="*/ 723593 h 4548807"/>
+              <a:gd name="connsiteX25" fmla="*/ 345594 w 11417985"/>
+              <a:gd name="connsiteY25" fmla="*/ 1000684 h 4548807"/>
+              <a:gd name="connsiteX26" fmla="*/ 22321 w 11417985"/>
+              <a:gd name="connsiteY26" fmla="*/ 1527157 h 4548807"/>
+              <a:gd name="connsiteX27" fmla="*/ 317885 w 11417985"/>
+              <a:gd name="connsiteY27" fmla="*/ 2062866 h 4548807"/>
+              <a:gd name="connsiteX0" fmla="*/ 317885 w 11417985"/>
+              <a:gd name="connsiteY0" fmla="*/ 2062866 h 4548807"/>
+              <a:gd name="connsiteX1" fmla="*/ 1380067 w 11417985"/>
+              <a:gd name="connsiteY1" fmla="*/ 2376902 h 4548807"/>
+              <a:gd name="connsiteX2" fmla="*/ 2543849 w 11417985"/>
+              <a:gd name="connsiteY2" fmla="*/ 3180466 h 4548807"/>
+              <a:gd name="connsiteX3" fmla="*/ 3873885 w 11417985"/>
+              <a:gd name="connsiteY3" fmla="*/ 3836248 h 4548807"/>
+              <a:gd name="connsiteX4" fmla="*/ 5157739 w 11417985"/>
+              <a:gd name="connsiteY4" fmla="*/ 4196466 h 4548807"/>
+              <a:gd name="connsiteX5" fmla="*/ 6921885 w 11417985"/>
+              <a:gd name="connsiteY5" fmla="*/ 4427375 h 4548807"/>
+              <a:gd name="connsiteX6" fmla="*/ 9157085 w 11417985"/>
+              <a:gd name="connsiteY6" fmla="*/ 4547448 h 4548807"/>
+              <a:gd name="connsiteX7" fmla="*/ 10699558 w 11417985"/>
+              <a:gd name="connsiteY7" fmla="*/ 4353484 h 4548807"/>
+              <a:gd name="connsiteX8" fmla="*/ 11364576 w 11417985"/>
+              <a:gd name="connsiteY8" fmla="*/ 4224175 h 4548807"/>
+              <a:gd name="connsiteX9" fmla="*/ 11327630 w 11417985"/>
+              <a:gd name="connsiteY9" fmla="*/ 3180466 h 4548807"/>
+              <a:gd name="connsiteX10" fmla="*/ 10930467 w 11417985"/>
+              <a:gd name="connsiteY10" fmla="*/ 2533920 h 4548807"/>
+              <a:gd name="connsiteX11" fmla="*/ 11069012 w 11417985"/>
+              <a:gd name="connsiteY11" fmla="*/ 1739593 h 4548807"/>
+              <a:gd name="connsiteX12" fmla="*/ 11364576 w 11417985"/>
+              <a:gd name="connsiteY12" fmla="*/ 1462502 h 4548807"/>
+              <a:gd name="connsiteX13" fmla="*/ 11401521 w 11417985"/>
+              <a:gd name="connsiteY13" fmla="*/ 1250066 h 4548807"/>
+              <a:gd name="connsiteX14" fmla="*/ 11373812 w 11417985"/>
+              <a:gd name="connsiteY14" fmla="*/ 954503 h 4548807"/>
+              <a:gd name="connsiteX15" fmla="*/ 11216794 w 11417985"/>
+              <a:gd name="connsiteY15" fmla="*/ 714357 h 4548807"/>
+              <a:gd name="connsiteX16" fmla="*/ 10514829 w 11417985"/>
+              <a:gd name="connsiteY16" fmla="*/ 779011 h 4548807"/>
+              <a:gd name="connsiteX17" fmla="*/ 9360285 w 11417985"/>
+              <a:gd name="connsiteY17" fmla="*/ 769775 h 4548807"/>
+              <a:gd name="connsiteX18" fmla="*/ 7152794 w 11417985"/>
+              <a:gd name="connsiteY18" fmla="*/ 732829 h 4548807"/>
+              <a:gd name="connsiteX19" fmla="*/ 4806758 w 11417985"/>
+              <a:gd name="connsiteY19" fmla="*/ 899084 h 4548807"/>
+              <a:gd name="connsiteX20" fmla="*/ 3790758 w 11417985"/>
+              <a:gd name="connsiteY20" fmla="*/ 714357 h 4548807"/>
+              <a:gd name="connsiteX21" fmla="*/ 3125739 w 11417985"/>
+              <a:gd name="connsiteY21" fmla="*/ 381848 h 4548807"/>
+              <a:gd name="connsiteX22" fmla="*/ 2331412 w 11417985"/>
+              <a:gd name="connsiteY22" fmla="*/ 3157 h 4548807"/>
+              <a:gd name="connsiteX23" fmla="*/ 1453958 w 11417985"/>
+              <a:gd name="connsiteY23" fmla="*/ 113993 h 4548807"/>
+              <a:gd name="connsiteX24" fmla="*/ 1056794 w 11417985"/>
+              <a:gd name="connsiteY24" fmla="*/ 723593 h 4548807"/>
+              <a:gd name="connsiteX25" fmla="*/ 345594 w 11417985"/>
+              <a:gd name="connsiteY25" fmla="*/ 1000684 h 4548807"/>
+              <a:gd name="connsiteX26" fmla="*/ 22321 w 11417985"/>
+              <a:gd name="connsiteY26" fmla="*/ 1527157 h 4548807"/>
+              <a:gd name="connsiteX27" fmla="*/ 317885 w 11417985"/>
+              <a:gd name="connsiteY27" fmla="*/ 2062866 h 4548807"/>
+              <a:gd name="connsiteX0" fmla="*/ 317885 w 11417985"/>
+              <a:gd name="connsiteY0" fmla="*/ 2062866 h 4548807"/>
+              <a:gd name="connsiteX1" fmla="*/ 1380067 w 11417985"/>
+              <a:gd name="connsiteY1" fmla="*/ 2376902 h 4548807"/>
+              <a:gd name="connsiteX2" fmla="*/ 2543849 w 11417985"/>
+              <a:gd name="connsiteY2" fmla="*/ 3180466 h 4548807"/>
+              <a:gd name="connsiteX3" fmla="*/ 3873885 w 11417985"/>
+              <a:gd name="connsiteY3" fmla="*/ 3836248 h 4548807"/>
+              <a:gd name="connsiteX4" fmla="*/ 5157739 w 11417985"/>
+              <a:gd name="connsiteY4" fmla="*/ 4196466 h 4548807"/>
+              <a:gd name="connsiteX5" fmla="*/ 6921885 w 11417985"/>
+              <a:gd name="connsiteY5" fmla="*/ 4427375 h 4548807"/>
+              <a:gd name="connsiteX6" fmla="*/ 9157085 w 11417985"/>
+              <a:gd name="connsiteY6" fmla="*/ 4547448 h 4548807"/>
+              <a:gd name="connsiteX7" fmla="*/ 10699558 w 11417985"/>
+              <a:gd name="connsiteY7" fmla="*/ 4353484 h 4548807"/>
+              <a:gd name="connsiteX8" fmla="*/ 11364576 w 11417985"/>
+              <a:gd name="connsiteY8" fmla="*/ 4224175 h 4548807"/>
+              <a:gd name="connsiteX9" fmla="*/ 11327630 w 11417985"/>
+              <a:gd name="connsiteY9" fmla="*/ 3180466 h 4548807"/>
+              <a:gd name="connsiteX10" fmla="*/ 10930467 w 11417985"/>
+              <a:gd name="connsiteY10" fmla="*/ 2533920 h 4548807"/>
+              <a:gd name="connsiteX11" fmla="*/ 11069012 w 11417985"/>
+              <a:gd name="connsiteY11" fmla="*/ 1739593 h 4548807"/>
+              <a:gd name="connsiteX12" fmla="*/ 11364576 w 11417985"/>
+              <a:gd name="connsiteY12" fmla="*/ 1462502 h 4548807"/>
+              <a:gd name="connsiteX13" fmla="*/ 11401521 w 11417985"/>
+              <a:gd name="connsiteY13" fmla="*/ 1250066 h 4548807"/>
+              <a:gd name="connsiteX14" fmla="*/ 11373812 w 11417985"/>
+              <a:gd name="connsiteY14" fmla="*/ 954503 h 4548807"/>
+              <a:gd name="connsiteX15" fmla="*/ 11216794 w 11417985"/>
+              <a:gd name="connsiteY15" fmla="*/ 714357 h 4548807"/>
+              <a:gd name="connsiteX16" fmla="*/ 10514829 w 11417985"/>
+              <a:gd name="connsiteY16" fmla="*/ 779011 h 4548807"/>
+              <a:gd name="connsiteX17" fmla="*/ 9360285 w 11417985"/>
+              <a:gd name="connsiteY17" fmla="*/ 769775 h 4548807"/>
+              <a:gd name="connsiteX18" fmla="*/ 7152794 w 11417985"/>
+              <a:gd name="connsiteY18" fmla="*/ 732829 h 4548807"/>
+              <a:gd name="connsiteX19" fmla="*/ 4806758 w 11417985"/>
+              <a:gd name="connsiteY19" fmla="*/ 899084 h 4548807"/>
+              <a:gd name="connsiteX20" fmla="*/ 3790758 w 11417985"/>
+              <a:gd name="connsiteY20" fmla="*/ 714357 h 4548807"/>
+              <a:gd name="connsiteX21" fmla="*/ 3125739 w 11417985"/>
+              <a:gd name="connsiteY21" fmla="*/ 381848 h 4548807"/>
+              <a:gd name="connsiteX22" fmla="*/ 2331412 w 11417985"/>
+              <a:gd name="connsiteY22" fmla="*/ 3157 h 4548807"/>
+              <a:gd name="connsiteX23" fmla="*/ 1453958 w 11417985"/>
+              <a:gd name="connsiteY23" fmla="*/ 113993 h 4548807"/>
+              <a:gd name="connsiteX24" fmla="*/ 1056794 w 11417985"/>
+              <a:gd name="connsiteY24" fmla="*/ 723593 h 4548807"/>
+              <a:gd name="connsiteX25" fmla="*/ 345594 w 11417985"/>
+              <a:gd name="connsiteY25" fmla="*/ 1000684 h 4548807"/>
+              <a:gd name="connsiteX26" fmla="*/ 22321 w 11417985"/>
+              <a:gd name="connsiteY26" fmla="*/ 1527157 h 4548807"/>
+              <a:gd name="connsiteX27" fmla="*/ 317885 w 11417985"/>
+              <a:gd name="connsiteY27" fmla="*/ 2062866 h 4548807"/>
+              <a:gd name="connsiteX0" fmla="*/ 317885 w 11417985"/>
+              <a:gd name="connsiteY0" fmla="*/ 2062866 h 4548807"/>
+              <a:gd name="connsiteX1" fmla="*/ 1380067 w 11417985"/>
+              <a:gd name="connsiteY1" fmla="*/ 2376902 h 4548807"/>
+              <a:gd name="connsiteX2" fmla="*/ 2543849 w 11417985"/>
+              <a:gd name="connsiteY2" fmla="*/ 3180466 h 4548807"/>
+              <a:gd name="connsiteX3" fmla="*/ 3873885 w 11417985"/>
+              <a:gd name="connsiteY3" fmla="*/ 3836248 h 4548807"/>
+              <a:gd name="connsiteX4" fmla="*/ 5157739 w 11417985"/>
+              <a:gd name="connsiteY4" fmla="*/ 4196466 h 4548807"/>
+              <a:gd name="connsiteX5" fmla="*/ 6921885 w 11417985"/>
+              <a:gd name="connsiteY5" fmla="*/ 4427375 h 4548807"/>
+              <a:gd name="connsiteX6" fmla="*/ 9157085 w 11417985"/>
+              <a:gd name="connsiteY6" fmla="*/ 4547448 h 4548807"/>
+              <a:gd name="connsiteX7" fmla="*/ 10699558 w 11417985"/>
+              <a:gd name="connsiteY7" fmla="*/ 4353484 h 4548807"/>
+              <a:gd name="connsiteX8" fmla="*/ 11364576 w 11417985"/>
+              <a:gd name="connsiteY8" fmla="*/ 4224175 h 4548807"/>
+              <a:gd name="connsiteX9" fmla="*/ 11327630 w 11417985"/>
+              <a:gd name="connsiteY9" fmla="*/ 3180466 h 4548807"/>
+              <a:gd name="connsiteX10" fmla="*/ 10930467 w 11417985"/>
+              <a:gd name="connsiteY10" fmla="*/ 2533920 h 4548807"/>
+              <a:gd name="connsiteX11" fmla="*/ 11069012 w 11417985"/>
+              <a:gd name="connsiteY11" fmla="*/ 1739593 h 4548807"/>
+              <a:gd name="connsiteX12" fmla="*/ 11364576 w 11417985"/>
+              <a:gd name="connsiteY12" fmla="*/ 1462502 h 4548807"/>
+              <a:gd name="connsiteX13" fmla="*/ 11401521 w 11417985"/>
+              <a:gd name="connsiteY13" fmla="*/ 1250066 h 4548807"/>
+              <a:gd name="connsiteX14" fmla="*/ 11373812 w 11417985"/>
+              <a:gd name="connsiteY14" fmla="*/ 954503 h 4548807"/>
+              <a:gd name="connsiteX15" fmla="*/ 11216794 w 11417985"/>
+              <a:gd name="connsiteY15" fmla="*/ 714357 h 4548807"/>
+              <a:gd name="connsiteX16" fmla="*/ 10514829 w 11417985"/>
+              <a:gd name="connsiteY16" fmla="*/ 779011 h 4548807"/>
+              <a:gd name="connsiteX17" fmla="*/ 9360285 w 11417985"/>
+              <a:gd name="connsiteY17" fmla="*/ 769775 h 4548807"/>
+              <a:gd name="connsiteX18" fmla="*/ 7152794 w 11417985"/>
+              <a:gd name="connsiteY18" fmla="*/ 732829 h 4548807"/>
+              <a:gd name="connsiteX19" fmla="*/ 4806758 w 11417985"/>
+              <a:gd name="connsiteY19" fmla="*/ 899084 h 4548807"/>
+              <a:gd name="connsiteX20" fmla="*/ 3790758 w 11417985"/>
+              <a:gd name="connsiteY20" fmla="*/ 714357 h 4548807"/>
+              <a:gd name="connsiteX21" fmla="*/ 3125739 w 11417985"/>
+              <a:gd name="connsiteY21" fmla="*/ 381848 h 4548807"/>
+              <a:gd name="connsiteX22" fmla="*/ 2331412 w 11417985"/>
+              <a:gd name="connsiteY22" fmla="*/ 3157 h 4548807"/>
+              <a:gd name="connsiteX23" fmla="*/ 1453958 w 11417985"/>
+              <a:gd name="connsiteY23" fmla="*/ 113993 h 4548807"/>
+              <a:gd name="connsiteX24" fmla="*/ 1056794 w 11417985"/>
+              <a:gd name="connsiteY24" fmla="*/ 723593 h 4548807"/>
+              <a:gd name="connsiteX25" fmla="*/ 345594 w 11417985"/>
+              <a:gd name="connsiteY25" fmla="*/ 1000684 h 4548807"/>
+              <a:gd name="connsiteX26" fmla="*/ 22321 w 11417985"/>
+              <a:gd name="connsiteY26" fmla="*/ 1527157 h 4548807"/>
+              <a:gd name="connsiteX27" fmla="*/ 317885 w 11417985"/>
+              <a:gd name="connsiteY27" fmla="*/ 2062866 h 4548807"/>
+              <a:gd name="connsiteX0" fmla="*/ 317885 w 11417985"/>
+              <a:gd name="connsiteY0" fmla="*/ 2099539 h 4585480"/>
+              <a:gd name="connsiteX1" fmla="*/ 1380067 w 11417985"/>
+              <a:gd name="connsiteY1" fmla="*/ 2413575 h 4585480"/>
+              <a:gd name="connsiteX2" fmla="*/ 2543849 w 11417985"/>
+              <a:gd name="connsiteY2" fmla="*/ 3217139 h 4585480"/>
+              <a:gd name="connsiteX3" fmla="*/ 3873885 w 11417985"/>
+              <a:gd name="connsiteY3" fmla="*/ 3872921 h 4585480"/>
+              <a:gd name="connsiteX4" fmla="*/ 5157739 w 11417985"/>
+              <a:gd name="connsiteY4" fmla="*/ 4233139 h 4585480"/>
+              <a:gd name="connsiteX5" fmla="*/ 6921885 w 11417985"/>
+              <a:gd name="connsiteY5" fmla="*/ 4464048 h 4585480"/>
+              <a:gd name="connsiteX6" fmla="*/ 9157085 w 11417985"/>
+              <a:gd name="connsiteY6" fmla="*/ 4584121 h 4585480"/>
+              <a:gd name="connsiteX7" fmla="*/ 10699558 w 11417985"/>
+              <a:gd name="connsiteY7" fmla="*/ 4390157 h 4585480"/>
+              <a:gd name="connsiteX8" fmla="*/ 11364576 w 11417985"/>
+              <a:gd name="connsiteY8" fmla="*/ 4260848 h 4585480"/>
+              <a:gd name="connsiteX9" fmla="*/ 11327630 w 11417985"/>
+              <a:gd name="connsiteY9" fmla="*/ 3217139 h 4585480"/>
+              <a:gd name="connsiteX10" fmla="*/ 10930467 w 11417985"/>
+              <a:gd name="connsiteY10" fmla="*/ 2570593 h 4585480"/>
+              <a:gd name="connsiteX11" fmla="*/ 11069012 w 11417985"/>
+              <a:gd name="connsiteY11" fmla="*/ 1776266 h 4585480"/>
+              <a:gd name="connsiteX12" fmla="*/ 11364576 w 11417985"/>
+              <a:gd name="connsiteY12" fmla="*/ 1499175 h 4585480"/>
+              <a:gd name="connsiteX13" fmla="*/ 11401521 w 11417985"/>
+              <a:gd name="connsiteY13" fmla="*/ 1286739 h 4585480"/>
+              <a:gd name="connsiteX14" fmla="*/ 11373812 w 11417985"/>
+              <a:gd name="connsiteY14" fmla="*/ 991176 h 4585480"/>
+              <a:gd name="connsiteX15" fmla="*/ 11216794 w 11417985"/>
+              <a:gd name="connsiteY15" fmla="*/ 751030 h 4585480"/>
+              <a:gd name="connsiteX16" fmla="*/ 10514829 w 11417985"/>
+              <a:gd name="connsiteY16" fmla="*/ 815684 h 4585480"/>
+              <a:gd name="connsiteX17" fmla="*/ 9360285 w 11417985"/>
+              <a:gd name="connsiteY17" fmla="*/ 806448 h 4585480"/>
+              <a:gd name="connsiteX18" fmla="*/ 7152794 w 11417985"/>
+              <a:gd name="connsiteY18" fmla="*/ 769502 h 4585480"/>
+              <a:gd name="connsiteX19" fmla="*/ 4806758 w 11417985"/>
+              <a:gd name="connsiteY19" fmla="*/ 935757 h 4585480"/>
+              <a:gd name="connsiteX20" fmla="*/ 3790758 w 11417985"/>
+              <a:gd name="connsiteY20" fmla="*/ 751030 h 4585480"/>
+              <a:gd name="connsiteX21" fmla="*/ 3125739 w 11417985"/>
+              <a:gd name="connsiteY21" fmla="*/ 418521 h 4585480"/>
+              <a:gd name="connsiteX22" fmla="*/ 2248285 w 11417985"/>
+              <a:gd name="connsiteY22" fmla="*/ 2884 h 4585480"/>
+              <a:gd name="connsiteX23" fmla="*/ 1453958 w 11417985"/>
+              <a:gd name="connsiteY23" fmla="*/ 150666 h 4585480"/>
+              <a:gd name="connsiteX24" fmla="*/ 1056794 w 11417985"/>
+              <a:gd name="connsiteY24" fmla="*/ 760266 h 4585480"/>
+              <a:gd name="connsiteX25" fmla="*/ 345594 w 11417985"/>
+              <a:gd name="connsiteY25" fmla="*/ 1037357 h 4585480"/>
+              <a:gd name="connsiteX26" fmla="*/ 22321 w 11417985"/>
+              <a:gd name="connsiteY26" fmla="*/ 1563830 h 4585480"/>
+              <a:gd name="connsiteX27" fmla="*/ 317885 w 11417985"/>
+              <a:gd name="connsiteY27" fmla="*/ 2099539 h 4585480"/>
+              <a:gd name="connsiteX0" fmla="*/ 317885 w 11417985"/>
+              <a:gd name="connsiteY0" fmla="*/ 2099539 h 4585480"/>
+              <a:gd name="connsiteX1" fmla="*/ 1380067 w 11417985"/>
+              <a:gd name="connsiteY1" fmla="*/ 2413575 h 4585480"/>
+              <a:gd name="connsiteX2" fmla="*/ 2543849 w 11417985"/>
+              <a:gd name="connsiteY2" fmla="*/ 3217139 h 4585480"/>
+              <a:gd name="connsiteX3" fmla="*/ 3873885 w 11417985"/>
+              <a:gd name="connsiteY3" fmla="*/ 3872921 h 4585480"/>
+              <a:gd name="connsiteX4" fmla="*/ 5157739 w 11417985"/>
+              <a:gd name="connsiteY4" fmla="*/ 4233139 h 4585480"/>
+              <a:gd name="connsiteX5" fmla="*/ 6921885 w 11417985"/>
+              <a:gd name="connsiteY5" fmla="*/ 4464048 h 4585480"/>
+              <a:gd name="connsiteX6" fmla="*/ 9157085 w 11417985"/>
+              <a:gd name="connsiteY6" fmla="*/ 4584121 h 4585480"/>
+              <a:gd name="connsiteX7" fmla="*/ 10699558 w 11417985"/>
+              <a:gd name="connsiteY7" fmla="*/ 4390157 h 4585480"/>
+              <a:gd name="connsiteX8" fmla="*/ 11364576 w 11417985"/>
+              <a:gd name="connsiteY8" fmla="*/ 4260848 h 4585480"/>
+              <a:gd name="connsiteX9" fmla="*/ 11327630 w 11417985"/>
+              <a:gd name="connsiteY9" fmla="*/ 3217139 h 4585480"/>
+              <a:gd name="connsiteX10" fmla="*/ 10930467 w 11417985"/>
+              <a:gd name="connsiteY10" fmla="*/ 2570593 h 4585480"/>
+              <a:gd name="connsiteX11" fmla="*/ 11069012 w 11417985"/>
+              <a:gd name="connsiteY11" fmla="*/ 1776266 h 4585480"/>
+              <a:gd name="connsiteX12" fmla="*/ 11364576 w 11417985"/>
+              <a:gd name="connsiteY12" fmla="*/ 1499175 h 4585480"/>
+              <a:gd name="connsiteX13" fmla="*/ 11401521 w 11417985"/>
+              <a:gd name="connsiteY13" fmla="*/ 1286739 h 4585480"/>
+              <a:gd name="connsiteX14" fmla="*/ 11373812 w 11417985"/>
+              <a:gd name="connsiteY14" fmla="*/ 991176 h 4585480"/>
+              <a:gd name="connsiteX15" fmla="*/ 11216794 w 11417985"/>
+              <a:gd name="connsiteY15" fmla="*/ 751030 h 4585480"/>
+              <a:gd name="connsiteX16" fmla="*/ 10514829 w 11417985"/>
+              <a:gd name="connsiteY16" fmla="*/ 815684 h 4585480"/>
+              <a:gd name="connsiteX17" fmla="*/ 9360285 w 11417985"/>
+              <a:gd name="connsiteY17" fmla="*/ 806448 h 4585480"/>
+              <a:gd name="connsiteX18" fmla="*/ 7152794 w 11417985"/>
+              <a:gd name="connsiteY18" fmla="*/ 769502 h 4585480"/>
+              <a:gd name="connsiteX19" fmla="*/ 4806758 w 11417985"/>
+              <a:gd name="connsiteY19" fmla="*/ 935757 h 4585480"/>
+              <a:gd name="connsiteX20" fmla="*/ 3790758 w 11417985"/>
+              <a:gd name="connsiteY20" fmla="*/ 751030 h 4585480"/>
+              <a:gd name="connsiteX21" fmla="*/ 3125739 w 11417985"/>
+              <a:gd name="connsiteY21" fmla="*/ 418521 h 4585480"/>
+              <a:gd name="connsiteX22" fmla="*/ 2248285 w 11417985"/>
+              <a:gd name="connsiteY22" fmla="*/ 2884 h 4585480"/>
+              <a:gd name="connsiteX23" fmla="*/ 1453958 w 11417985"/>
+              <a:gd name="connsiteY23" fmla="*/ 150666 h 4585480"/>
+              <a:gd name="connsiteX24" fmla="*/ 1056794 w 11417985"/>
+              <a:gd name="connsiteY24" fmla="*/ 760266 h 4585480"/>
+              <a:gd name="connsiteX25" fmla="*/ 345594 w 11417985"/>
+              <a:gd name="connsiteY25" fmla="*/ 1037357 h 4585480"/>
+              <a:gd name="connsiteX26" fmla="*/ 22321 w 11417985"/>
+              <a:gd name="connsiteY26" fmla="*/ 1610011 h 4585480"/>
+              <a:gd name="connsiteX27" fmla="*/ 317885 w 11417985"/>
+              <a:gd name="connsiteY27" fmla="*/ 2099539 h 4585480"/>
+              <a:gd name="connsiteX0" fmla="*/ 296557 w 11396657"/>
+              <a:gd name="connsiteY0" fmla="*/ 2099539 h 4585480"/>
+              <a:gd name="connsiteX1" fmla="*/ 1358739 w 11396657"/>
+              <a:gd name="connsiteY1" fmla="*/ 2413575 h 4585480"/>
+              <a:gd name="connsiteX2" fmla="*/ 2522521 w 11396657"/>
+              <a:gd name="connsiteY2" fmla="*/ 3217139 h 4585480"/>
+              <a:gd name="connsiteX3" fmla="*/ 3852557 w 11396657"/>
+              <a:gd name="connsiteY3" fmla="*/ 3872921 h 4585480"/>
+              <a:gd name="connsiteX4" fmla="*/ 5136411 w 11396657"/>
+              <a:gd name="connsiteY4" fmla="*/ 4233139 h 4585480"/>
+              <a:gd name="connsiteX5" fmla="*/ 6900557 w 11396657"/>
+              <a:gd name="connsiteY5" fmla="*/ 4464048 h 4585480"/>
+              <a:gd name="connsiteX6" fmla="*/ 9135757 w 11396657"/>
+              <a:gd name="connsiteY6" fmla="*/ 4584121 h 4585480"/>
+              <a:gd name="connsiteX7" fmla="*/ 10678230 w 11396657"/>
+              <a:gd name="connsiteY7" fmla="*/ 4390157 h 4585480"/>
+              <a:gd name="connsiteX8" fmla="*/ 11343248 w 11396657"/>
+              <a:gd name="connsiteY8" fmla="*/ 4260848 h 4585480"/>
+              <a:gd name="connsiteX9" fmla="*/ 11306302 w 11396657"/>
+              <a:gd name="connsiteY9" fmla="*/ 3217139 h 4585480"/>
+              <a:gd name="connsiteX10" fmla="*/ 10909139 w 11396657"/>
+              <a:gd name="connsiteY10" fmla="*/ 2570593 h 4585480"/>
+              <a:gd name="connsiteX11" fmla="*/ 11047684 w 11396657"/>
+              <a:gd name="connsiteY11" fmla="*/ 1776266 h 4585480"/>
+              <a:gd name="connsiteX12" fmla="*/ 11343248 w 11396657"/>
+              <a:gd name="connsiteY12" fmla="*/ 1499175 h 4585480"/>
+              <a:gd name="connsiteX13" fmla="*/ 11380193 w 11396657"/>
+              <a:gd name="connsiteY13" fmla="*/ 1286739 h 4585480"/>
+              <a:gd name="connsiteX14" fmla="*/ 11352484 w 11396657"/>
+              <a:gd name="connsiteY14" fmla="*/ 991176 h 4585480"/>
+              <a:gd name="connsiteX15" fmla="*/ 11195466 w 11396657"/>
+              <a:gd name="connsiteY15" fmla="*/ 751030 h 4585480"/>
+              <a:gd name="connsiteX16" fmla="*/ 10493501 w 11396657"/>
+              <a:gd name="connsiteY16" fmla="*/ 815684 h 4585480"/>
+              <a:gd name="connsiteX17" fmla="*/ 9338957 w 11396657"/>
+              <a:gd name="connsiteY17" fmla="*/ 806448 h 4585480"/>
+              <a:gd name="connsiteX18" fmla="*/ 7131466 w 11396657"/>
+              <a:gd name="connsiteY18" fmla="*/ 769502 h 4585480"/>
+              <a:gd name="connsiteX19" fmla="*/ 4785430 w 11396657"/>
+              <a:gd name="connsiteY19" fmla="*/ 935757 h 4585480"/>
+              <a:gd name="connsiteX20" fmla="*/ 3769430 w 11396657"/>
+              <a:gd name="connsiteY20" fmla="*/ 751030 h 4585480"/>
+              <a:gd name="connsiteX21" fmla="*/ 3104411 w 11396657"/>
+              <a:gd name="connsiteY21" fmla="*/ 418521 h 4585480"/>
+              <a:gd name="connsiteX22" fmla="*/ 2226957 w 11396657"/>
+              <a:gd name="connsiteY22" fmla="*/ 2884 h 4585480"/>
+              <a:gd name="connsiteX23" fmla="*/ 1432630 w 11396657"/>
+              <a:gd name="connsiteY23" fmla="*/ 150666 h 4585480"/>
+              <a:gd name="connsiteX24" fmla="*/ 1035466 w 11396657"/>
+              <a:gd name="connsiteY24" fmla="*/ 760266 h 4585480"/>
+              <a:gd name="connsiteX25" fmla="*/ 324266 w 11396657"/>
+              <a:gd name="connsiteY25" fmla="*/ 1037357 h 4585480"/>
+              <a:gd name="connsiteX26" fmla="*/ 993 w 11396657"/>
+              <a:gd name="connsiteY26" fmla="*/ 1610011 h 4585480"/>
+              <a:gd name="connsiteX27" fmla="*/ 296557 w 11396657"/>
+              <a:gd name="connsiteY27" fmla="*/ 2099539 h 4585480"/>
+              <a:gd name="connsiteX0" fmla="*/ 296557 w 11396657"/>
+              <a:gd name="connsiteY0" fmla="*/ 2099539 h 4585480"/>
+              <a:gd name="connsiteX1" fmla="*/ 1358739 w 11396657"/>
+              <a:gd name="connsiteY1" fmla="*/ 2413575 h 4585480"/>
+              <a:gd name="connsiteX2" fmla="*/ 2522521 w 11396657"/>
+              <a:gd name="connsiteY2" fmla="*/ 3217139 h 4585480"/>
+              <a:gd name="connsiteX3" fmla="*/ 3852557 w 11396657"/>
+              <a:gd name="connsiteY3" fmla="*/ 3872921 h 4585480"/>
+              <a:gd name="connsiteX4" fmla="*/ 5136411 w 11396657"/>
+              <a:gd name="connsiteY4" fmla="*/ 4233139 h 4585480"/>
+              <a:gd name="connsiteX5" fmla="*/ 6900557 w 11396657"/>
+              <a:gd name="connsiteY5" fmla="*/ 4464048 h 4585480"/>
+              <a:gd name="connsiteX6" fmla="*/ 9135757 w 11396657"/>
+              <a:gd name="connsiteY6" fmla="*/ 4584121 h 4585480"/>
+              <a:gd name="connsiteX7" fmla="*/ 10678230 w 11396657"/>
+              <a:gd name="connsiteY7" fmla="*/ 4390157 h 4585480"/>
+              <a:gd name="connsiteX8" fmla="*/ 11343248 w 11396657"/>
+              <a:gd name="connsiteY8" fmla="*/ 4260848 h 4585480"/>
+              <a:gd name="connsiteX9" fmla="*/ 11306302 w 11396657"/>
+              <a:gd name="connsiteY9" fmla="*/ 3217139 h 4585480"/>
+              <a:gd name="connsiteX10" fmla="*/ 10909139 w 11396657"/>
+              <a:gd name="connsiteY10" fmla="*/ 2570593 h 4585480"/>
+              <a:gd name="connsiteX11" fmla="*/ 11047684 w 11396657"/>
+              <a:gd name="connsiteY11" fmla="*/ 1776266 h 4585480"/>
+              <a:gd name="connsiteX12" fmla="*/ 11343248 w 11396657"/>
+              <a:gd name="connsiteY12" fmla="*/ 1499175 h 4585480"/>
+              <a:gd name="connsiteX13" fmla="*/ 11380193 w 11396657"/>
+              <a:gd name="connsiteY13" fmla="*/ 1286739 h 4585480"/>
+              <a:gd name="connsiteX14" fmla="*/ 11352484 w 11396657"/>
+              <a:gd name="connsiteY14" fmla="*/ 991176 h 4585480"/>
+              <a:gd name="connsiteX15" fmla="*/ 11066157 w 11396657"/>
+              <a:gd name="connsiteY15" fmla="*/ 834158 h 4585480"/>
+              <a:gd name="connsiteX16" fmla="*/ 10493501 w 11396657"/>
+              <a:gd name="connsiteY16" fmla="*/ 815684 h 4585480"/>
+              <a:gd name="connsiteX17" fmla="*/ 9338957 w 11396657"/>
+              <a:gd name="connsiteY17" fmla="*/ 806448 h 4585480"/>
+              <a:gd name="connsiteX18" fmla="*/ 7131466 w 11396657"/>
+              <a:gd name="connsiteY18" fmla="*/ 769502 h 4585480"/>
+              <a:gd name="connsiteX19" fmla="*/ 4785430 w 11396657"/>
+              <a:gd name="connsiteY19" fmla="*/ 935757 h 4585480"/>
+              <a:gd name="connsiteX20" fmla="*/ 3769430 w 11396657"/>
+              <a:gd name="connsiteY20" fmla="*/ 751030 h 4585480"/>
+              <a:gd name="connsiteX21" fmla="*/ 3104411 w 11396657"/>
+              <a:gd name="connsiteY21" fmla="*/ 418521 h 4585480"/>
+              <a:gd name="connsiteX22" fmla="*/ 2226957 w 11396657"/>
+              <a:gd name="connsiteY22" fmla="*/ 2884 h 4585480"/>
+              <a:gd name="connsiteX23" fmla="*/ 1432630 w 11396657"/>
+              <a:gd name="connsiteY23" fmla="*/ 150666 h 4585480"/>
+              <a:gd name="connsiteX24" fmla="*/ 1035466 w 11396657"/>
+              <a:gd name="connsiteY24" fmla="*/ 760266 h 4585480"/>
+              <a:gd name="connsiteX25" fmla="*/ 324266 w 11396657"/>
+              <a:gd name="connsiteY25" fmla="*/ 1037357 h 4585480"/>
+              <a:gd name="connsiteX26" fmla="*/ 993 w 11396657"/>
+              <a:gd name="connsiteY26" fmla="*/ 1610011 h 4585480"/>
+              <a:gd name="connsiteX27" fmla="*/ 296557 w 11396657"/>
+              <a:gd name="connsiteY27" fmla="*/ 2099539 h 4585480"/>
+            </a:gdLst>
+            <a:ahLst/>
+            <a:cxnLst>
+              <a:cxn ang="0">
+                <a:pos x="connsiteX0" y="connsiteY0"/>
+              </a:cxn>
+              <a:cxn ang="0">
+                <a:pos x="connsiteX1" y="connsiteY1"/>
+              </a:cxn>
+              <a:cxn ang="0">
+                <a:pos x="connsiteX2" y="connsiteY2"/>
+              </a:cxn>
+              <a:cxn ang="0">
+                <a:pos x="connsiteX3" y="connsiteY3"/>
+              </a:cxn>
+              <a:cxn ang="0">
+                <a:pos x="connsiteX4" y="connsiteY4"/>
+              </a:cxn>
+              <a:cxn ang="0">
+                <a:pos x="connsiteX5" y="connsiteY5"/>
+              </a:cxn>
+              <a:cxn ang="0">
+                <a:pos x="connsiteX6" y="connsiteY6"/>
+              </a:cxn>
+              <a:cxn ang="0">
+                <a:pos x="connsiteX7" y="connsiteY7"/>
+              </a:cxn>
+              <a:cxn ang="0">
+                <a:pos x="connsiteX8" y="connsiteY8"/>
+              </a:cxn>
+              <a:cxn ang="0">
+                <a:pos x="connsiteX9" y="connsiteY9"/>
+              </a:cxn>
+              <a:cxn ang="0">
+                <a:pos x="connsiteX10" y="connsiteY10"/>
+              </a:cxn>
+              <a:cxn ang="0">
+                <a:pos x="connsiteX11" y="connsiteY11"/>
+              </a:cxn>
+              <a:cxn ang="0">
+                <a:pos x="connsiteX12" y="connsiteY12"/>
+              </a:cxn>
+              <a:cxn ang="0">
+                <a:pos x="connsiteX13" y="connsiteY13"/>
+              </a:cxn>
+              <a:cxn ang="0">
+                <a:pos x="connsiteX14" y="connsiteY14"/>
+              </a:cxn>
+              <a:cxn ang="0">
+                <a:pos x="connsiteX15" y="connsiteY15"/>
+              </a:cxn>
+              <a:cxn ang="0">
+                <a:pos x="connsiteX16" y="connsiteY16"/>
+              </a:cxn>
+              <a:cxn ang="0">
+                <a:pos x="connsiteX17" y="connsiteY17"/>
+              </a:cxn>
+              <a:cxn ang="0">
+                <a:pos x="connsiteX18" y="connsiteY18"/>
+              </a:cxn>
+              <a:cxn ang="0">
+                <a:pos x="connsiteX19" y="connsiteY19"/>
+              </a:cxn>
+              <a:cxn ang="0">
+                <a:pos x="connsiteX20" y="connsiteY20"/>
+              </a:cxn>
+              <a:cxn ang="0">
+                <a:pos x="connsiteX21" y="connsiteY21"/>
+              </a:cxn>
+              <a:cxn ang="0">
+                <a:pos x="connsiteX22" y="connsiteY22"/>
+              </a:cxn>
+              <a:cxn ang="0">
+                <a:pos x="connsiteX23" y="connsiteY23"/>
+              </a:cxn>
+              <a:cxn ang="0">
+                <a:pos x="connsiteX24" y="connsiteY24"/>
+              </a:cxn>
+              <a:cxn ang="0">
+                <a:pos x="connsiteX25" y="connsiteY25"/>
+              </a:cxn>
+              <a:cxn ang="0">
+                <a:pos x="connsiteX26" y="connsiteY26"/>
+              </a:cxn>
+              <a:cxn ang="0">
+                <a:pos x="connsiteX27" y="connsiteY27"/>
+              </a:cxn>
+            </a:cxnLst>
+            <a:rect l="l" t="t" r="r" b="b"/>
+            <a:pathLst>
+              <a:path w="11396657" h="4585480">
+                <a:moveTo>
+                  <a:pt x="296557" y="2099539"/>
+                </a:moveTo>
+                <a:cubicBezTo>
+                  <a:pt x="522848" y="2233466"/>
+                  <a:pt x="970812" y="2145720"/>
+                  <a:pt x="1358739" y="2413575"/>
+                </a:cubicBezTo>
+                <a:lnTo>
+                  <a:pt x="2522521" y="3217139"/>
+                </a:lnTo>
+                <a:cubicBezTo>
+                  <a:pt x="2938157" y="3460363"/>
+                  <a:pt x="3424606" y="3752848"/>
+                  <a:pt x="3852557" y="3872921"/>
+                </a:cubicBezTo>
+                <a:lnTo>
+                  <a:pt x="5136411" y="4233139"/>
+                </a:lnTo>
+                <a:cubicBezTo>
+                  <a:pt x="5644411" y="4331660"/>
+                  <a:pt x="6233999" y="4405551"/>
+                  <a:pt x="6900557" y="4464048"/>
+                </a:cubicBezTo>
+                <a:cubicBezTo>
+                  <a:pt x="7567115" y="4522545"/>
+                  <a:pt x="8506145" y="4596436"/>
+                  <a:pt x="9135757" y="4584121"/>
+                </a:cubicBezTo>
+                <a:cubicBezTo>
+                  <a:pt x="9765369" y="4571806"/>
+                  <a:pt x="10310315" y="4444036"/>
+                  <a:pt x="10678230" y="4390157"/>
+                </a:cubicBezTo>
+                <a:cubicBezTo>
+                  <a:pt x="11046145" y="4336278"/>
+                  <a:pt x="11238569" y="4456351"/>
+                  <a:pt x="11343248" y="4260848"/>
+                </a:cubicBezTo>
+                <a:cubicBezTo>
+                  <a:pt x="11447927" y="4065345"/>
+                  <a:pt x="11378654" y="3498848"/>
+                  <a:pt x="11306302" y="3217139"/>
+                </a:cubicBezTo>
+                <a:cubicBezTo>
+                  <a:pt x="11233951" y="2935430"/>
+                  <a:pt x="10952242" y="2810738"/>
+                  <a:pt x="10909139" y="2570593"/>
+                </a:cubicBezTo>
+                <a:cubicBezTo>
+                  <a:pt x="10866036" y="2330448"/>
+                  <a:pt x="10975333" y="1954836"/>
+                  <a:pt x="11047684" y="1776266"/>
+                </a:cubicBezTo>
+                <a:cubicBezTo>
+                  <a:pt x="11120035" y="1597696"/>
+                  <a:pt x="11289369" y="1569987"/>
+                  <a:pt x="11343248" y="1499175"/>
+                </a:cubicBezTo>
+                <a:cubicBezTo>
+                  <a:pt x="11398666" y="1417587"/>
+                  <a:pt x="11378654" y="1371405"/>
+                  <a:pt x="11380193" y="1286739"/>
+                </a:cubicBezTo>
+                <a:cubicBezTo>
+                  <a:pt x="11381732" y="1202073"/>
+                  <a:pt x="11404823" y="1066606"/>
+                  <a:pt x="11352484" y="991176"/>
+                </a:cubicBezTo>
+                <a:cubicBezTo>
+                  <a:pt x="11300145" y="915746"/>
+                  <a:pt x="11209321" y="863407"/>
+                  <a:pt x="11066157" y="834158"/>
+                </a:cubicBezTo>
+                <a:cubicBezTo>
+                  <a:pt x="10922993" y="804909"/>
+                  <a:pt x="10781368" y="820302"/>
+                  <a:pt x="10493501" y="815684"/>
+                </a:cubicBezTo>
+                <a:lnTo>
+                  <a:pt x="9338957" y="806448"/>
+                </a:lnTo>
+                <a:cubicBezTo>
+                  <a:pt x="8778618" y="798751"/>
+                  <a:pt x="7913478" y="714084"/>
+                  <a:pt x="7131466" y="769502"/>
+                </a:cubicBezTo>
+                <a:lnTo>
+                  <a:pt x="4785430" y="935757"/>
+                </a:lnTo>
+                <a:cubicBezTo>
+                  <a:pt x="4225091" y="932678"/>
+                  <a:pt x="3991103" y="861866"/>
+                  <a:pt x="3769430" y="751030"/>
+                </a:cubicBezTo>
+                <a:lnTo>
+                  <a:pt x="3104411" y="418521"/>
+                </a:lnTo>
+                <a:cubicBezTo>
+                  <a:pt x="2847332" y="293830"/>
+                  <a:pt x="2519442" y="-34061"/>
+                  <a:pt x="2226957" y="2884"/>
+                </a:cubicBezTo>
+                <a:cubicBezTo>
+                  <a:pt x="1962181" y="52145"/>
+                  <a:pt x="1631212" y="24436"/>
+                  <a:pt x="1432630" y="150666"/>
+                </a:cubicBezTo>
+                <a:cubicBezTo>
+                  <a:pt x="1234048" y="276896"/>
+                  <a:pt x="1272533" y="667902"/>
+                  <a:pt x="1035466" y="760266"/>
+                </a:cubicBezTo>
+                <a:cubicBezTo>
+                  <a:pt x="798399" y="852630"/>
+                  <a:pt x="496678" y="895733"/>
+                  <a:pt x="324266" y="1037357"/>
+                </a:cubicBezTo>
+                <a:cubicBezTo>
+                  <a:pt x="151854" y="1178981"/>
+                  <a:pt x="-14401" y="1431441"/>
+                  <a:pt x="993" y="1610011"/>
+                </a:cubicBezTo>
+                <a:cubicBezTo>
+                  <a:pt x="16387" y="1788581"/>
+                  <a:pt x="70266" y="1965612"/>
+                  <a:pt x="296557" y="2099539"/>
+                </a:cubicBezTo>
+                <a:close/>
+              </a:path>
+            </a:pathLst>
+          </a:custGeom>
+          <a:solidFill>
+            <a:schemeClr val="accent2">
+              <a:lumMod val="20000"/>
+              <a:lumOff val="80000"/>
+            </a:schemeClr>
+          </a:solidFill>
+        </p:spPr>
+        <p:style>
+          <a:lnRef idx="2">
+            <a:schemeClr val="accent1">
+              <a:shade val="50000"/>
+            </a:schemeClr>
+          </a:lnRef>
+          <a:fillRef idx="1">
+            <a:schemeClr val="accent1"/>
+          </a:fillRef>
+          <a:effectRef idx="0">
+            <a:schemeClr val="accent1"/>
+          </a:effectRef>
+          <a:fontRef idx="minor">
+            <a:schemeClr val="lt1"/>
+          </a:fontRef>
+        </p:style>
+        <p:txBody>
+          <a:bodyPr rtlCol="0" anchor="ctr"/>
+          <a:lstStyle/>
+          <a:p>
+            <a:pPr algn="ctr"/>
+            <a:endParaRPr lang="fr-FR"/>
+          </a:p>
+        </p:txBody>
+      </p:sp>
+      <p:sp>
+        <p:nvSpPr>
+          <p:cNvPr id="34" name="Forme libre 33"/>
+          <p:cNvSpPr/>
+          <p:nvPr/>
+        </p:nvSpPr>
+        <p:spPr>
+          <a:xfrm>
+            <a:off x="958628" y="4107146"/>
+            <a:ext cx="7514508" cy="2724367"/>
+          </a:xfrm>
+          <a:custGeom>
+            <a:avLst/>
+            <a:gdLst>
+              <a:gd name="connsiteX0" fmla="*/ 637563 w 7331978"/>
+              <a:gd name="connsiteY0" fmla="*/ 0 h 2650922"/>
+              <a:gd name="connsiteX1" fmla="*/ 1602297 w 7331978"/>
+              <a:gd name="connsiteY1" fmla="*/ 16778 h 2650922"/>
+              <a:gd name="connsiteX2" fmla="*/ 2432807 w 7331978"/>
+              <a:gd name="connsiteY2" fmla="*/ 595619 h 2650922"/>
+              <a:gd name="connsiteX3" fmla="*/ 3070371 w 7331978"/>
+              <a:gd name="connsiteY3" fmla="*/ 1300294 h 2650922"/>
+              <a:gd name="connsiteX4" fmla="*/ 4337108 w 7331978"/>
+              <a:gd name="connsiteY4" fmla="*/ 1442907 h 2650922"/>
+              <a:gd name="connsiteX5" fmla="*/ 5679347 w 7331978"/>
+              <a:gd name="connsiteY5" fmla="*/ 1518408 h 2650922"/>
+              <a:gd name="connsiteX6" fmla="*/ 7189365 w 7331978"/>
+              <a:gd name="connsiteY6" fmla="*/ 1593909 h 2650922"/>
+              <a:gd name="connsiteX7" fmla="*/ 7331978 w 7331978"/>
+              <a:gd name="connsiteY7" fmla="*/ 2088859 h 2650922"/>
+              <a:gd name="connsiteX8" fmla="*/ 7097086 w 7331978"/>
+              <a:gd name="connsiteY8" fmla="*/ 2533476 h 2650922"/>
+              <a:gd name="connsiteX9" fmla="*/ 4521666 w 7331978"/>
+              <a:gd name="connsiteY9" fmla="*/ 2567032 h 2650922"/>
+              <a:gd name="connsiteX10" fmla="*/ 2575420 w 7331978"/>
+              <a:gd name="connsiteY10" fmla="*/ 2650922 h 2650922"/>
+              <a:gd name="connsiteX11" fmla="*/ 788565 w 7331978"/>
+              <a:gd name="connsiteY11" fmla="*/ 2617366 h 2650922"/>
+              <a:gd name="connsiteX12" fmla="*/ 0 w 7331978"/>
+              <a:gd name="connsiteY12" fmla="*/ 1333850 h 2650922"/>
+              <a:gd name="connsiteX13" fmla="*/ 50334 w 7331978"/>
+              <a:gd name="connsiteY13" fmla="*/ 671120 h 2650922"/>
+              <a:gd name="connsiteX14" fmla="*/ 637563 w 7331978"/>
+              <a:gd name="connsiteY14" fmla="*/ 0 h 2650922"/>
+              <a:gd name="connsiteX0" fmla="*/ 637563 w 7331978"/>
+              <a:gd name="connsiteY0" fmla="*/ 0 h 2650922"/>
+              <a:gd name="connsiteX1" fmla="*/ 1602297 w 7331978"/>
+              <a:gd name="connsiteY1" fmla="*/ 16778 h 2650922"/>
+              <a:gd name="connsiteX2" fmla="*/ 2432807 w 7331978"/>
+              <a:gd name="connsiteY2" fmla="*/ 595619 h 2650922"/>
+              <a:gd name="connsiteX3" fmla="*/ 3070371 w 7331978"/>
+              <a:gd name="connsiteY3" fmla="*/ 1300294 h 2650922"/>
+              <a:gd name="connsiteX4" fmla="*/ 4337108 w 7331978"/>
+              <a:gd name="connsiteY4" fmla="*/ 1442907 h 2650922"/>
+              <a:gd name="connsiteX5" fmla="*/ 5679347 w 7331978"/>
+              <a:gd name="connsiteY5" fmla="*/ 1518408 h 2650922"/>
+              <a:gd name="connsiteX6" fmla="*/ 7189365 w 7331978"/>
+              <a:gd name="connsiteY6" fmla="*/ 1593909 h 2650922"/>
+              <a:gd name="connsiteX7" fmla="*/ 7331978 w 7331978"/>
+              <a:gd name="connsiteY7" fmla="*/ 2088859 h 2650922"/>
+              <a:gd name="connsiteX8" fmla="*/ 7097086 w 7331978"/>
+              <a:gd name="connsiteY8" fmla="*/ 2533476 h 2650922"/>
+              <a:gd name="connsiteX9" fmla="*/ 4521666 w 7331978"/>
+              <a:gd name="connsiteY9" fmla="*/ 2567032 h 2650922"/>
+              <a:gd name="connsiteX10" fmla="*/ 2575420 w 7331978"/>
+              <a:gd name="connsiteY10" fmla="*/ 2650922 h 2650922"/>
+              <a:gd name="connsiteX11" fmla="*/ 788565 w 7331978"/>
+              <a:gd name="connsiteY11" fmla="*/ 2617366 h 2650922"/>
+              <a:gd name="connsiteX12" fmla="*/ 0 w 7331978"/>
+              <a:gd name="connsiteY12" fmla="*/ 1333850 h 2650922"/>
+              <a:gd name="connsiteX13" fmla="*/ 50334 w 7331978"/>
+              <a:gd name="connsiteY13" fmla="*/ 671120 h 2650922"/>
+              <a:gd name="connsiteX14" fmla="*/ 637563 w 7331978"/>
+              <a:gd name="connsiteY14" fmla="*/ 0 h 2650922"/>
+              <a:gd name="connsiteX0" fmla="*/ 637563 w 7331978"/>
+              <a:gd name="connsiteY0" fmla="*/ 0 h 2650922"/>
+              <a:gd name="connsiteX1" fmla="*/ 1602297 w 7331978"/>
+              <a:gd name="connsiteY1" fmla="*/ 16778 h 2650922"/>
+              <a:gd name="connsiteX2" fmla="*/ 2432807 w 7331978"/>
+              <a:gd name="connsiteY2" fmla="*/ 595619 h 2650922"/>
+              <a:gd name="connsiteX3" fmla="*/ 3070371 w 7331978"/>
+              <a:gd name="connsiteY3" fmla="*/ 1300294 h 2650922"/>
+              <a:gd name="connsiteX4" fmla="*/ 4337108 w 7331978"/>
+              <a:gd name="connsiteY4" fmla="*/ 1442907 h 2650922"/>
+              <a:gd name="connsiteX5" fmla="*/ 5679347 w 7331978"/>
+              <a:gd name="connsiteY5" fmla="*/ 1518408 h 2650922"/>
+              <a:gd name="connsiteX6" fmla="*/ 7189365 w 7331978"/>
+              <a:gd name="connsiteY6" fmla="*/ 1593909 h 2650922"/>
+              <a:gd name="connsiteX7" fmla="*/ 7331978 w 7331978"/>
+              <a:gd name="connsiteY7" fmla="*/ 2088859 h 2650922"/>
+              <a:gd name="connsiteX8" fmla="*/ 7097086 w 7331978"/>
+              <a:gd name="connsiteY8" fmla="*/ 2533476 h 2650922"/>
+              <a:gd name="connsiteX9" fmla="*/ 4521666 w 7331978"/>
+              <a:gd name="connsiteY9" fmla="*/ 2567032 h 2650922"/>
+              <a:gd name="connsiteX10" fmla="*/ 2575420 w 7331978"/>
+              <a:gd name="connsiteY10" fmla="*/ 2650922 h 2650922"/>
+              <a:gd name="connsiteX11" fmla="*/ 788565 w 7331978"/>
+              <a:gd name="connsiteY11" fmla="*/ 2617366 h 2650922"/>
+              <a:gd name="connsiteX12" fmla="*/ 0 w 7331978"/>
+              <a:gd name="connsiteY12" fmla="*/ 1333850 h 2650922"/>
+              <a:gd name="connsiteX13" fmla="*/ 50334 w 7331978"/>
+              <a:gd name="connsiteY13" fmla="*/ 671120 h 2650922"/>
+              <a:gd name="connsiteX14" fmla="*/ 637563 w 7331978"/>
+              <a:gd name="connsiteY14" fmla="*/ 0 h 2650922"/>
+              <a:gd name="connsiteX0" fmla="*/ 637563 w 7331978"/>
+              <a:gd name="connsiteY0" fmla="*/ 70570 h 2721492"/>
+              <a:gd name="connsiteX1" fmla="*/ 1602297 w 7331978"/>
+              <a:gd name="connsiteY1" fmla="*/ 87348 h 2721492"/>
+              <a:gd name="connsiteX2" fmla="*/ 2432807 w 7331978"/>
+              <a:gd name="connsiteY2" fmla="*/ 666189 h 2721492"/>
+              <a:gd name="connsiteX3" fmla="*/ 3070371 w 7331978"/>
+              <a:gd name="connsiteY3" fmla="*/ 1370864 h 2721492"/>
+              <a:gd name="connsiteX4" fmla="*/ 4337108 w 7331978"/>
+              <a:gd name="connsiteY4" fmla="*/ 1513477 h 2721492"/>
+              <a:gd name="connsiteX5" fmla="*/ 5679347 w 7331978"/>
+              <a:gd name="connsiteY5" fmla="*/ 1588978 h 2721492"/>
+              <a:gd name="connsiteX6" fmla="*/ 7189365 w 7331978"/>
+              <a:gd name="connsiteY6" fmla="*/ 1664479 h 2721492"/>
+              <a:gd name="connsiteX7" fmla="*/ 7331978 w 7331978"/>
+              <a:gd name="connsiteY7" fmla="*/ 2159429 h 2721492"/>
+              <a:gd name="connsiteX8" fmla="*/ 7097086 w 7331978"/>
+              <a:gd name="connsiteY8" fmla="*/ 2604046 h 2721492"/>
+              <a:gd name="connsiteX9" fmla="*/ 4521666 w 7331978"/>
+              <a:gd name="connsiteY9" fmla="*/ 2637602 h 2721492"/>
+              <a:gd name="connsiteX10" fmla="*/ 2575420 w 7331978"/>
+              <a:gd name="connsiteY10" fmla="*/ 2721492 h 2721492"/>
+              <a:gd name="connsiteX11" fmla="*/ 788565 w 7331978"/>
+              <a:gd name="connsiteY11" fmla="*/ 2687936 h 2721492"/>
+              <a:gd name="connsiteX12" fmla="*/ 0 w 7331978"/>
+              <a:gd name="connsiteY12" fmla="*/ 1404420 h 2721492"/>
+              <a:gd name="connsiteX13" fmla="*/ 50334 w 7331978"/>
+              <a:gd name="connsiteY13" fmla="*/ 741690 h 2721492"/>
+              <a:gd name="connsiteX14" fmla="*/ 637563 w 7331978"/>
+              <a:gd name="connsiteY14" fmla="*/ 70570 h 2721492"/>
+              <a:gd name="connsiteX0" fmla="*/ 637563 w 7331978"/>
+              <a:gd name="connsiteY0" fmla="*/ 70570 h 2721492"/>
+              <a:gd name="connsiteX1" fmla="*/ 1602297 w 7331978"/>
+              <a:gd name="connsiteY1" fmla="*/ 87348 h 2721492"/>
+              <a:gd name="connsiteX2" fmla="*/ 2432807 w 7331978"/>
+              <a:gd name="connsiteY2" fmla="*/ 666189 h 2721492"/>
+              <a:gd name="connsiteX3" fmla="*/ 3070371 w 7331978"/>
+              <a:gd name="connsiteY3" fmla="*/ 1370864 h 2721492"/>
+              <a:gd name="connsiteX4" fmla="*/ 4337108 w 7331978"/>
+              <a:gd name="connsiteY4" fmla="*/ 1513477 h 2721492"/>
+              <a:gd name="connsiteX5" fmla="*/ 5679347 w 7331978"/>
+              <a:gd name="connsiteY5" fmla="*/ 1588978 h 2721492"/>
+              <a:gd name="connsiteX6" fmla="*/ 7189365 w 7331978"/>
+              <a:gd name="connsiteY6" fmla="*/ 1664479 h 2721492"/>
+              <a:gd name="connsiteX7" fmla="*/ 7331978 w 7331978"/>
+              <a:gd name="connsiteY7" fmla="*/ 2159429 h 2721492"/>
+              <a:gd name="connsiteX8" fmla="*/ 7097086 w 7331978"/>
+              <a:gd name="connsiteY8" fmla="*/ 2604046 h 2721492"/>
+              <a:gd name="connsiteX9" fmla="*/ 4521666 w 7331978"/>
+              <a:gd name="connsiteY9" fmla="*/ 2637602 h 2721492"/>
+              <a:gd name="connsiteX10" fmla="*/ 2575420 w 7331978"/>
+              <a:gd name="connsiteY10" fmla="*/ 2721492 h 2721492"/>
+              <a:gd name="connsiteX11" fmla="*/ 788565 w 7331978"/>
+              <a:gd name="connsiteY11" fmla="*/ 2687936 h 2721492"/>
+              <a:gd name="connsiteX12" fmla="*/ 0 w 7331978"/>
+              <a:gd name="connsiteY12" fmla="*/ 1404420 h 2721492"/>
+              <a:gd name="connsiteX13" fmla="*/ 50334 w 7331978"/>
+              <a:gd name="connsiteY13" fmla="*/ 741690 h 2721492"/>
+              <a:gd name="connsiteX14" fmla="*/ 637563 w 7331978"/>
+              <a:gd name="connsiteY14" fmla="*/ 70570 h 2721492"/>
+              <a:gd name="connsiteX0" fmla="*/ 703739 w 7398154"/>
+              <a:gd name="connsiteY0" fmla="*/ 70570 h 2721492"/>
+              <a:gd name="connsiteX1" fmla="*/ 1668473 w 7398154"/>
+              <a:gd name="connsiteY1" fmla="*/ 87348 h 2721492"/>
+              <a:gd name="connsiteX2" fmla="*/ 2498983 w 7398154"/>
+              <a:gd name="connsiteY2" fmla="*/ 666189 h 2721492"/>
+              <a:gd name="connsiteX3" fmla="*/ 3136547 w 7398154"/>
+              <a:gd name="connsiteY3" fmla="*/ 1370864 h 2721492"/>
+              <a:gd name="connsiteX4" fmla="*/ 4403284 w 7398154"/>
+              <a:gd name="connsiteY4" fmla="*/ 1513477 h 2721492"/>
+              <a:gd name="connsiteX5" fmla="*/ 5745523 w 7398154"/>
+              <a:gd name="connsiteY5" fmla="*/ 1588978 h 2721492"/>
+              <a:gd name="connsiteX6" fmla="*/ 7255541 w 7398154"/>
+              <a:gd name="connsiteY6" fmla="*/ 1664479 h 2721492"/>
+              <a:gd name="connsiteX7" fmla="*/ 7398154 w 7398154"/>
+              <a:gd name="connsiteY7" fmla="*/ 2159429 h 2721492"/>
+              <a:gd name="connsiteX8" fmla="*/ 7163262 w 7398154"/>
+              <a:gd name="connsiteY8" fmla="*/ 2604046 h 2721492"/>
+              <a:gd name="connsiteX9" fmla="*/ 4587842 w 7398154"/>
+              <a:gd name="connsiteY9" fmla="*/ 2637602 h 2721492"/>
+              <a:gd name="connsiteX10" fmla="*/ 2641596 w 7398154"/>
+              <a:gd name="connsiteY10" fmla="*/ 2721492 h 2721492"/>
+              <a:gd name="connsiteX11" fmla="*/ 854741 w 7398154"/>
+              <a:gd name="connsiteY11" fmla="*/ 2687936 h 2721492"/>
+              <a:gd name="connsiteX12" fmla="*/ 66176 w 7398154"/>
+              <a:gd name="connsiteY12" fmla="*/ 1404420 h 2721492"/>
+              <a:gd name="connsiteX13" fmla="*/ 116510 w 7398154"/>
+              <a:gd name="connsiteY13" fmla="*/ 741690 h 2721492"/>
+              <a:gd name="connsiteX14" fmla="*/ 703739 w 7398154"/>
+              <a:gd name="connsiteY14" fmla="*/ 70570 h 2721492"/>
+              <a:gd name="connsiteX0" fmla="*/ 703739 w 7398154"/>
+              <a:gd name="connsiteY0" fmla="*/ 70570 h 2721492"/>
+              <a:gd name="connsiteX1" fmla="*/ 1668473 w 7398154"/>
+              <a:gd name="connsiteY1" fmla="*/ 87348 h 2721492"/>
+              <a:gd name="connsiteX2" fmla="*/ 2498983 w 7398154"/>
+              <a:gd name="connsiteY2" fmla="*/ 666189 h 2721492"/>
+              <a:gd name="connsiteX3" fmla="*/ 3136547 w 7398154"/>
+              <a:gd name="connsiteY3" fmla="*/ 1370864 h 2721492"/>
+              <a:gd name="connsiteX4" fmla="*/ 4403284 w 7398154"/>
+              <a:gd name="connsiteY4" fmla="*/ 1513477 h 2721492"/>
+              <a:gd name="connsiteX5" fmla="*/ 5745523 w 7398154"/>
+              <a:gd name="connsiteY5" fmla="*/ 1588978 h 2721492"/>
+              <a:gd name="connsiteX6" fmla="*/ 7255541 w 7398154"/>
+              <a:gd name="connsiteY6" fmla="*/ 1664479 h 2721492"/>
+              <a:gd name="connsiteX7" fmla="*/ 7398154 w 7398154"/>
+              <a:gd name="connsiteY7" fmla="*/ 2159429 h 2721492"/>
+              <a:gd name="connsiteX8" fmla="*/ 7163262 w 7398154"/>
+              <a:gd name="connsiteY8" fmla="*/ 2604046 h 2721492"/>
+              <a:gd name="connsiteX9" fmla="*/ 4587842 w 7398154"/>
+              <a:gd name="connsiteY9" fmla="*/ 2637602 h 2721492"/>
+              <a:gd name="connsiteX10" fmla="*/ 2641596 w 7398154"/>
+              <a:gd name="connsiteY10" fmla="*/ 2721492 h 2721492"/>
+              <a:gd name="connsiteX11" fmla="*/ 854741 w 7398154"/>
+              <a:gd name="connsiteY11" fmla="*/ 2687936 h 2721492"/>
+              <a:gd name="connsiteX12" fmla="*/ 66176 w 7398154"/>
+              <a:gd name="connsiteY12" fmla="*/ 1404420 h 2721492"/>
+              <a:gd name="connsiteX13" fmla="*/ 116510 w 7398154"/>
+              <a:gd name="connsiteY13" fmla="*/ 741690 h 2721492"/>
+              <a:gd name="connsiteX14" fmla="*/ 703739 w 7398154"/>
+              <a:gd name="connsiteY14" fmla="*/ 70570 h 2721492"/>
+              <a:gd name="connsiteX0" fmla="*/ 703739 w 7398154"/>
+              <a:gd name="connsiteY0" fmla="*/ 70570 h 2797237"/>
+              <a:gd name="connsiteX1" fmla="*/ 1668473 w 7398154"/>
+              <a:gd name="connsiteY1" fmla="*/ 87348 h 2797237"/>
+              <a:gd name="connsiteX2" fmla="*/ 2498983 w 7398154"/>
+              <a:gd name="connsiteY2" fmla="*/ 666189 h 2797237"/>
+              <a:gd name="connsiteX3" fmla="*/ 3136547 w 7398154"/>
+              <a:gd name="connsiteY3" fmla="*/ 1370864 h 2797237"/>
+              <a:gd name="connsiteX4" fmla="*/ 4403284 w 7398154"/>
+              <a:gd name="connsiteY4" fmla="*/ 1513477 h 2797237"/>
+              <a:gd name="connsiteX5" fmla="*/ 5745523 w 7398154"/>
+              <a:gd name="connsiteY5" fmla="*/ 1588978 h 2797237"/>
+              <a:gd name="connsiteX6" fmla="*/ 7255541 w 7398154"/>
+              <a:gd name="connsiteY6" fmla="*/ 1664479 h 2797237"/>
+              <a:gd name="connsiteX7" fmla="*/ 7398154 w 7398154"/>
+              <a:gd name="connsiteY7" fmla="*/ 2159429 h 2797237"/>
+              <a:gd name="connsiteX8" fmla="*/ 7163262 w 7398154"/>
+              <a:gd name="connsiteY8" fmla="*/ 2604046 h 2797237"/>
+              <a:gd name="connsiteX9" fmla="*/ 4587842 w 7398154"/>
+              <a:gd name="connsiteY9" fmla="*/ 2637602 h 2797237"/>
+              <a:gd name="connsiteX10" fmla="*/ 2641596 w 7398154"/>
+              <a:gd name="connsiteY10" fmla="*/ 2721492 h 2797237"/>
+              <a:gd name="connsiteX11" fmla="*/ 854741 w 7398154"/>
+              <a:gd name="connsiteY11" fmla="*/ 2687936 h 2797237"/>
+              <a:gd name="connsiteX12" fmla="*/ 66176 w 7398154"/>
+              <a:gd name="connsiteY12" fmla="*/ 1404420 h 2797237"/>
+              <a:gd name="connsiteX13" fmla="*/ 116510 w 7398154"/>
+              <a:gd name="connsiteY13" fmla="*/ 741690 h 2797237"/>
+              <a:gd name="connsiteX14" fmla="*/ 703739 w 7398154"/>
+              <a:gd name="connsiteY14" fmla="*/ 70570 h 2797237"/>
+              <a:gd name="connsiteX0" fmla="*/ 702393 w 7396808"/>
+              <a:gd name="connsiteY0" fmla="*/ 70570 h 2724624"/>
+              <a:gd name="connsiteX1" fmla="*/ 1667127 w 7396808"/>
+              <a:gd name="connsiteY1" fmla="*/ 87348 h 2724624"/>
+              <a:gd name="connsiteX2" fmla="*/ 2497637 w 7396808"/>
+              <a:gd name="connsiteY2" fmla="*/ 666189 h 2724624"/>
+              <a:gd name="connsiteX3" fmla="*/ 3135201 w 7396808"/>
+              <a:gd name="connsiteY3" fmla="*/ 1370864 h 2724624"/>
+              <a:gd name="connsiteX4" fmla="*/ 4401938 w 7396808"/>
+              <a:gd name="connsiteY4" fmla="*/ 1513477 h 2724624"/>
+              <a:gd name="connsiteX5" fmla="*/ 5744177 w 7396808"/>
+              <a:gd name="connsiteY5" fmla="*/ 1588978 h 2724624"/>
+              <a:gd name="connsiteX6" fmla="*/ 7254195 w 7396808"/>
+              <a:gd name="connsiteY6" fmla="*/ 1664479 h 2724624"/>
+              <a:gd name="connsiteX7" fmla="*/ 7396808 w 7396808"/>
+              <a:gd name="connsiteY7" fmla="*/ 2159429 h 2724624"/>
+              <a:gd name="connsiteX8" fmla="*/ 7161916 w 7396808"/>
+              <a:gd name="connsiteY8" fmla="*/ 2604046 h 2724624"/>
+              <a:gd name="connsiteX9" fmla="*/ 4586496 w 7396808"/>
+              <a:gd name="connsiteY9" fmla="*/ 2637602 h 2724624"/>
+              <a:gd name="connsiteX10" fmla="*/ 2640250 w 7396808"/>
+              <a:gd name="connsiteY10" fmla="*/ 2721492 h 2724624"/>
+              <a:gd name="connsiteX11" fmla="*/ 834923 w 7396808"/>
+              <a:gd name="connsiteY11" fmla="*/ 2521682 h 2724624"/>
+              <a:gd name="connsiteX12" fmla="*/ 64830 w 7396808"/>
+              <a:gd name="connsiteY12" fmla="*/ 1404420 h 2724624"/>
+              <a:gd name="connsiteX13" fmla="*/ 115164 w 7396808"/>
+              <a:gd name="connsiteY13" fmla="*/ 741690 h 2724624"/>
+              <a:gd name="connsiteX14" fmla="*/ 702393 w 7396808"/>
+              <a:gd name="connsiteY14" fmla="*/ 70570 h 2724624"/>
+              <a:gd name="connsiteX0" fmla="*/ 702393 w 7396808"/>
+              <a:gd name="connsiteY0" fmla="*/ 70570 h 2724367"/>
+              <a:gd name="connsiteX1" fmla="*/ 1667127 w 7396808"/>
+              <a:gd name="connsiteY1" fmla="*/ 87348 h 2724367"/>
+              <a:gd name="connsiteX2" fmla="*/ 2497637 w 7396808"/>
+              <a:gd name="connsiteY2" fmla="*/ 666189 h 2724367"/>
+              <a:gd name="connsiteX3" fmla="*/ 3135201 w 7396808"/>
+              <a:gd name="connsiteY3" fmla="*/ 1370864 h 2724367"/>
+              <a:gd name="connsiteX4" fmla="*/ 4401938 w 7396808"/>
+              <a:gd name="connsiteY4" fmla="*/ 1513477 h 2724367"/>
+              <a:gd name="connsiteX5" fmla="*/ 5744177 w 7396808"/>
+              <a:gd name="connsiteY5" fmla="*/ 1588978 h 2724367"/>
+              <a:gd name="connsiteX6" fmla="*/ 7254195 w 7396808"/>
+              <a:gd name="connsiteY6" fmla="*/ 1664479 h 2724367"/>
+              <a:gd name="connsiteX7" fmla="*/ 7396808 w 7396808"/>
+              <a:gd name="connsiteY7" fmla="*/ 2159429 h 2724367"/>
+              <a:gd name="connsiteX8" fmla="*/ 7161916 w 7396808"/>
+              <a:gd name="connsiteY8" fmla="*/ 2604046 h 2724367"/>
+              <a:gd name="connsiteX9" fmla="*/ 4586496 w 7396808"/>
+              <a:gd name="connsiteY9" fmla="*/ 2637602 h 2724367"/>
+              <a:gd name="connsiteX10" fmla="*/ 2640250 w 7396808"/>
+              <a:gd name="connsiteY10" fmla="*/ 2721492 h 2724367"/>
+              <a:gd name="connsiteX11" fmla="*/ 834923 w 7396808"/>
+              <a:gd name="connsiteY11" fmla="*/ 2521682 h 2724367"/>
+              <a:gd name="connsiteX12" fmla="*/ 64830 w 7396808"/>
+              <a:gd name="connsiteY12" fmla="*/ 1404420 h 2724367"/>
+              <a:gd name="connsiteX13" fmla="*/ 115164 w 7396808"/>
+              <a:gd name="connsiteY13" fmla="*/ 741690 h 2724367"/>
+              <a:gd name="connsiteX14" fmla="*/ 702393 w 7396808"/>
+              <a:gd name="connsiteY14" fmla="*/ 70570 h 2724367"/>
+              <a:gd name="connsiteX0" fmla="*/ 702393 w 7396808"/>
+              <a:gd name="connsiteY0" fmla="*/ 70570 h 2724367"/>
+              <a:gd name="connsiteX1" fmla="*/ 1667127 w 7396808"/>
+              <a:gd name="connsiteY1" fmla="*/ 87348 h 2724367"/>
+              <a:gd name="connsiteX2" fmla="*/ 2497637 w 7396808"/>
+              <a:gd name="connsiteY2" fmla="*/ 666189 h 2724367"/>
+              <a:gd name="connsiteX3" fmla="*/ 3135201 w 7396808"/>
+              <a:gd name="connsiteY3" fmla="*/ 1370864 h 2724367"/>
+              <a:gd name="connsiteX4" fmla="*/ 4401938 w 7396808"/>
+              <a:gd name="connsiteY4" fmla="*/ 1513477 h 2724367"/>
+              <a:gd name="connsiteX5" fmla="*/ 5744177 w 7396808"/>
+              <a:gd name="connsiteY5" fmla="*/ 1588978 h 2724367"/>
+              <a:gd name="connsiteX6" fmla="*/ 7254195 w 7396808"/>
+              <a:gd name="connsiteY6" fmla="*/ 1664479 h 2724367"/>
+              <a:gd name="connsiteX7" fmla="*/ 7396808 w 7396808"/>
+              <a:gd name="connsiteY7" fmla="*/ 2159429 h 2724367"/>
+              <a:gd name="connsiteX8" fmla="*/ 7161916 w 7396808"/>
+              <a:gd name="connsiteY8" fmla="*/ 2604046 h 2724367"/>
+              <a:gd name="connsiteX9" fmla="*/ 4586496 w 7396808"/>
+              <a:gd name="connsiteY9" fmla="*/ 2637602 h 2724367"/>
+              <a:gd name="connsiteX10" fmla="*/ 2640250 w 7396808"/>
+              <a:gd name="connsiteY10" fmla="*/ 2721492 h 2724367"/>
+              <a:gd name="connsiteX11" fmla="*/ 834923 w 7396808"/>
+              <a:gd name="connsiteY11" fmla="*/ 2521682 h 2724367"/>
+              <a:gd name="connsiteX12" fmla="*/ 64830 w 7396808"/>
+              <a:gd name="connsiteY12" fmla="*/ 1404420 h 2724367"/>
+              <a:gd name="connsiteX13" fmla="*/ 115164 w 7396808"/>
+              <a:gd name="connsiteY13" fmla="*/ 741690 h 2724367"/>
+              <a:gd name="connsiteX14" fmla="*/ 702393 w 7396808"/>
+              <a:gd name="connsiteY14" fmla="*/ 70570 h 2724367"/>
+              <a:gd name="connsiteX0" fmla="*/ 702393 w 7449278"/>
+              <a:gd name="connsiteY0" fmla="*/ 70570 h 2724367"/>
+              <a:gd name="connsiteX1" fmla="*/ 1667127 w 7449278"/>
+              <a:gd name="connsiteY1" fmla="*/ 87348 h 2724367"/>
+              <a:gd name="connsiteX2" fmla="*/ 2497637 w 7449278"/>
+              <a:gd name="connsiteY2" fmla="*/ 666189 h 2724367"/>
+              <a:gd name="connsiteX3" fmla="*/ 3135201 w 7449278"/>
+              <a:gd name="connsiteY3" fmla="*/ 1370864 h 2724367"/>
+              <a:gd name="connsiteX4" fmla="*/ 4401938 w 7449278"/>
+              <a:gd name="connsiteY4" fmla="*/ 1513477 h 2724367"/>
+              <a:gd name="connsiteX5" fmla="*/ 5744177 w 7449278"/>
+              <a:gd name="connsiteY5" fmla="*/ 1588978 h 2724367"/>
+              <a:gd name="connsiteX6" fmla="*/ 7254195 w 7449278"/>
+              <a:gd name="connsiteY6" fmla="*/ 1664479 h 2724367"/>
+              <a:gd name="connsiteX7" fmla="*/ 7396808 w 7449278"/>
+              <a:gd name="connsiteY7" fmla="*/ 2159429 h 2724367"/>
+              <a:gd name="connsiteX8" fmla="*/ 7161916 w 7449278"/>
+              <a:gd name="connsiteY8" fmla="*/ 2604046 h 2724367"/>
+              <a:gd name="connsiteX9" fmla="*/ 4586496 w 7449278"/>
+              <a:gd name="connsiteY9" fmla="*/ 2637602 h 2724367"/>
+              <a:gd name="connsiteX10" fmla="*/ 2640250 w 7449278"/>
+              <a:gd name="connsiteY10" fmla="*/ 2721492 h 2724367"/>
+              <a:gd name="connsiteX11" fmla="*/ 834923 w 7449278"/>
+              <a:gd name="connsiteY11" fmla="*/ 2521682 h 2724367"/>
+              <a:gd name="connsiteX12" fmla="*/ 64830 w 7449278"/>
+              <a:gd name="connsiteY12" fmla="*/ 1404420 h 2724367"/>
+              <a:gd name="connsiteX13" fmla="*/ 115164 w 7449278"/>
+              <a:gd name="connsiteY13" fmla="*/ 741690 h 2724367"/>
+              <a:gd name="connsiteX14" fmla="*/ 702393 w 7449278"/>
+              <a:gd name="connsiteY14" fmla="*/ 70570 h 2724367"/>
+              <a:gd name="connsiteX0" fmla="*/ 702393 w 7449278"/>
+              <a:gd name="connsiteY0" fmla="*/ 70570 h 2724367"/>
+              <a:gd name="connsiteX1" fmla="*/ 1667127 w 7449278"/>
+              <a:gd name="connsiteY1" fmla="*/ 87348 h 2724367"/>
+              <a:gd name="connsiteX2" fmla="*/ 2497637 w 7449278"/>
+              <a:gd name="connsiteY2" fmla="*/ 666189 h 2724367"/>
+              <a:gd name="connsiteX3" fmla="*/ 3135201 w 7449278"/>
+              <a:gd name="connsiteY3" fmla="*/ 1370864 h 2724367"/>
+              <a:gd name="connsiteX4" fmla="*/ 4401938 w 7449278"/>
+              <a:gd name="connsiteY4" fmla="*/ 1513477 h 2724367"/>
+              <a:gd name="connsiteX5" fmla="*/ 5744177 w 7449278"/>
+              <a:gd name="connsiteY5" fmla="*/ 1588978 h 2724367"/>
+              <a:gd name="connsiteX6" fmla="*/ 7254195 w 7449278"/>
+              <a:gd name="connsiteY6" fmla="*/ 1664479 h 2724367"/>
+              <a:gd name="connsiteX7" fmla="*/ 7396808 w 7449278"/>
+              <a:gd name="connsiteY7" fmla="*/ 2159429 h 2724367"/>
+              <a:gd name="connsiteX8" fmla="*/ 7161916 w 7449278"/>
+              <a:gd name="connsiteY8" fmla="*/ 2604046 h 2724367"/>
+              <a:gd name="connsiteX9" fmla="*/ 4586496 w 7449278"/>
+              <a:gd name="connsiteY9" fmla="*/ 2637602 h 2724367"/>
+              <a:gd name="connsiteX10" fmla="*/ 2640250 w 7449278"/>
+              <a:gd name="connsiteY10" fmla="*/ 2721492 h 2724367"/>
+              <a:gd name="connsiteX11" fmla="*/ 834923 w 7449278"/>
+              <a:gd name="connsiteY11" fmla="*/ 2521682 h 2724367"/>
+              <a:gd name="connsiteX12" fmla="*/ 64830 w 7449278"/>
+              <a:gd name="connsiteY12" fmla="*/ 1404420 h 2724367"/>
+              <a:gd name="connsiteX13" fmla="*/ 115164 w 7449278"/>
+              <a:gd name="connsiteY13" fmla="*/ 741690 h 2724367"/>
+              <a:gd name="connsiteX14" fmla="*/ 702393 w 7449278"/>
+              <a:gd name="connsiteY14" fmla="*/ 70570 h 2724367"/>
+              <a:gd name="connsiteX0" fmla="*/ 702393 w 7454620"/>
+              <a:gd name="connsiteY0" fmla="*/ 70570 h 2724367"/>
+              <a:gd name="connsiteX1" fmla="*/ 1667127 w 7454620"/>
+              <a:gd name="connsiteY1" fmla="*/ 87348 h 2724367"/>
+              <a:gd name="connsiteX2" fmla="*/ 2497637 w 7454620"/>
+              <a:gd name="connsiteY2" fmla="*/ 666189 h 2724367"/>
+              <a:gd name="connsiteX3" fmla="*/ 3135201 w 7454620"/>
+              <a:gd name="connsiteY3" fmla="*/ 1370864 h 2724367"/>
+              <a:gd name="connsiteX4" fmla="*/ 4401938 w 7454620"/>
+              <a:gd name="connsiteY4" fmla="*/ 1513477 h 2724367"/>
+              <a:gd name="connsiteX5" fmla="*/ 5744177 w 7454620"/>
+              <a:gd name="connsiteY5" fmla="*/ 1588978 h 2724367"/>
+              <a:gd name="connsiteX6" fmla="*/ 7254195 w 7454620"/>
+              <a:gd name="connsiteY6" fmla="*/ 1664479 h 2724367"/>
+              <a:gd name="connsiteX7" fmla="*/ 7396808 w 7454620"/>
+              <a:gd name="connsiteY7" fmla="*/ 2159429 h 2724367"/>
+              <a:gd name="connsiteX8" fmla="*/ 6866352 w 7454620"/>
+              <a:gd name="connsiteY8" fmla="*/ 2604046 h 2724367"/>
+              <a:gd name="connsiteX9" fmla="*/ 4586496 w 7454620"/>
+              <a:gd name="connsiteY9" fmla="*/ 2637602 h 2724367"/>
+              <a:gd name="connsiteX10" fmla="*/ 2640250 w 7454620"/>
+              <a:gd name="connsiteY10" fmla="*/ 2721492 h 2724367"/>
+              <a:gd name="connsiteX11" fmla="*/ 834923 w 7454620"/>
+              <a:gd name="connsiteY11" fmla="*/ 2521682 h 2724367"/>
+              <a:gd name="connsiteX12" fmla="*/ 64830 w 7454620"/>
+              <a:gd name="connsiteY12" fmla="*/ 1404420 h 2724367"/>
+              <a:gd name="connsiteX13" fmla="*/ 115164 w 7454620"/>
+              <a:gd name="connsiteY13" fmla="*/ 741690 h 2724367"/>
+              <a:gd name="connsiteX14" fmla="*/ 702393 w 7454620"/>
+              <a:gd name="connsiteY14" fmla="*/ 70570 h 2724367"/>
+              <a:gd name="connsiteX0" fmla="*/ 702393 w 7511741"/>
+              <a:gd name="connsiteY0" fmla="*/ 70570 h 2724367"/>
+              <a:gd name="connsiteX1" fmla="*/ 1667127 w 7511741"/>
+              <a:gd name="connsiteY1" fmla="*/ 87348 h 2724367"/>
+              <a:gd name="connsiteX2" fmla="*/ 2497637 w 7511741"/>
+              <a:gd name="connsiteY2" fmla="*/ 666189 h 2724367"/>
+              <a:gd name="connsiteX3" fmla="*/ 3135201 w 7511741"/>
+              <a:gd name="connsiteY3" fmla="*/ 1370864 h 2724367"/>
+              <a:gd name="connsiteX4" fmla="*/ 4401938 w 7511741"/>
+              <a:gd name="connsiteY4" fmla="*/ 1513477 h 2724367"/>
+              <a:gd name="connsiteX5" fmla="*/ 5744177 w 7511741"/>
+              <a:gd name="connsiteY5" fmla="*/ 1588978 h 2724367"/>
+              <a:gd name="connsiteX6" fmla="*/ 7254195 w 7511741"/>
+              <a:gd name="connsiteY6" fmla="*/ 1664479 h 2724367"/>
+              <a:gd name="connsiteX7" fmla="*/ 7479935 w 7511741"/>
+              <a:gd name="connsiteY7" fmla="*/ 2205611 h 2724367"/>
+              <a:gd name="connsiteX8" fmla="*/ 6866352 w 7511741"/>
+              <a:gd name="connsiteY8" fmla="*/ 2604046 h 2724367"/>
+              <a:gd name="connsiteX9" fmla="*/ 4586496 w 7511741"/>
+              <a:gd name="connsiteY9" fmla="*/ 2637602 h 2724367"/>
+              <a:gd name="connsiteX10" fmla="*/ 2640250 w 7511741"/>
+              <a:gd name="connsiteY10" fmla="*/ 2721492 h 2724367"/>
+              <a:gd name="connsiteX11" fmla="*/ 834923 w 7511741"/>
+              <a:gd name="connsiteY11" fmla="*/ 2521682 h 2724367"/>
+              <a:gd name="connsiteX12" fmla="*/ 64830 w 7511741"/>
+              <a:gd name="connsiteY12" fmla="*/ 1404420 h 2724367"/>
+              <a:gd name="connsiteX13" fmla="*/ 115164 w 7511741"/>
+              <a:gd name="connsiteY13" fmla="*/ 741690 h 2724367"/>
+              <a:gd name="connsiteX14" fmla="*/ 702393 w 7511741"/>
+              <a:gd name="connsiteY14" fmla="*/ 70570 h 2724367"/>
+              <a:gd name="connsiteX0" fmla="*/ 702393 w 7514508"/>
+              <a:gd name="connsiteY0" fmla="*/ 70570 h 2724367"/>
+              <a:gd name="connsiteX1" fmla="*/ 1667127 w 7514508"/>
+              <a:gd name="connsiteY1" fmla="*/ 87348 h 2724367"/>
+              <a:gd name="connsiteX2" fmla="*/ 2497637 w 7514508"/>
+              <a:gd name="connsiteY2" fmla="*/ 666189 h 2724367"/>
+              <a:gd name="connsiteX3" fmla="*/ 3135201 w 7514508"/>
+              <a:gd name="connsiteY3" fmla="*/ 1370864 h 2724367"/>
+              <a:gd name="connsiteX4" fmla="*/ 4401938 w 7514508"/>
+              <a:gd name="connsiteY4" fmla="*/ 1513477 h 2724367"/>
+              <a:gd name="connsiteX5" fmla="*/ 5744177 w 7514508"/>
+              <a:gd name="connsiteY5" fmla="*/ 1588978 h 2724367"/>
+              <a:gd name="connsiteX6" fmla="*/ 7254195 w 7514508"/>
+              <a:gd name="connsiteY6" fmla="*/ 1664479 h 2724367"/>
+              <a:gd name="connsiteX7" fmla="*/ 7479935 w 7514508"/>
+              <a:gd name="connsiteY7" fmla="*/ 2205611 h 2724367"/>
+              <a:gd name="connsiteX8" fmla="*/ 6866352 w 7514508"/>
+              <a:gd name="connsiteY8" fmla="*/ 2604046 h 2724367"/>
+              <a:gd name="connsiteX9" fmla="*/ 4586496 w 7514508"/>
+              <a:gd name="connsiteY9" fmla="*/ 2637602 h 2724367"/>
+              <a:gd name="connsiteX10" fmla="*/ 2640250 w 7514508"/>
+              <a:gd name="connsiteY10" fmla="*/ 2721492 h 2724367"/>
+              <a:gd name="connsiteX11" fmla="*/ 834923 w 7514508"/>
+              <a:gd name="connsiteY11" fmla="*/ 2521682 h 2724367"/>
+              <a:gd name="connsiteX12" fmla="*/ 64830 w 7514508"/>
+              <a:gd name="connsiteY12" fmla="*/ 1404420 h 2724367"/>
+              <a:gd name="connsiteX13" fmla="*/ 115164 w 7514508"/>
+              <a:gd name="connsiteY13" fmla="*/ 741690 h 2724367"/>
+              <a:gd name="connsiteX14" fmla="*/ 702393 w 7514508"/>
+              <a:gd name="connsiteY14" fmla="*/ 70570 h 2724367"/>
+              <a:gd name="connsiteX0" fmla="*/ 702393 w 7514508"/>
+              <a:gd name="connsiteY0" fmla="*/ 70570 h 2724367"/>
+              <a:gd name="connsiteX1" fmla="*/ 1667127 w 7514508"/>
+              <a:gd name="connsiteY1" fmla="*/ 87348 h 2724367"/>
+              <a:gd name="connsiteX2" fmla="*/ 2497637 w 7514508"/>
+              <a:gd name="connsiteY2" fmla="*/ 666189 h 2724367"/>
+              <a:gd name="connsiteX3" fmla="*/ 3135201 w 7514508"/>
+              <a:gd name="connsiteY3" fmla="*/ 1370864 h 2724367"/>
+              <a:gd name="connsiteX4" fmla="*/ 4401938 w 7514508"/>
+              <a:gd name="connsiteY4" fmla="*/ 1513477 h 2724367"/>
+              <a:gd name="connsiteX5" fmla="*/ 5744177 w 7514508"/>
+              <a:gd name="connsiteY5" fmla="*/ 1588978 h 2724367"/>
+              <a:gd name="connsiteX6" fmla="*/ 7254195 w 7514508"/>
+              <a:gd name="connsiteY6" fmla="*/ 1664479 h 2724367"/>
+              <a:gd name="connsiteX7" fmla="*/ 7479935 w 7514508"/>
+              <a:gd name="connsiteY7" fmla="*/ 2205611 h 2724367"/>
+              <a:gd name="connsiteX8" fmla="*/ 6866352 w 7514508"/>
+              <a:gd name="connsiteY8" fmla="*/ 2604046 h 2724367"/>
+              <a:gd name="connsiteX9" fmla="*/ 4586496 w 7514508"/>
+              <a:gd name="connsiteY9" fmla="*/ 2637602 h 2724367"/>
+              <a:gd name="connsiteX10" fmla="*/ 2640250 w 7514508"/>
+              <a:gd name="connsiteY10" fmla="*/ 2721492 h 2724367"/>
+              <a:gd name="connsiteX11" fmla="*/ 834923 w 7514508"/>
+              <a:gd name="connsiteY11" fmla="*/ 2521682 h 2724367"/>
+              <a:gd name="connsiteX12" fmla="*/ 64830 w 7514508"/>
+              <a:gd name="connsiteY12" fmla="*/ 1404420 h 2724367"/>
+              <a:gd name="connsiteX13" fmla="*/ 115164 w 7514508"/>
+              <a:gd name="connsiteY13" fmla="*/ 741690 h 2724367"/>
+              <a:gd name="connsiteX14" fmla="*/ 702393 w 7514508"/>
+              <a:gd name="connsiteY14" fmla="*/ 70570 h 2724367"/>
+              <a:gd name="connsiteX0" fmla="*/ 702393 w 7514508"/>
+              <a:gd name="connsiteY0" fmla="*/ 70570 h 2724367"/>
+              <a:gd name="connsiteX1" fmla="*/ 1667127 w 7514508"/>
+              <a:gd name="connsiteY1" fmla="*/ 87348 h 2724367"/>
+              <a:gd name="connsiteX2" fmla="*/ 2497637 w 7514508"/>
+              <a:gd name="connsiteY2" fmla="*/ 666189 h 2724367"/>
+              <a:gd name="connsiteX3" fmla="*/ 3135201 w 7514508"/>
+              <a:gd name="connsiteY3" fmla="*/ 1370864 h 2724367"/>
+              <a:gd name="connsiteX4" fmla="*/ 4401938 w 7514508"/>
+              <a:gd name="connsiteY4" fmla="*/ 1513477 h 2724367"/>
+              <a:gd name="connsiteX5" fmla="*/ 5744177 w 7514508"/>
+              <a:gd name="connsiteY5" fmla="*/ 1588978 h 2724367"/>
+              <a:gd name="connsiteX6" fmla="*/ 7254195 w 7514508"/>
+              <a:gd name="connsiteY6" fmla="*/ 1664479 h 2724367"/>
+              <a:gd name="connsiteX7" fmla="*/ 7479935 w 7514508"/>
+              <a:gd name="connsiteY7" fmla="*/ 2205611 h 2724367"/>
+              <a:gd name="connsiteX8" fmla="*/ 6866352 w 7514508"/>
+              <a:gd name="connsiteY8" fmla="*/ 2604046 h 2724367"/>
+              <a:gd name="connsiteX9" fmla="*/ 4586496 w 7514508"/>
+              <a:gd name="connsiteY9" fmla="*/ 2637602 h 2724367"/>
+              <a:gd name="connsiteX10" fmla="*/ 2640250 w 7514508"/>
+              <a:gd name="connsiteY10" fmla="*/ 2721492 h 2724367"/>
+              <a:gd name="connsiteX11" fmla="*/ 834923 w 7514508"/>
+              <a:gd name="connsiteY11" fmla="*/ 2521682 h 2724367"/>
+              <a:gd name="connsiteX12" fmla="*/ 64830 w 7514508"/>
+              <a:gd name="connsiteY12" fmla="*/ 1404420 h 2724367"/>
+              <a:gd name="connsiteX13" fmla="*/ 115164 w 7514508"/>
+              <a:gd name="connsiteY13" fmla="*/ 741690 h 2724367"/>
+              <a:gd name="connsiteX14" fmla="*/ 702393 w 7514508"/>
+              <a:gd name="connsiteY14" fmla="*/ 70570 h 2724367"/>
+            </a:gdLst>
+            <a:ahLst/>
+            <a:cxnLst>
+              <a:cxn ang="0">
+                <a:pos x="connsiteX0" y="connsiteY0"/>
+              </a:cxn>
+              <a:cxn ang="0">
+                <a:pos x="connsiteX1" y="connsiteY1"/>
+              </a:cxn>
+              <a:cxn ang="0">
+                <a:pos x="connsiteX2" y="connsiteY2"/>
+              </a:cxn>
+              <a:cxn ang="0">
+                <a:pos x="connsiteX3" y="connsiteY3"/>
+              </a:cxn>
+              <a:cxn ang="0">
+                <a:pos x="connsiteX4" y="connsiteY4"/>
+              </a:cxn>
+              <a:cxn ang="0">
+                <a:pos x="connsiteX5" y="connsiteY5"/>
+              </a:cxn>
+              <a:cxn ang="0">
+                <a:pos x="connsiteX6" y="connsiteY6"/>
+              </a:cxn>
+              <a:cxn ang="0">
+                <a:pos x="connsiteX7" y="connsiteY7"/>
+              </a:cxn>
+              <a:cxn ang="0">
+                <a:pos x="connsiteX8" y="connsiteY8"/>
+              </a:cxn>
+              <a:cxn ang="0">
+                <a:pos x="connsiteX9" y="connsiteY9"/>
+              </a:cxn>
+              <a:cxn ang="0">
+                <a:pos x="connsiteX10" y="connsiteY10"/>
+              </a:cxn>
+              <a:cxn ang="0">
+                <a:pos x="connsiteX11" y="connsiteY11"/>
+              </a:cxn>
+              <a:cxn ang="0">
+                <a:pos x="connsiteX12" y="connsiteY12"/>
+              </a:cxn>
+              <a:cxn ang="0">
+                <a:pos x="connsiteX13" y="connsiteY13"/>
+              </a:cxn>
+              <a:cxn ang="0">
+                <a:pos x="connsiteX14" y="connsiteY14"/>
+              </a:cxn>
+            </a:cxnLst>
+            <a:rect l="l" t="t" r="r" b="b"/>
+            <a:pathLst>
+              <a:path w="7514508" h="2724367">
+                <a:moveTo>
+                  <a:pt x="702393" y="70570"/>
+                </a:moveTo>
+                <a:cubicBezTo>
+                  <a:pt x="961054" y="-38487"/>
+                  <a:pt x="1367920" y="-11922"/>
+                  <a:pt x="1667127" y="87348"/>
+                </a:cubicBezTo>
+                <a:cubicBezTo>
+                  <a:pt x="1966334" y="186618"/>
+                  <a:pt x="2252958" y="452270"/>
+                  <a:pt x="2497637" y="666189"/>
+                </a:cubicBezTo>
+                <a:cubicBezTo>
+                  <a:pt x="2742316" y="880108"/>
+                  <a:pt x="2817818" y="1229649"/>
+                  <a:pt x="3135201" y="1370864"/>
+                </a:cubicBezTo>
+                <a:cubicBezTo>
+                  <a:pt x="3452585" y="1512079"/>
+                  <a:pt x="3954525" y="1488310"/>
+                  <a:pt x="4401938" y="1513477"/>
+                </a:cubicBezTo>
+                <a:lnTo>
+                  <a:pt x="5744177" y="1588978"/>
+                </a:lnTo>
+                <a:cubicBezTo>
+                  <a:pt x="6191590" y="1614145"/>
+                  <a:pt x="6964902" y="1561707"/>
+                  <a:pt x="7254195" y="1664479"/>
+                </a:cubicBezTo>
+                <a:cubicBezTo>
+                  <a:pt x="7543488" y="1767251"/>
+                  <a:pt x="7544576" y="2049017"/>
+                  <a:pt x="7479935" y="2205611"/>
+                </a:cubicBezTo>
+                <a:cubicBezTo>
+                  <a:pt x="7415295" y="2362206"/>
+                  <a:pt x="7348592" y="2532048"/>
+                  <a:pt x="6866352" y="2604046"/>
+                </a:cubicBezTo>
+                <a:cubicBezTo>
+                  <a:pt x="6384112" y="2676044"/>
+                  <a:pt x="5290846" y="2618028"/>
+                  <a:pt x="4586496" y="2637602"/>
+                </a:cubicBezTo>
+                <a:cubicBezTo>
+                  <a:pt x="3882146" y="2657176"/>
+                  <a:pt x="3265512" y="2740812"/>
+                  <a:pt x="2640250" y="2721492"/>
+                </a:cubicBezTo>
+                <a:cubicBezTo>
+                  <a:pt x="2014988" y="2702172"/>
+                  <a:pt x="1264160" y="2741194"/>
+                  <a:pt x="834923" y="2521682"/>
+                </a:cubicBezTo>
+                <a:cubicBezTo>
+                  <a:pt x="405686" y="2302170"/>
+                  <a:pt x="184790" y="1701085"/>
+                  <a:pt x="64830" y="1404420"/>
+                </a:cubicBezTo>
+                <a:cubicBezTo>
+                  <a:pt x="-55130" y="1107755"/>
+                  <a:pt x="8904" y="963998"/>
+                  <a:pt x="115164" y="741690"/>
+                </a:cubicBezTo>
+                <a:cubicBezTo>
+                  <a:pt x="221424" y="519382"/>
+                  <a:pt x="443732" y="179627"/>
+                  <a:pt x="702393" y="70570"/>
+                </a:cubicBezTo>
+                <a:close/>
+              </a:path>
+            </a:pathLst>
+          </a:custGeom>
+          <a:solidFill>
+            <a:schemeClr val="accent2">
+              <a:lumMod val="20000"/>
+              <a:lumOff val="80000"/>
+            </a:schemeClr>
+          </a:solidFill>
+        </p:spPr>
+        <p:style>
+          <a:lnRef idx="2">
+            <a:schemeClr val="accent1">
+              <a:shade val="50000"/>
+            </a:schemeClr>
+          </a:lnRef>
+          <a:fillRef idx="1">
+            <a:schemeClr val="accent1"/>
+          </a:fillRef>
+          <a:effectRef idx="0">
+            <a:schemeClr val="accent1"/>
+          </a:effectRef>
+          <a:fontRef idx="minor">
+            <a:schemeClr val="lt1"/>
+          </a:fontRef>
+        </p:style>
+        <p:txBody>
+          <a:bodyPr rtlCol="0" anchor="ctr"/>
+          <a:lstStyle/>
+          <a:p>
+            <a:pPr algn="ctr"/>
+            <a:endParaRPr lang="fr-FR"/>
+          </a:p>
+        </p:txBody>
+      </p:sp>
+      <p:sp>
+        <p:nvSpPr>
           <p:cNvPr id="4" name="Ellipse 3"/>
           <p:cNvSpPr/>
           <p:nvPr/>
         </p:nvSpPr>
         <p:spPr>
           <a:xfrm>
-            <a:off x="293615" y="411060"/>
-            <a:ext cx="1132514" cy="1048624"/>
+            <a:off x="293614" y="411059"/>
+            <a:ext cx="1403759" cy="1342239"/>
           </a:xfrm>
           <a:prstGeom prst="ellipse">
             <a:avLst/>
@@ -3015,7 +7025,7 @@
         </p:nvSpPr>
         <p:spPr>
           <a:xfrm>
-            <a:off x="4137175" y="471181"/>
+            <a:off x="4296566" y="471181"/>
             <a:ext cx="1284914" cy="1215006"/>
           </a:xfrm>
           <a:prstGeom prst="ellipse">
@@ -3064,7 +7074,7 @@
         </p:nvSpPr>
         <p:spPr>
           <a:xfrm>
-            <a:off x="3610066" y="2368493"/>
+            <a:off x="3610066" y="2687275"/>
             <a:ext cx="1284914" cy="1215006"/>
           </a:xfrm>
           <a:prstGeom prst="ellipse">
@@ -3113,7 +7123,7 @@
         </p:nvSpPr>
         <p:spPr>
           <a:xfrm>
-            <a:off x="3173838" y="4088238"/>
+            <a:off x="1697374" y="4381853"/>
             <a:ext cx="1284914" cy="1215006"/>
           </a:xfrm>
           <a:prstGeom prst="ellipse">
@@ -3206,7 +7216,7 @@
         </p:nvSpPr>
         <p:spPr>
           <a:xfrm>
-            <a:off x="8029663" y="3189217"/>
+            <a:off x="8029663" y="3919060"/>
             <a:ext cx="1585519" cy="1065402"/>
           </a:xfrm>
           <a:prstGeom prst="foldedCorner">
@@ -3250,7 +7260,7 @@
         </p:nvSpPr>
         <p:spPr>
           <a:xfrm>
-            <a:off x="4523061" y="5697528"/>
+            <a:off x="2685870" y="5697528"/>
             <a:ext cx="1585519" cy="1065402"/>
           </a:xfrm>
           <a:prstGeom prst="foldedCorner">
@@ -3297,8 +7307,8 @@
         </p:nvCxnSpPr>
         <p:spPr>
           <a:xfrm>
-            <a:off x="1426129" y="935372"/>
-            <a:ext cx="2372108" cy="1611055"/>
+            <a:off x="1697373" y="1082179"/>
+            <a:ext cx="2100864" cy="1783030"/>
           </a:xfrm>
           <a:prstGeom prst="curvedConnector2">
             <a:avLst/>
@@ -3333,13 +7343,20 @@
         </p:nvSpPr>
         <p:spPr>
           <a:xfrm>
-            <a:off x="2139192" y="1249960"/>
+            <a:off x="2298583" y="1526797"/>
             <a:ext cx="1406091" cy="369332"/>
           </a:xfrm>
           <a:prstGeom prst="rect">
             <a:avLst/>
           </a:prstGeom>
-          <a:noFill/>
+          <a:solidFill>
+            <a:srgbClr val="FFFF00"/>
+          </a:solidFill>
+          <a:ln>
+            <a:solidFill>
+              <a:schemeClr val="tx1"/>
+            </a:solidFill>
+          </a:ln>
         </p:spPr>
         <p:txBody>
           <a:bodyPr wrap="none" rtlCol="0">
@@ -3374,8 +7391,8 @@
         </p:nvCxnSpPr>
         <p:spPr>
           <a:xfrm>
-            <a:off x="4894980" y="2975996"/>
-            <a:ext cx="3134683" cy="745922"/>
+            <a:off x="4894980" y="3294778"/>
+            <a:ext cx="3134683" cy="1156983"/>
           </a:xfrm>
           <a:prstGeom prst="curvedConnector3">
             <a:avLst>
@@ -3412,13 +7429,20 @@
         </p:nvSpPr>
         <p:spPr>
           <a:xfrm>
-            <a:off x="5553782" y="3005216"/>
-            <a:ext cx="1512017" cy="369332"/>
+            <a:off x="5964843" y="3072328"/>
+            <a:ext cx="1495666" cy="369332"/>
           </a:xfrm>
           <a:prstGeom prst="rect">
             <a:avLst/>
           </a:prstGeom>
-          <a:noFill/>
+          <a:solidFill>
+            <a:srgbClr val="FFFF00"/>
+          </a:solidFill>
+          <a:ln>
+            <a:solidFill>
+              <a:schemeClr val="tx1"/>
+            </a:solidFill>
+          </a:ln>
         </p:spPr>
         <p:txBody>
           <a:bodyPr wrap="none" rtlCol="0">
@@ -3427,12 +7451,28 @@
           <a:lstStyle/>
           <a:p>
             <a:r>
+              <a:rPr lang="fr-FR" i="1" dirty="0">
+                <a:solidFill>
+                  <a:srgbClr val="0070C0"/>
+                </a:solidFill>
+              </a:rPr>
+              <a:t>b</a:t>
+            </a:r>
+            <a:r>
               <a:rPr lang="fr-FR" i="1" dirty="0" smtClean="0">
                 <a:solidFill>
                   <a:srgbClr val="0070C0"/>
                 </a:solidFill>
               </a:rPr>
-              <a:t>c) Fork&gt; clone</a:t>
+              <a:t>) </a:t>
+            </a:r>
+            <a:r>
+              <a:rPr lang="fr-FR" i="1" dirty="0" smtClean="0">
+                <a:solidFill>
+                  <a:srgbClr val="0070C0"/>
+                </a:solidFill>
+              </a:rPr>
+              <a:t>Fork&gt; clone</a:t>
             </a:r>
             <a:endParaRPr lang="fr-FR" i="1" dirty="0">
               <a:solidFill>
@@ -3453,7 +7493,7 @@
         </p:nvCxnSpPr>
         <p:spPr>
           <a:xfrm rot="16200000" flipH="1">
-            <a:off x="8952451" y="3059188"/>
+            <a:off x="8952451" y="3789031"/>
             <a:ext cx="532701" cy="792759"/>
           </a:xfrm>
           <a:prstGeom prst="curvedConnector4">
@@ -3492,13 +7532,15 @@
         </p:nvSpPr>
         <p:spPr>
           <a:xfrm>
-            <a:off x="9934462" y="3022984"/>
+            <a:off x="9934462" y="3752827"/>
             <a:ext cx="1526380" cy="369332"/>
           </a:xfrm>
           <a:prstGeom prst="rect">
             <a:avLst/>
           </a:prstGeom>
-          <a:noFill/>
+          <a:solidFill>
+            <a:schemeClr val="bg1"/>
+          </a:solidFill>
           <a:ln w="19050">
             <a:solidFill>
               <a:srgbClr val="00B0F0"/>
@@ -3513,7 +7555,11 @@
           <a:p>
             <a:r>
               <a:rPr lang="fr-FR" dirty="0" smtClean="0"/>
-              <a:t>1) Home&gt; </a:t>
+              <a:t>1) </a:t>
+            </a:r>
+            <a:r>
+              <a:rPr lang="fr-FR" dirty="0" smtClean="0"/>
+              <a:t>Home&gt; </a:t>
             </a:r>
             <a:r>
               <a:rPr lang="fr-FR" dirty="0" err="1" smtClean="0"/>
@@ -3534,7 +7580,7 @@
         </p:nvCxnSpPr>
         <p:spPr>
           <a:xfrm flipH="1">
-            <a:off x="8822423" y="3721918"/>
+            <a:off x="8822423" y="4451761"/>
             <a:ext cx="792759" cy="532701"/>
           </a:xfrm>
           <a:prstGeom prst="curvedConnector4">
@@ -3573,13 +7619,15 @@
         </p:nvSpPr>
         <p:spPr>
           <a:xfrm>
-            <a:off x="9902304" y="3922005"/>
+            <a:off x="9902304" y="4685404"/>
             <a:ext cx="2167260" cy="646331"/>
           </a:xfrm>
           <a:prstGeom prst="rect">
             <a:avLst/>
           </a:prstGeom>
-          <a:noFill/>
+          <a:solidFill>
+            <a:schemeClr val="bg1"/>
+          </a:solidFill>
           <a:ln w="19050">
             <a:solidFill>
               <a:srgbClr val="00B0F0"/>
@@ -3617,8 +7665,8 @@
         </p:nvCxnSpPr>
         <p:spPr>
           <a:xfrm rot="10800000">
-            <a:off x="4706809" y="3405566"/>
-            <a:ext cx="3322854" cy="316353"/>
+            <a:off x="4706809" y="3724347"/>
+            <a:ext cx="3322854" cy="727414"/>
           </a:xfrm>
           <a:prstGeom prst="curvedConnector2">
             <a:avLst/>
@@ -3653,13 +7701,15 @@
         </p:nvSpPr>
         <p:spPr>
           <a:xfrm>
-            <a:off x="5298141" y="3873069"/>
+            <a:off x="4861913" y="4401576"/>
             <a:ext cx="2161041" cy="369332"/>
           </a:xfrm>
           <a:prstGeom prst="rect">
             <a:avLst/>
           </a:prstGeom>
-          <a:noFill/>
+          <a:solidFill>
+            <a:schemeClr val="bg1"/>
+          </a:solidFill>
           <a:ln w="19050">
             <a:solidFill>
               <a:srgbClr val="00B0F0"/>
@@ -3695,8 +7745,8 @@
         </p:nvCxnSpPr>
         <p:spPr>
           <a:xfrm rot="10800000">
-            <a:off x="1260276" y="1306118"/>
-            <a:ext cx="2349790" cy="1669879"/>
+            <a:off x="1491798" y="1556732"/>
+            <a:ext cx="2118269" cy="1738046"/>
           </a:xfrm>
           <a:prstGeom prst="curvedConnector2">
             <a:avLst/>
@@ -3731,13 +7781,20 @@
         </p:nvSpPr>
         <p:spPr>
           <a:xfrm>
-            <a:off x="1121817" y="2129555"/>
+            <a:off x="1021149" y="2590950"/>
             <a:ext cx="2541465" cy="369332"/>
           </a:xfrm>
           <a:prstGeom prst="rect">
             <a:avLst/>
           </a:prstGeom>
-          <a:noFill/>
+          <a:solidFill>
+            <a:schemeClr val="bg1"/>
+          </a:solidFill>
+          <a:ln w="19050">
+            <a:solidFill>
+              <a:srgbClr val="00B0F0"/>
+            </a:solidFill>
+          </a:ln>
         </p:spPr>
         <p:txBody>
           <a:bodyPr wrap="none" rtlCol="0">
@@ -3780,8 +7837,8 @@
         </p:nvCxnSpPr>
         <p:spPr>
           <a:xfrm rot="16200000" flipH="1">
-            <a:off x="29208" y="1736376"/>
-            <a:ext cx="4924112" cy="4063593"/>
+            <a:off x="-744218" y="2800140"/>
+            <a:ext cx="4673497" cy="2186680"/>
           </a:xfrm>
           <a:prstGeom prst="curvedConnector2">
             <a:avLst/>
@@ -3816,13 +7873,17 @@
         </p:nvSpPr>
         <p:spPr>
           <a:xfrm>
-            <a:off x="6336988" y="5817916"/>
-            <a:ext cx="3900363" cy="646331"/>
+            <a:off x="4499797" y="5817916"/>
+            <a:ext cx="3554114" cy="646331"/>
           </a:xfrm>
           <a:prstGeom prst="rect">
             <a:avLst/>
           </a:prstGeom>
-          <a:noFill/>
+          <a:solidFill>
+            <a:schemeClr val="bg1">
+              <a:lumMod val="95000"/>
+            </a:schemeClr>
+          </a:solidFill>
           <a:ln w="19050">
             <a:solidFill>
               <a:srgbClr val="00B0F0"/>
@@ -3835,9 +7896,6 @@
           </a:bodyPr>
           <a:lstStyle/>
           <a:p>
-            <a:pPr marL="342900" indent="-342900">
-              <a:buAutoNum type="arabicParenR"/>
-            </a:pPr>
             <a:r>
               <a:rPr lang="fr-FR" dirty="0" smtClean="0"/>
               <a:t>Home&gt; git pull –</a:t>
@@ -3852,9 +7910,6 @@
             </a:r>
           </a:p>
           <a:p>
-            <a:pPr marL="342900" indent="-342900">
-              <a:buAutoNum type="arabicParenR"/>
-            </a:pPr>
             <a:r>
               <a:rPr lang="fr-FR" dirty="0" smtClean="0"/>
               <a:t>Home&gt; git push</a:t>
@@ -3871,13 +7926,20 @@
         </p:nvSpPr>
         <p:spPr>
           <a:xfrm>
-            <a:off x="4942764" y="2035704"/>
+            <a:off x="4884041" y="2220262"/>
             <a:ext cx="7277954" cy="369332"/>
           </a:xfrm>
           <a:prstGeom prst="rect">
             <a:avLst/>
           </a:prstGeom>
-          <a:noFill/>
+          <a:solidFill>
+            <a:srgbClr val="FFFF00"/>
+          </a:solidFill>
+          <a:ln>
+            <a:solidFill>
+              <a:schemeClr val="tx1"/>
+            </a:solidFill>
+          </a:ln>
         </p:spPr>
         <p:txBody>
           <a:bodyPr wrap="none" rtlCol="0">
@@ -3886,12 +7948,28 @@
           <a:lstStyle/>
           <a:p>
             <a:r>
+              <a:rPr lang="fr-FR" i="1" dirty="0">
+                <a:solidFill>
+                  <a:srgbClr val="0070C0"/>
+                </a:solidFill>
+              </a:rPr>
+              <a:t>c</a:t>
+            </a:r>
+            <a:r>
               <a:rPr lang="fr-FR" i="1" dirty="0" smtClean="0">
                 <a:solidFill>
                   <a:srgbClr val="0070C0"/>
                 </a:solidFill>
               </a:rPr>
-              <a:t>b) Home&gt; git </a:t>
+              <a:t>) </a:t>
+            </a:r>
+            <a:r>
+              <a:rPr lang="fr-FR" i="1" dirty="0" smtClean="0">
+                <a:solidFill>
+                  <a:srgbClr val="0070C0"/>
+                </a:solidFill>
+              </a:rPr>
+              <a:t>Home&gt; git </a:t>
             </a:r>
             <a:r>
               <a:rPr lang="fr-FR" i="1" dirty="0" err="1" smtClean="0">
@@ -3968,8 +8046,8 @@
         </p:nvCxnSpPr>
         <p:spPr>
           <a:xfrm rot="16200000" flipV="1">
-            <a:off x="8309992" y="2676786"/>
-            <a:ext cx="784181" cy="240682"/>
+            <a:off x="8007988" y="3104624"/>
+            <a:ext cx="1329466" cy="299405"/>
           </a:xfrm>
           <a:prstGeom prst="curvedConnector3">
             <a:avLst>
@@ -4009,8 +8087,8 @@
         </p:nvCxnSpPr>
         <p:spPr>
           <a:xfrm rot="16200000" flipV="1">
-            <a:off x="4386394" y="4768100"/>
-            <a:ext cx="1001787" cy="857069"/>
+            <a:off x="2876373" y="5095271"/>
+            <a:ext cx="708172" cy="496342"/>
           </a:xfrm>
           <a:prstGeom prst="curvedConnector2">
             <a:avLst/>
@@ -4045,13 +8123,17 @@
         </p:nvSpPr>
         <p:spPr>
           <a:xfrm>
-            <a:off x="8108465" y="416798"/>
-            <a:ext cx="3900363" cy="646331"/>
+            <a:off x="8108465" y="660079"/>
+            <a:ext cx="3554114" cy="646331"/>
           </a:xfrm>
           <a:prstGeom prst="rect">
             <a:avLst/>
           </a:prstGeom>
-          <a:noFill/>
+          <a:solidFill>
+            <a:schemeClr val="bg1">
+              <a:lumMod val="95000"/>
+            </a:schemeClr>
+          </a:solidFill>
           <a:ln w="19050">
             <a:solidFill>
               <a:srgbClr val="00B0F0"/>
@@ -4064,9 +8146,6 @@
           </a:bodyPr>
           <a:lstStyle/>
           <a:p>
-            <a:pPr marL="342900" indent="-342900">
-              <a:buAutoNum type="arabicParenR"/>
-            </a:pPr>
             <a:r>
               <a:rPr lang="fr-FR" dirty="0" smtClean="0"/>
               <a:t>Home&gt; git pull –</a:t>
@@ -4081,9 +8160,6 @@
             </a:r>
           </a:p>
           <a:p>
-            <a:pPr marL="342900" indent="-342900">
-              <a:buAutoNum type="arabicParenR"/>
-            </a:pPr>
             <a:r>
               <a:rPr lang="fr-FR" dirty="0" smtClean="0"/>
               <a:t>Home&gt; git push</a:t>
@@ -4103,8 +8179,8 @@
         </p:nvCxnSpPr>
         <p:spPr>
           <a:xfrm rot="10800000">
-            <a:off x="5422089" y="1078685"/>
-            <a:ext cx="945154" cy="16079"/>
+            <a:off x="5581481" y="1078685"/>
+            <a:ext cx="785763" cy="16079"/>
           </a:xfrm>
           <a:prstGeom prst="curvedConnector3">
             <a:avLst>
@@ -4144,18 +8220,202 @@
         </p:nvCxnSpPr>
         <p:spPr>
           <a:xfrm rot="5400000" flipH="1" flipV="1">
-            <a:off x="4208857" y="-2386518"/>
-            <a:ext cx="2565" cy="5899727"/>
+            <a:off x="4303119" y="-2249259"/>
+            <a:ext cx="45563" cy="5668206"/>
           </a:xfrm>
           <a:prstGeom prst="curvedConnector3">
             <a:avLst>
-              <a:gd name="adj1" fmla="val 14899298"/>
+              <a:gd name="adj1" fmla="val 933139"/>
             </a:avLst>
           </a:prstGeom>
           <a:ln w="57150">
             <a:solidFill>
               <a:srgbClr val="FF0000"/>
             </a:solidFill>
+            <a:tailEnd type="triangle"/>
+          </a:ln>
+        </p:spPr>
+        <p:style>
+          <a:lnRef idx="1">
+            <a:schemeClr val="accent1"/>
+          </a:lnRef>
+          <a:fillRef idx="0">
+            <a:schemeClr val="accent1"/>
+          </a:fillRef>
+          <a:effectRef idx="0">
+            <a:schemeClr val="accent1"/>
+          </a:effectRef>
+          <a:fontRef idx="minor">
+            <a:schemeClr val="tx1"/>
+          </a:fontRef>
+        </p:style>
+      </p:cxnSp>
+      <p:cxnSp>
+        <p:nvCxnSpPr>
+          <p:cNvPr id="3" name="Connecteur en arc 2"/>
+          <p:cNvCxnSpPr>
+            <a:stCxn id="30" idx="2"/>
+            <a:endCxn id="40" idx="0"/>
+          </p:cNvCxnSpPr>
+          <p:nvPr/>
+        </p:nvCxnSpPr>
+        <p:spPr>
+          <a:xfrm rot="16200000" flipH="1">
+            <a:off x="10560171" y="4259640"/>
+            <a:ext cx="563245" cy="288282"/>
+          </a:xfrm>
+          <a:prstGeom prst="curvedConnector3">
+            <a:avLst/>
+          </a:prstGeom>
+          <a:ln>
+            <a:tailEnd type="triangle"/>
+          </a:ln>
+        </p:spPr>
+        <p:style>
+          <a:lnRef idx="1">
+            <a:schemeClr val="accent1"/>
+          </a:lnRef>
+          <a:fillRef idx="0">
+            <a:schemeClr val="accent1"/>
+          </a:fillRef>
+          <a:effectRef idx="0">
+            <a:schemeClr val="accent1"/>
+          </a:effectRef>
+          <a:fontRef idx="minor">
+            <a:schemeClr val="tx1"/>
+          </a:fontRef>
+        </p:style>
+      </p:cxnSp>
+      <p:cxnSp>
+        <p:nvCxnSpPr>
+          <p:cNvPr id="32" name="Connecteur en arc 31"/>
+          <p:cNvCxnSpPr>
+            <a:stCxn id="40" idx="2"/>
+            <a:endCxn id="46" idx="2"/>
+          </p:cNvCxnSpPr>
+          <p:nvPr/>
+        </p:nvCxnSpPr>
+        <p:spPr>
+          <a:xfrm rot="5400000" flipH="1">
+            <a:off x="8183770" y="2529572"/>
+            <a:ext cx="560827" cy="5043500"/>
+          </a:xfrm>
+          <a:prstGeom prst="curvedConnector3">
+            <a:avLst>
+              <a:gd name="adj1" fmla="val -40761"/>
+            </a:avLst>
+          </a:prstGeom>
+          <a:ln>
+            <a:tailEnd type="triangle"/>
+          </a:ln>
+        </p:spPr>
+        <p:style>
+          <a:lnRef idx="1">
+            <a:schemeClr val="accent1"/>
+          </a:lnRef>
+          <a:fillRef idx="0">
+            <a:schemeClr val="accent1"/>
+          </a:fillRef>
+          <a:effectRef idx="0">
+            <a:schemeClr val="accent1"/>
+          </a:effectRef>
+          <a:fontRef idx="minor">
+            <a:schemeClr val="tx1"/>
+          </a:fontRef>
+        </p:style>
+      </p:cxnSp>
+      <p:cxnSp>
+        <p:nvCxnSpPr>
+          <p:cNvPr id="35" name="Connecteur en arc 34"/>
+          <p:cNvCxnSpPr>
+            <a:stCxn id="46" idx="1"/>
+            <a:endCxn id="52" idx="2"/>
+          </p:cNvCxnSpPr>
+          <p:nvPr/>
+        </p:nvCxnSpPr>
+        <p:spPr>
+          <a:xfrm rot="10800000">
+            <a:off x="2291883" y="2960282"/>
+            <a:ext cx="2570031" cy="1625960"/>
+          </a:xfrm>
+          <a:prstGeom prst="curvedConnector2">
+            <a:avLst/>
+          </a:prstGeom>
+          <a:ln>
+            <a:tailEnd type="triangle"/>
+          </a:ln>
+        </p:spPr>
+        <p:style>
+          <a:lnRef idx="1">
+            <a:schemeClr val="accent1"/>
+          </a:lnRef>
+          <a:fillRef idx="0">
+            <a:schemeClr val="accent1"/>
+          </a:fillRef>
+          <a:effectRef idx="0">
+            <a:schemeClr val="accent1"/>
+          </a:effectRef>
+          <a:fontRef idx="minor">
+            <a:schemeClr val="tx1"/>
+          </a:fontRef>
+        </p:style>
+      </p:cxnSp>
+      <p:cxnSp>
+        <p:nvCxnSpPr>
+          <p:cNvPr id="42" name="Connecteur en arc 41"/>
+          <p:cNvCxnSpPr>
+            <a:stCxn id="20" idx="3"/>
+            <a:endCxn id="25" idx="1"/>
+          </p:cNvCxnSpPr>
+          <p:nvPr/>
+        </p:nvCxnSpPr>
+        <p:spPr>
+          <a:xfrm>
+            <a:off x="3704674" y="1711463"/>
+            <a:ext cx="2260169" cy="1545531"/>
+          </a:xfrm>
+          <a:prstGeom prst="curvedConnector3">
+            <a:avLst>
+              <a:gd name="adj1" fmla="val 50000"/>
+            </a:avLst>
+          </a:prstGeom>
+          <a:ln>
+            <a:tailEnd type="triangle"/>
+          </a:ln>
+        </p:spPr>
+        <p:style>
+          <a:lnRef idx="1">
+            <a:schemeClr val="accent1"/>
+          </a:lnRef>
+          <a:fillRef idx="0">
+            <a:schemeClr val="accent1"/>
+          </a:fillRef>
+          <a:effectRef idx="0">
+            <a:schemeClr val="accent1"/>
+          </a:effectRef>
+          <a:fontRef idx="minor">
+            <a:schemeClr val="tx1"/>
+          </a:fontRef>
+        </p:style>
+      </p:cxnSp>
+      <p:cxnSp>
+        <p:nvCxnSpPr>
+          <p:cNvPr id="43" name="Connecteur en arc 42"/>
+          <p:cNvCxnSpPr>
+            <a:stCxn id="25" idx="3"/>
+            <a:endCxn id="60" idx="2"/>
+          </p:cNvCxnSpPr>
+          <p:nvPr/>
+        </p:nvCxnSpPr>
+        <p:spPr>
+          <a:xfrm flipV="1">
+            <a:off x="7460509" y="2589594"/>
+            <a:ext cx="1062509" cy="667400"/>
+          </a:xfrm>
+          <a:prstGeom prst="curvedConnector2">
+            <a:avLst/>
+          </a:prstGeom>
+          <a:ln>
             <a:tailEnd type="triangle"/>
           </a:ln>
         </p:spPr>

</xml_diff>